<commit_message>
pivotcharts and update files to xlsm from xlsx. bugtesting underway to ensure everything is working
</commit_message>
<xml_diff>
--- a/P0 presentation.pptx
+++ b/P0 presentation.pptx
@@ -12,6 +12,7 @@
     <p:sldId id="258" r:id="rId6"/>
     <p:sldId id="260" r:id="rId7"/>
     <p:sldId id="262" r:id="rId8"/>
+    <p:sldId id="263" r:id="rId9"/>
   </p:sldIdLst>
   <p:sldSz cx="12192000" cy="6858000"/>
   <p:notesSz cx="6858000" cy="9144000"/>
@@ -4429,7 +4430,7 @@
           <a:p>
             <a:r>
               <a:rPr lang="en-US" dirty="0"/>
-              <a:t>Menu Option for UX</a:t>
+              <a:t>Menu Option for User Interface</a:t>
             </a:r>
             <a:br>
               <a:rPr lang="en-US" dirty="0"/>
@@ -4440,10 +4441,10 @@
       </p:sp>
       <p:pic>
         <p:nvPicPr>
-          <p:cNvPr id="7" name="Content Placeholder 6" descr="Graphical user interface, application&#10;&#10;Description automatically generated">
+          <p:cNvPr id="6" name="Content Placeholder 5" descr="Graphical user interface, text, application&#10;&#10;Description automatically generated">
             <a:extLst>
               <a:ext uri="{FF2B5EF4-FFF2-40B4-BE49-F238E27FC236}">
-                <a16:creationId xmlns:a16="http://schemas.microsoft.com/office/drawing/2014/main" id="{360D227F-BBCD-44F7-8CC2-44756CDD7F3B}"/>
+                <a16:creationId xmlns:a16="http://schemas.microsoft.com/office/drawing/2014/main" id="{0D288DA2-698A-4899-AAC7-7EF86DE2D7CB}"/>
               </a:ext>
             </a:extLst>
           </p:cNvPr>
@@ -4468,12 +4469,12 @@
         </p:blipFill>
         <p:spPr>
           <a:xfrm>
-            <a:off x="3316287" y="1737360"/>
-            <a:ext cx="6341107" cy="4634865"/>
+            <a:off x="2759682" y="1451857"/>
+            <a:ext cx="6672635" cy="4877187"/>
           </a:xfrm>
           <a:ln w="38100">
             <a:solidFill>
-              <a:srgbClr val="00B0F0"/>
+              <a:schemeClr val="accent1"/>
             </a:solidFill>
           </a:ln>
         </p:spPr>
@@ -5743,6 +5744,148 @@
           </a:ln>
         </p:spPr>
       </p:pic>
+      <p:sp>
+        <p:nvSpPr>
+          <p:cNvPr id="4" name="Right Bracket 3">
+            <a:extLst>
+              <a:ext uri="{FF2B5EF4-FFF2-40B4-BE49-F238E27FC236}">
+                <a16:creationId xmlns:a16="http://schemas.microsoft.com/office/drawing/2014/main" id="{2447E070-24C5-479D-8A98-552A2ABFA279}"/>
+              </a:ext>
+            </a:extLst>
+          </p:cNvPr>
+          <p:cNvSpPr/>
+          <p:nvPr/>
+        </p:nvSpPr>
+        <p:spPr>
+          <a:xfrm>
+            <a:off x="1895475" y="1971675"/>
+            <a:ext cx="742950" cy="4343399"/>
+          </a:xfrm>
+          <a:prstGeom prst="rightBracket">
+            <a:avLst/>
+          </a:prstGeom>
+          <a:ln w="57150">
+            <a:solidFill>
+              <a:srgbClr val="FF0000"/>
+            </a:solidFill>
+          </a:ln>
+        </p:spPr>
+        <p:style>
+          <a:lnRef idx="1">
+            <a:schemeClr val="accent1"/>
+          </a:lnRef>
+          <a:fillRef idx="0">
+            <a:schemeClr val="accent1"/>
+          </a:fillRef>
+          <a:effectRef idx="0">
+            <a:schemeClr val="accent1"/>
+          </a:effectRef>
+          <a:fontRef idx="minor">
+            <a:schemeClr val="tx1"/>
+          </a:fontRef>
+        </p:style>
+        <p:txBody>
+          <a:bodyPr rtlCol="0" anchor="ctr"/>
+          <a:lstStyle/>
+          <a:p>
+            <a:pPr algn="ctr"/>
+            <a:endParaRPr lang="en-US"/>
+          </a:p>
+        </p:txBody>
+      </p:sp>
+      <p:cxnSp>
+        <p:nvCxnSpPr>
+          <p:cNvPr id="8" name="Straight Arrow Connector 7">
+            <a:extLst>
+              <a:ext uri="{FF2B5EF4-FFF2-40B4-BE49-F238E27FC236}">
+                <a16:creationId xmlns:a16="http://schemas.microsoft.com/office/drawing/2014/main" id="{0A2EA6E0-1426-45B3-95FC-3DFCC61FE1AF}"/>
+              </a:ext>
+            </a:extLst>
+          </p:cNvPr>
+          <p:cNvCxnSpPr>
+            <a:cxnSpLocks/>
+          </p:cNvCxnSpPr>
+          <p:nvPr/>
+        </p:nvCxnSpPr>
+        <p:spPr>
+          <a:xfrm flipV="1">
+            <a:off x="2847975" y="3514725"/>
+            <a:ext cx="3248025" cy="285752"/>
+          </a:xfrm>
+          <a:prstGeom prst="straightConnector1">
+            <a:avLst/>
+          </a:prstGeom>
+          <a:ln w="57150">
+            <a:solidFill>
+              <a:srgbClr val="FF0000"/>
+            </a:solidFill>
+            <a:tailEnd type="triangle"/>
+          </a:ln>
+        </p:spPr>
+        <p:style>
+          <a:lnRef idx="1">
+            <a:schemeClr val="accent1"/>
+          </a:lnRef>
+          <a:fillRef idx="0">
+            <a:schemeClr val="accent1"/>
+          </a:fillRef>
+          <a:effectRef idx="0">
+            <a:schemeClr val="accent1"/>
+          </a:effectRef>
+          <a:fontRef idx="minor">
+            <a:schemeClr val="tx1"/>
+          </a:fontRef>
+        </p:style>
+      </p:cxnSp>
+      <p:sp>
+        <p:nvSpPr>
+          <p:cNvPr id="13" name="Left Bracket 12">
+            <a:extLst>
+              <a:ext uri="{FF2B5EF4-FFF2-40B4-BE49-F238E27FC236}">
+                <a16:creationId xmlns:a16="http://schemas.microsoft.com/office/drawing/2014/main" id="{74FFCAD2-20BE-4152-B90E-94EA4D645031}"/>
+              </a:ext>
+            </a:extLst>
+          </p:cNvPr>
+          <p:cNvSpPr/>
+          <p:nvPr/>
+        </p:nvSpPr>
+        <p:spPr>
+          <a:xfrm>
+            <a:off x="6172202" y="2866031"/>
+            <a:ext cx="247650" cy="1304925"/>
+          </a:xfrm>
+          <a:prstGeom prst="leftBracket">
+            <a:avLst/>
+          </a:prstGeom>
+          <a:ln w="38100">
+            <a:solidFill>
+              <a:srgbClr val="FF0000"/>
+            </a:solidFill>
+          </a:ln>
+        </p:spPr>
+        <p:style>
+          <a:lnRef idx="1">
+            <a:schemeClr val="accent1"/>
+          </a:lnRef>
+          <a:fillRef idx="0">
+            <a:schemeClr val="accent1"/>
+          </a:fillRef>
+          <a:effectRef idx="0">
+            <a:schemeClr val="accent1"/>
+          </a:effectRef>
+          <a:fontRef idx="minor">
+            <a:schemeClr val="tx1"/>
+          </a:fontRef>
+        </p:style>
+        <p:txBody>
+          <a:bodyPr rtlCol="0" anchor="ctr"/>
+          <a:lstStyle/>
+          <a:p>
+            <a:pPr algn="ctr"/>
+            <a:endParaRPr lang="en-US"/>
+          </a:p>
+        </p:txBody>
+      </p:sp>
     </p:spTree>
     <p:extLst>
       <p:ext uri="{BB962C8B-B14F-4D97-AF65-F5344CB8AC3E}">
@@ -5867,6 +6010,165 @@
                       </p:childTnLst>
                     </p:cTn>
                   </p:par>
+                  <p:par>
+                    <p:cTn id="13" fill="hold">
+                      <p:stCondLst>
+                        <p:cond delay="indefinite"/>
+                      </p:stCondLst>
+                      <p:childTnLst>
+                        <p:par>
+                          <p:cTn id="14" fill="hold">
+                            <p:stCondLst>
+                              <p:cond delay="0"/>
+                            </p:stCondLst>
+                            <p:childTnLst>
+                              <p:par>
+                                <p:cTn id="15" presetID="10" presetClass="entr" presetSubtype="0" fill="hold" grpId="0" nodeType="clickEffect">
+                                  <p:stCondLst>
+                                    <p:cond delay="0"/>
+                                  </p:stCondLst>
+                                  <p:childTnLst>
+                                    <p:set>
+                                      <p:cBhvr>
+                                        <p:cTn id="16" dur="1" fill="hold">
+                                          <p:stCondLst>
+                                            <p:cond delay="0"/>
+                                          </p:stCondLst>
+                                        </p:cTn>
+                                        <p:tgtEl>
+                                          <p:spTgt spid="4"/>
+                                        </p:tgtEl>
+                                        <p:attrNameLst>
+                                          <p:attrName>style.visibility</p:attrName>
+                                        </p:attrNameLst>
+                                      </p:cBhvr>
+                                      <p:to>
+                                        <p:strVal val="visible"/>
+                                      </p:to>
+                                    </p:set>
+                                    <p:animEffect transition="in" filter="fade">
+                                      <p:cBhvr>
+                                        <p:cTn id="17" dur="500"/>
+                                        <p:tgtEl>
+                                          <p:spTgt spid="4"/>
+                                        </p:tgtEl>
+                                      </p:cBhvr>
+                                    </p:animEffect>
+                                  </p:childTnLst>
+                                </p:cTn>
+                              </p:par>
+                            </p:childTnLst>
+                          </p:cTn>
+                        </p:par>
+                      </p:childTnLst>
+                    </p:cTn>
+                  </p:par>
+                  <p:par>
+                    <p:cTn id="18" fill="hold">
+                      <p:stCondLst>
+                        <p:cond delay="indefinite"/>
+                      </p:stCondLst>
+                      <p:childTnLst>
+                        <p:par>
+                          <p:cTn id="19" fill="hold">
+                            <p:stCondLst>
+                              <p:cond delay="0"/>
+                            </p:stCondLst>
+                            <p:childTnLst>
+                              <p:par>
+                                <p:cTn id="20" presetID="10" presetClass="entr" presetSubtype="0" fill="hold" nodeType="clickEffect">
+                                  <p:stCondLst>
+                                    <p:cond delay="0"/>
+                                  </p:stCondLst>
+                                  <p:childTnLst>
+                                    <p:set>
+                                      <p:cBhvr>
+                                        <p:cTn id="21" dur="1" fill="hold">
+                                          <p:stCondLst>
+                                            <p:cond delay="0"/>
+                                          </p:stCondLst>
+                                        </p:cTn>
+                                        <p:tgtEl>
+                                          <p:spTgt spid="8"/>
+                                        </p:tgtEl>
+                                        <p:attrNameLst>
+                                          <p:attrName>style.visibility</p:attrName>
+                                        </p:attrNameLst>
+                                      </p:cBhvr>
+                                      <p:to>
+                                        <p:strVal val="visible"/>
+                                      </p:to>
+                                    </p:set>
+                                    <p:animEffect transition="in" filter="fade">
+                                      <p:cBhvr>
+                                        <p:cTn id="22" dur="500"/>
+                                        <p:tgtEl>
+                                          <p:spTgt spid="8"/>
+                                        </p:tgtEl>
+                                      </p:cBhvr>
+                                    </p:animEffect>
+                                  </p:childTnLst>
+                                </p:cTn>
+                              </p:par>
+                            </p:childTnLst>
+                          </p:cTn>
+                        </p:par>
+                      </p:childTnLst>
+                    </p:cTn>
+                  </p:par>
+                  <p:par>
+                    <p:cTn id="23" fill="hold">
+                      <p:stCondLst>
+                        <p:cond delay="indefinite"/>
+                      </p:stCondLst>
+                      <p:childTnLst>
+                        <p:par>
+                          <p:cTn id="24" fill="hold">
+                            <p:stCondLst>
+                              <p:cond delay="0"/>
+                            </p:stCondLst>
+                            <p:childTnLst>
+                              <p:par>
+                                <p:cTn id="25" presetID="10" presetClass="entr" presetSubtype="0" fill="hold" grpId="0" nodeType="clickEffect">
+                                  <p:stCondLst>
+                                    <p:cond delay="0"/>
+                                  </p:stCondLst>
+                                  <p:childTnLst>
+                                    <p:set>
+                                      <p:cBhvr>
+                                        <p:cTn id="26" dur="1" fill="hold">
+                                          <p:stCondLst>
+                                            <p:cond delay="0"/>
+                                          </p:stCondLst>
+                                        </p:cTn>
+                                        <p:tgtEl>
+                                          <p:spTgt spid="13"/>
+                                        </p:tgtEl>
+                                        <p:attrNameLst>
+                                          <p:attrName>style.visibility</p:attrName>
+                                        </p:attrNameLst>
+                                      </p:cBhvr>
+                                      <p:to>
+                                        <p:strVal val="visible"/>
+                                      </p:to>
+                                    </p:set>
+                                    <p:animEffect transition="in" filter="fade">
+                                      <p:cBhvr>
+                                        <p:cTn id="27" dur="500"/>
+                                        <p:tgtEl>
+                                          <p:spTgt spid="13"/>
+                                        </p:tgtEl>
+                                      </p:cBhvr>
+                                    </p:animEffect>
+                                  </p:childTnLst>
+                                </p:cTn>
+                              </p:par>
+                            </p:childTnLst>
+                          </p:cTn>
+                        </p:par>
+                      </p:childTnLst>
+                    </p:cTn>
+                  </p:par>
                 </p:childTnLst>
               </p:cTn>
               <p:prevCondLst>
@@ -5888,6 +6190,10 @@
         </p:cTn>
       </p:par>
     </p:tnLst>
+    <p:bldLst>
+      <p:bldP spid="4" grpId="0" animBg="1"/>
+      <p:bldP spid="13" grpId="0" animBg="1"/>
+    </p:bldLst>
   </p:timing>
 </p:sld>
 </file>
@@ -6665,6 +6971,1560 @@
 </p:sld>
 </file>
 
+<file path=ppt/slides/slide8.xml><?xml version="1.0" encoding="utf-8"?>
+<p:sld xmlns:a="http://schemas.openxmlformats.org/drawingml/2006/main" xmlns:r="http://schemas.openxmlformats.org/officeDocument/2006/relationships" xmlns:p="http://schemas.openxmlformats.org/presentationml/2006/main">
+  <p:cSld>
+    <p:spTree>
+      <p:nvGrpSpPr>
+        <p:cNvPr id="1" name=""/>
+        <p:cNvGrpSpPr/>
+        <p:nvPr/>
+      </p:nvGrpSpPr>
+      <p:grpSpPr>
+        <a:xfrm>
+          <a:off x="0" y="0"/>
+          <a:ext cx="0" cy="0"/>
+          <a:chOff x="0" y="0"/>
+          <a:chExt cx="0" cy="0"/>
+        </a:xfrm>
+      </p:grpSpPr>
+      <p:sp>
+        <p:nvSpPr>
+          <p:cNvPr id="2" name="Title 1">
+            <a:extLst>
+              <a:ext uri="{FF2B5EF4-FFF2-40B4-BE49-F238E27FC236}">
+                <a16:creationId xmlns:a16="http://schemas.microsoft.com/office/drawing/2014/main" id="{35F4DFF8-F9F1-49A3-8D7E-5ADB3D73907F}"/>
+              </a:ext>
+            </a:extLst>
+          </p:cNvPr>
+          <p:cNvSpPr>
+            <a:spLocks noGrp="1"/>
+          </p:cNvSpPr>
+          <p:nvPr>
+            <p:ph type="title"/>
+          </p:nvPr>
+        </p:nvSpPr>
+        <p:spPr/>
+        <p:txBody>
+          <a:bodyPr>
+            <a:normAutofit/>
+          </a:bodyPr>
+          <a:lstStyle/>
+          <a:p>
+            <a:r>
+              <a:rPr lang="en-US" sz="4000" dirty="0"/>
+              <a:t>Feature: Automatic Updating Pivot Charts For Vendor Inventory And Incoming Shipments</a:t>
+            </a:r>
+          </a:p>
+        </p:txBody>
+      </p:sp>
+      <p:pic>
+        <p:nvPicPr>
+          <p:cNvPr id="7" name="Picture 6">
+            <a:extLst>
+              <a:ext uri="{FF2B5EF4-FFF2-40B4-BE49-F238E27FC236}">
+                <a16:creationId xmlns:a16="http://schemas.microsoft.com/office/drawing/2014/main" id="{1942B0ED-FBFF-4A76-9DD9-B6138F0D4D5A}"/>
+              </a:ext>
+            </a:extLst>
+          </p:cNvPr>
+          <p:cNvPicPr>
+            <a:picLocks noChangeAspect="1"/>
+          </p:cNvPicPr>
+          <p:nvPr/>
+        </p:nvPicPr>
+        <p:blipFill>
+          <a:blip r:embed="rId2"/>
+          <a:stretch>
+            <a:fillRect/>
+          </a:stretch>
+        </p:blipFill>
+        <p:spPr>
+          <a:xfrm>
+            <a:off x="0" y="0"/>
+            <a:ext cx="5567680" cy="6852530"/>
+          </a:xfrm>
+          <a:prstGeom prst="rect">
+            <a:avLst/>
+          </a:prstGeom>
+        </p:spPr>
+      </p:pic>
+      <p:pic>
+        <p:nvPicPr>
+          <p:cNvPr id="9" name="Picture 8">
+            <a:extLst>
+              <a:ext uri="{FF2B5EF4-FFF2-40B4-BE49-F238E27FC236}">
+                <a16:creationId xmlns:a16="http://schemas.microsoft.com/office/drawing/2014/main" id="{D78DAEA0-3526-44C3-BD4B-06EAC3C656A9}"/>
+              </a:ext>
+            </a:extLst>
+          </p:cNvPr>
+          <p:cNvPicPr>
+            <a:picLocks noChangeAspect="1"/>
+          </p:cNvPicPr>
+          <p:nvPr/>
+        </p:nvPicPr>
+        <p:blipFill>
+          <a:blip r:embed="rId3"/>
+          <a:stretch>
+            <a:fillRect/>
+          </a:stretch>
+        </p:blipFill>
+        <p:spPr>
+          <a:xfrm>
+            <a:off x="5644796" y="3454014"/>
+            <a:ext cx="3478884" cy="3374255"/>
+          </a:xfrm>
+          <a:prstGeom prst="rect">
+            <a:avLst/>
+          </a:prstGeom>
+        </p:spPr>
+      </p:pic>
+      <p:pic>
+        <p:nvPicPr>
+          <p:cNvPr id="11" name="Picture 10">
+            <a:extLst>
+              <a:ext uri="{FF2B5EF4-FFF2-40B4-BE49-F238E27FC236}">
+                <a16:creationId xmlns:a16="http://schemas.microsoft.com/office/drawing/2014/main" id="{76DDB02B-FA33-4F30-A5D5-CBCD230E83B5}"/>
+              </a:ext>
+            </a:extLst>
+          </p:cNvPr>
+          <p:cNvPicPr>
+            <a:picLocks noChangeAspect="1"/>
+          </p:cNvPicPr>
+          <p:nvPr/>
+        </p:nvPicPr>
+        <p:blipFill>
+          <a:blip r:embed="rId4"/>
+          <a:stretch>
+            <a:fillRect/>
+          </a:stretch>
+        </p:blipFill>
+        <p:spPr>
+          <a:xfrm>
+            <a:off x="5567680" y="57480"/>
+            <a:ext cx="6085840" cy="3346506"/>
+          </a:xfrm>
+          <a:prstGeom prst="rect">
+            <a:avLst/>
+          </a:prstGeom>
+        </p:spPr>
+      </p:pic>
+      <p:sp>
+        <p:nvSpPr>
+          <p:cNvPr id="12" name="Rectangle 11">
+            <a:extLst>
+              <a:ext uri="{FF2B5EF4-FFF2-40B4-BE49-F238E27FC236}">
+                <a16:creationId xmlns:a16="http://schemas.microsoft.com/office/drawing/2014/main" id="{0627E335-FEDD-49A0-B792-D0FE1F88F3DB}"/>
+              </a:ext>
+            </a:extLst>
+          </p:cNvPr>
+          <p:cNvSpPr/>
+          <p:nvPr/>
+        </p:nvSpPr>
+        <p:spPr>
+          <a:xfrm>
+            <a:off x="1933576" y="4075870"/>
+            <a:ext cx="419100" cy="438150"/>
+          </a:xfrm>
+          <a:prstGeom prst="rect">
+            <a:avLst/>
+          </a:prstGeom>
+          <a:noFill/>
+          <a:ln w="38100">
+            <a:solidFill>
+              <a:srgbClr val="FF0000"/>
+            </a:solidFill>
+          </a:ln>
+        </p:spPr>
+        <p:style>
+          <a:lnRef idx="2">
+            <a:schemeClr val="accent1">
+              <a:shade val="50000"/>
+            </a:schemeClr>
+          </a:lnRef>
+          <a:fillRef idx="1">
+            <a:schemeClr val="accent1"/>
+          </a:fillRef>
+          <a:effectRef idx="0">
+            <a:schemeClr val="accent1"/>
+          </a:effectRef>
+          <a:fontRef idx="minor">
+            <a:schemeClr val="lt1"/>
+          </a:fontRef>
+        </p:style>
+        <p:txBody>
+          <a:bodyPr rtlCol="0" anchor="ctr"/>
+          <a:lstStyle/>
+          <a:p>
+            <a:pPr algn="ctr"/>
+            <a:endParaRPr lang="en-US"/>
+          </a:p>
+        </p:txBody>
+      </p:sp>
+      <p:sp>
+        <p:nvSpPr>
+          <p:cNvPr id="13" name="Rectangle 12">
+            <a:extLst>
+              <a:ext uri="{FF2B5EF4-FFF2-40B4-BE49-F238E27FC236}">
+                <a16:creationId xmlns:a16="http://schemas.microsoft.com/office/drawing/2014/main" id="{1DD38293-6697-458B-AFEA-A3CB24B96780}"/>
+              </a:ext>
+            </a:extLst>
+          </p:cNvPr>
+          <p:cNvSpPr/>
+          <p:nvPr/>
+        </p:nvSpPr>
+        <p:spPr>
+          <a:xfrm>
+            <a:off x="338138" y="4514020"/>
+            <a:ext cx="419100" cy="438150"/>
+          </a:xfrm>
+          <a:prstGeom prst="rect">
+            <a:avLst/>
+          </a:prstGeom>
+          <a:noFill/>
+          <a:ln w="38100">
+            <a:solidFill>
+              <a:srgbClr val="FF0000"/>
+            </a:solidFill>
+          </a:ln>
+        </p:spPr>
+        <p:style>
+          <a:lnRef idx="2">
+            <a:schemeClr val="accent1">
+              <a:shade val="50000"/>
+            </a:schemeClr>
+          </a:lnRef>
+          <a:fillRef idx="1">
+            <a:schemeClr val="accent1"/>
+          </a:fillRef>
+          <a:effectRef idx="0">
+            <a:schemeClr val="accent1"/>
+          </a:effectRef>
+          <a:fontRef idx="minor">
+            <a:schemeClr val="lt1"/>
+          </a:fontRef>
+        </p:style>
+        <p:txBody>
+          <a:bodyPr rtlCol="0" anchor="ctr"/>
+          <a:lstStyle/>
+          <a:p>
+            <a:pPr algn="ctr"/>
+            <a:endParaRPr lang="en-US"/>
+          </a:p>
+        </p:txBody>
+      </p:sp>
+      <p:sp>
+        <p:nvSpPr>
+          <p:cNvPr id="14" name="Rectangle 13">
+            <a:extLst>
+              <a:ext uri="{FF2B5EF4-FFF2-40B4-BE49-F238E27FC236}">
+                <a16:creationId xmlns:a16="http://schemas.microsoft.com/office/drawing/2014/main" id="{7344ADAC-FF3B-42C2-8398-C1B32F631D41}"/>
+              </a:ext>
+            </a:extLst>
+          </p:cNvPr>
+          <p:cNvSpPr/>
+          <p:nvPr/>
+        </p:nvSpPr>
+        <p:spPr>
+          <a:xfrm>
+            <a:off x="8704580" y="4018224"/>
+            <a:ext cx="419100" cy="438150"/>
+          </a:xfrm>
+          <a:prstGeom prst="rect">
+            <a:avLst/>
+          </a:prstGeom>
+          <a:noFill/>
+          <a:ln w="38100">
+            <a:solidFill>
+              <a:srgbClr val="FF0000"/>
+            </a:solidFill>
+          </a:ln>
+        </p:spPr>
+        <p:style>
+          <a:lnRef idx="2">
+            <a:schemeClr val="accent1">
+              <a:shade val="50000"/>
+            </a:schemeClr>
+          </a:lnRef>
+          <a:fillRef idx="1">
+            <a:schemeClr val="accent1"/>
+          </a:fillRef>
+          <a:effectRef idx="0">
+            <a:schemeClr val="accent1"/>
+          </a:effectRef>
+          <a:fontRef idx="minor">
+            <a:schemeClr val="lt1"/>
+          </a:fontRef>
+        </p:style>
+        <p:txBody>
+          <a:bodyPr rtlCol="0" anchor="ctr"/>
+          <a:lstStyle/>
+          <a:p>
+            <a:pPr algn="ctr"/>
+            <a:endParaRPr lang="en-US"/>
+          </a:p>
+        </p:txBody>
+      </p:sp>
+      <p:sp>
+        <p:nvSpPr>
+          <p:cNvPr id="15" name="Rectangle 14">
+            <a:extLst>
+              <a:ext uri="{FF2B5EF4-FFF2-40B4-BE49-F238E27FC236}">
+                <a16:creationId xmlns:a16="http://schemas.microsoft.com/office/drawing/2014/main" id="{33CDC63A-139E-4898-B2F0-8410B13A5466}"/>
+              </a:ext>
+            </a:extLst>
+          </p:cNvPr>
+          <p:cNvSpPr/>
+          <p:nvPr/>
+        </p:nvSpPr>
+        <p:spPr>
+          <a:xfrm>
+            <a:off x="8704580" y="4690108"/>
+            <a:ext cx="419100" cy="438150"/>
+          </a:xfrm>
+          <a:prstGeom prst="rect">
+            <a:avLst/>
+          </a:prstGeom>
+          <a:noFill/>
+          <a:ln w="38100">
+            <a:solidFill>
+              <a:srgbClr val="FF0000"/>
+            </a:solidFill>
+          </a:ln>
+        </p:spPr>
+        <p:style>
+          <a:lnRef idx="2">
+            <a:schemeClr val="accent1">
+              <a:shade val="50000"/>
+            </a:schemeClr>
+          </a:lnRef>
+          <a:fillRef idx="1">
+            <a:schemeClr val="accent1"/>
+          </a:fillRef>
+          <a:effectRef idx="0">
+            <a:schemeClr val="accent1"/>
+          </a:effectRef>
+          <a:fontRef idx="minor">
+            <a:schemeClr val="lt1"/>
+          </a:fontRef>
+        </p:style>
+        <p:txBody>
+          <a:bodyPr rtlCol="0" anchor="ctr"/>
+          <a:lstStyle/>
+          <a:p>
+            <a:pPr algn="ctr"/>
+            <a:endParaRPr lang="en-US"/>
+          </a:p>
+        </p:txBody>
+      </p:sp>
+      <p:sp>
+        <p:nvSpPr>
+          <p:cNvPr id="16" name="Rectangle 15">
+            <a:extLst>
+              <a:ext uri="{FF2B5EF4-FFF2-40B4-BE49-F238E27FC236}">
+                <a16:creationId xmlns:a16="http://schemas.microsoft.com/office/drawing/2014/main" id="{D81E73E2-77A9-4654-8B7A-2EBADC75A355}"/>
+              </a:ext>
+            </a:extLst>
+          </p:cNvPr>
+          <p:cNvSpPr/>
+          <p:nvPr/>
+        </p:nvSpPr>
+        <p:spPr>
+          <a:xfrm>
+            <a:off x="2560461" y="792906"/>
+            <a:ext cx="419100" cy="438150"/>
+          </a:xfrm>
+          <a:prstGeom prst="rect">
+            <a:avLst/>
+          </a:prstGeom>
+          <a:noFill/>
+          <a:ln w="38100">
+            <a:solidFill>
+              <a:srgbClr val="FF0000"/>
+            </a:solidFill>
+          </a:ln>
+        </p:spPr>
+        <p:style>
+          <a:lnRef idx="2">
+            <a:schemeClr val="accent1">
+              <a:shade val="50000"/>
+            </a:schemeClr>
+          </a:lnRef>
+          <a:fillRef idx="1">
+            <a:schemeClr val="accent1"/>
+          </a:fillRef>
+          <a:effectRef idx="0">
+            <a:schemeClr val="accent1"/>
+          </a:effectRef>
+          <a:fontRef idx="minor">
+            <a:schemeClr val="lt1"/>
+          </a:fontRef>
+        </p:style>
+        <p:txBody>
+          <a:bodyPr rtlCol="0" anchor="ctr"/>
+          <a:lstStyle/>
+          <a:p>
+            <a:pPr algn="ctr"/>
+            <a:endParaRPr lang="en-US"/>
+          </a:p>
+        </p:txBody>
+      </p:sp>
+      <p:sp>
+        <p:nvSpPr>
+          <p:cNvPr id="17" name="Rectangle 16">
+            <a:extLst>
+              <a:ext uri="{FF2B5EF4-FFF2-40B4-BE49-F238E27FC236}">
+                <a16:creationId xmlns:a16="http://schemas.microsoft.com/office/drawing/2014/main" id="{51F433AD-4BD1-4AC7-B101-755CEFAD720C}"/>
+              </a:ext>
+            </a:extLst>
+          </p:cNvPr>
+          <p:cNvSpPr/>
+          <p:nvPr/>
+        </p:nvSpPr>
+        <p:spPr>
+          <a:xfrm>
+            <a:off x="11249624" y="1656520"/>
+            <a:ext cx="419100" cy="438150"/>
+          </a:xfrm>
+          <a:prstGeom prst="rect">
+            <a:avLst/>
+          </a:prstGeom>
+          <a:noFill/>
+          <a:ln w="38100">
+            <a:solidFill>
+              <a:srgbClr val="FF0000"/>
+            </a:solidFill>
+          </a:ln>
+        </p:spPr>
+        <p:style>
+          <a:lnRef idx="2">
+            <a:schemeClr val="accent1">
+              <a:shade val="50000"/>
+            </a:schemeClr>
+          </a:lnRef>
+          <a:fillRef idx="1">
+            <a:schemeClr val="accent1"/>
+          </a:fillRef>
+          <a:effectRef idx="0">
+            <a:schemeClr val="accent1"/>
+          </a:effectRef>
+          <a:fontRef idx="minor">
+            <a:schemeClr val="lt1"/>
+          </a:fontRef>
+        </p:style>
+        <p:txBody>
+          <a:bodyPr rtlCol="0" anchor="ctr"/>
+          <a:lstStyle/>
+          <a:p>
+            <a:pPr algn="ctr"/>
+            <a:endParaRPr lang="en-US"/>
+          </a:p>
+        </p:txBody>
+      </p:sp>
+      <p:cxnSp>
+        <p:nvCxnSpPr>
+          <p:cNvPr id="19" name="Straight Arrow Connector 18">
+            <a:extLst>
+              <a:ext uri="{FF2B5EF4-FFF2-40B4-BE49-F238E27FC236}">
+                <a16:creationId xmlns:a16="http://schemas.microsoft.com/office/drawing/2014/main" id="{9EF15BC9-EC7C-4826-AA22-2CCFC7F612BF}"/>
+              </a:ext>
+            </a:extLst>
+          </p:cNvPr>
+          <p:cNvCxnSpPr/>
+          <p:nvPr/>
+        </p:nvCxnSpPr>
+        <p:spPr>
+          <a:xfrm>
+            <a:off x="3048000" y="1123950"/>
+            <a:ext cx="7962900" cy="733425"/>
+          </a:xfrm>
+          <a:prstGeom prst="straightConnector1">
+            <a:avLst/>
+          </a:prstGeom>
+          <a:ln w="38100">
+            <a:solidFill>
+              <a:srgbClr val="FF0000"/>
+            </a:solidFill>
+            <a:tailEnd type="triangle"/>
+          </a:ln>
+        </p:spPr>
+        <p:style>
+          <a:lnRef idx="1">
+            <a:schemeClr val="accent1"/>
+          </a:lnRef>
+          <a:fillRef idx="0">
+            <a:schemeClr val="accent1"/>
+          </a:fillRef>
+          <a:effectRef idx="0">
+            <a:schemeClr val="accent1"/>
+          </a:effectRef>
+          <a:fontRef idx="minor">
+            <a:schemeClr val="tx1"/>
+          </a:fontRef>
+        </p:style>
+      </p:cxnSp>
+      <p:cxnSp>
+        <p:nvCxnSpPr>
+          <p:cNvPr id="20" name="Straight Arrow Connector 19">
+            <a:extLst>
+              <a:ext uri="{FF2B5EF4-FFF2-40B4-BE49-F238E27FC236}">
+                <a16:creationId xmlns:a16="http://schemas.microsoft.com/office/drawing/2014/main" id="{E6780AE2-5940-4500-A19D-AA9A59F6DFB2}"/>
+              </a:ext>
+            </a:extLst>
+          </p:cNvPr>
+          <p:cNvCxnSpPr>
+            <a:cxnSpLocks/>
+          </p:cNvCxnSpPr>
+          <p:nvPr/>
+        </p:nvCxnSpPr>
+        <p:spPr>
+          <a:xfrm flipV="1">
+            <a:off x="2446656" y="4255566"/>
+            <a:ext cx="6257924" cy="57646"/>
+          </a:xfrm>
+          <a:prstGeom prst="straightConnector1">
+            <a:avLst/>
+          </a:prstGeom>
+          <a:ln w="38100">
+            <a:solidFill>
+              <a:srgbClr val="FF0000"/>
+            </a:solidFill>
+            <a:tailEnd type="triangle"/>
+          </a:ln>
+        </p:spPr>
+        <p:style>
+          <a:lnRef idx="1">
+            <a:schemeClr val="accent1"/>
+          </a:lnRef>
+          <a:fillRef idx="0">
+            <a:schemeClr val="accent1"/>
+          </a:fillRef>
+          <a:effectRef idx="0">
+            <a:schemeClr val="accent1"/>
+          </a:effectRef>
+          <a:fontRef idx="minor">
+            <a:schemeClr val="tx1"/>
+          </a:fontRef>
+        </p:style>
+      </p:cxnSp>
+      <p:cxnSp>
+        <p:nvCxnSpPr>
+          <p:cNvPr id="23" name="Straight Arrow Connector 22">
+            <a:extLst>
+              <a:ext uri="{FF2B5EF4-FFF2-40B4-BE49-F238E27FC236}">
+                <a16:creationId xmlns:a16="http://schemas.microsoft.com/office/drawing/2014/main" id="{7063558D-3815-426D-BE07-14F167379C00}"/>
+              </a:ext>
+            </a:extLst>
+          </p:cNvPr>
+          <p:cNvCxnSpPr>
+            <a:cxnSpLocks/>
+          </p:cNvCxnSpPr>
+          <p:nvPr/>
+        </p:nvCxnSpPr>
+        <p:spPr>
+          <a:xfrm>
+            <a:off x="757238" y="4690109"/>
+            <a:ext cx="7930478" cy="262061"/>
+          </a:xfrm>
+          <a:prstGeom prst="straightConnector1">
+            <a:avLst/>
+          </a:prstGeom>
+          <a:ln w="38100">
+            <a:solidFill>
+              <a:srgbClr val="FF0000"/>
+            </a:solidFill>
+            <a:tailEnd type="triangle"/>
+          </a:ln>
+        </p:spPr>
+        <p:style>
+          <a:lnRef idx="1">
+            <a:schemeClr val="accent1"/>
+          </a:lnRef>
+          <a:fillRef idx="0">
+            <a:schemeClr val="accent1"/>
+          </a:fillRef>
+          <a:effectRef idx="0">
+            <a:schemeClr val="accent1"/>
+          </a:effectRef>
+          <a:fontRef idx="minor">
+            <a:schemeClr val="tx1"/>
+          </a:fontRef>
+        </p:style>
+      </p:cxnSp>
+    </p:spTree>
+    <p:extLst>
+      <p:ext uri="{BB962C8B-B14F-4D97-AF65-F5344CB8AC3E}">
+        <p14:creationId xmlns:p14="http://schemas.microsoft.com/office/powerpoint/2010/main" val="3935973818"/>
+      </p:ext>
+    </p:extLst>
+  </p:cSld>
+  <p:clrMapOvr>
+    <a:masterClrMapping/>
+  </p:clrMapOvr>
+  <p:timing>
+    <p:tnLst>
+      <p:par>
+        <p:cTn id="1" dur="indefinite" restart="never" nodeType="tmRoot">
+          <p:childTnLst>
+            <p:seq concurrent="1" nextAc="seek">
+              <p:cTn id="2" dur="indefinite" nodeType="mainSeq">
+                <p:childTnLst>
+                  <p:par>
+                    <p:cTn id="3" fill="hold">
+                      <p:stCondLst>
+                        <p:cond delay="indefinite"/>
+                      </p:stCondLst>
+                      <p:childTnLst>
+                        <p:par>
+                          <p:cTn id="4" fill="hold">
+                            <p:stCondLst>
+                              <p:cond delay="0"/>
+                            </p:stCondLst>
+                            <p:childTnLst>
+                              <p:par>
+                                <p:cTn id="5" presetID="10" presetClass="entr" presetSubtype="0" fill="hold" nodeType="clickEffect">
+                                  <p:stCondLst>
+                                    <p:cond delay="0"/>
+                                  </p:stCondLst>
+                                  <p:childTnLst>
+                                    <p:set>
+                                      <p:cBhvr>
+                                        <p:cTn id="6" dur="1" fill="hold">
+                                          <p:stCondLst>
+                                            <p:cond delay="0"/>
+                                          </p:stCondLst>
+                                        </p:cTn>
+                                        <p:tgtEl>
+                                          <p:spTgt spid="7"/>
+                                        </p:tgtEl>
+                                        <p:attrNameLst>
+                                          <p:attrName>style.visibility</p:attrName>
+                                        </p:attrNameLst>
+                                      </p:cBhvr>
+                                      <p:to>
+                                        <p:strVal val="visible"/>
+                                      </p:to>
+                                    </p:set>
+                                    <p:animEffect transition="in" filter="fade">
+                                      <p:cBhvr>
+                                        <p:cTn id="7" dur="500"/>
+                                        <p:tgtEl>
+                                          <p:spTgt spid="7"/>
+                                        </p:tgtEl>
+                                      </p:cBhvr>
+                                    </p:animEffect>
+                                  </p:childTnLst>
+                                </p:cTn>
+                              </p:par>
+                            </p:childTnLst>
+                          </p:cTn>
+                        </p:par>
+                      </p:childTnLst>
+                    </p:cTn>
+                  </p:par>
+                  <p:par>
+                    <p:cTn id="8" fill="hold">
+                      <p:stCondLst>
+                        <p:cond delay="indefinite"/>
+                      </p:stCondLst>
+                      <p:childTnLst>
+                        <p:par>
+                          <p:cTn id="9" fill="hold">
+                            <p:stCondLst>
+                              <p:cond delay="0"/>
+                            </p:stCondLst>
+                            <p:childTnLst>
+                              <p:par>
+                                <p:cTn id="10" presetID="10" presetClass="entr" presetSubtype="0" fill="hold" nodeType="clickEffect">
+                                  <p:stCondLst>
+                                    <p:cond delay="0"/>
+                                  </p:stCondLst>
+                                  <p:childTnLst>
+                                    <p:set>
+                                      <p:cBhvr>
+                                        <p:cTn id="11" dur="1" fill="hold">
+                                          <p:stCondLst>
+                                            <p:cond delay="0"/>
+                                          </p:stCondLst>
+                                        </p:cTn>
+                                        <p:tgtEl>
+                                          <p:spTgt spid="11"/>
+                                        </p:tgtEl>
+                                        <p:attrNameLst>
+                                          <p:attrName>style.visibility</p:attrName>
+                                        </p:attrNameLst>
+                                      </p:cBhvr>
+                                      <p:to>
+                                        <p:strVal val="visible"/>
+                                      </p:to>
+                                    </p:set>
+                                    <p:animEffect transition="in" filter="fade">
+                                      <p:cBhvr>
+                                        <p:cTn id="12" dur="500"/>
+                                        <p:tgtEl>
+                                          <p:spTgt spid="11"/>
+                                        </p:tgtEl>
+                                      </p:cBhvr>
+                                    </p:animEffect>
+                                  </p:childTnLst>
+                                </p:cTn>
+                              </p:par>
+                              <p:par>
+                                <p:cTn id="13" presetID="10" presetClass="entr" presetSubtype="0" fill="hold" nodeType="withEffect">
+                                  <p:stCondLst>
+                                    <p:cond delay="0"/>
+                                  </p:stCondLst>
+                                  <p:childTnLst>
+                                    <p:set>
+                                      <p:cBhvr>
+                                        <p:cTn id="14" dur="1" fill="hold">
+                                          <p:stCondLst>
+                                            <p:cond delay="0"/>
+                                          </p:stCondLst>
+                                        </p:cTn>
+                                        <p:tgtEl>
+                                          <p:spTgt spid="9"/>
+                                        </p:tgtEl>
+                                        <p:attrNameLst>
+                                          <p:attrName>style.visibility</p:attrName>
+                                        </p:attrNameLst>
+                                      </p:cBhvr>
+                                      <p:to>
+                                        <p:strVal val="visible"/>
+                                      </p:to>
+                                    </p:set>
+                                    <p:animEffect transition="in" filter="fade">
+                                      <p:cBhvr>
+                                        <p:cTn id="15" dur="500"/>
+                                        <p:tgtEl>
+                                          <p:spTgt spid="9"/>
+                                        </p:tgtEl>
+                                      </p:cBhvr>
+                                    </p:animEffect>
+                                  </p:childTnLst>
+                                </p:cTn>
+                              </p:par>
+                            </p:childTnLst>
+                          </p:cTn>
+                        </p:par>
+                      </p:childTnLst>
+                    </p:cTn>
+                  </p:par>
+                  <p:par>
+                    <p:cTn id="16" fill="hold">
+                      <p:stCondLst>
+                        <p:cond delay="indefinite"/>
+                      </p:stCondLst>
+                      <p:childTnLst>
+                        <p:par>
+                          <p:cTn id="17" fill="hold">
+                            <p:stCondLst>
+                              <p:cond delay="0"/>
+                            </p:stCondLst>
+                            <p:childTnLst>
+                              <p:par>
+                                <p:cTn id="18" presetID="42" presetClass="entr" presetSubtype="0" fill="hold" grpId="0" nodeType="clickEffect">
+                                  <p:stCondLst>
+                                    <p:cond delay="0"/>
+                                  </p:stCondLst>
+                                  <p:childTnLst>
+                                    <p:set>
+                                      <p:cBhvr>
+                                        <p:cTn id="19" dur="1" fill="hold">
+                                          <p:stCondLst>
+                                            <p:cond delay="0"/>
+                                          </p:stCondLst>
+                                        </p:cTn>
+                                        <p:tgtEl>
+                                          <p:spTgt spid="16"/>
+                                        </p:tgtEl>
+                                        <p:attrNameLst>
+                                          <p:attrName>style.visibility</p:attrName>
+                                        </p:attrNameLst>
+                                      </p:cBhvr>
+                                      <p:to>
+                                        <p:strVal val="visible"/>
+                                      </p:to>
+                                    </p:set>
+                                    <p:animEffect transition="in" filter="fade">
+                                      <p:cBhvr>
+                                        <p:cTn id="20" dur="1000"/>
+                                        <p:tgtEl>
+                                          <p:spTgt spid="16"/>
+                                        </p:tgtEl>
+                                      </p:cBhvr>
+                                    </p:animEffect>
+                                    <p:anim calcmode="lin" valueType="num">
+                                      <p:cBhvr>
+                                        <p:cTn id="21" dur="1000" fill="hold"/>
+                                        <p:tgtEl>
+                                          <p:spTgt spid="16"/>
+                                        </p:tgtEl>
+                                        <p:attrNameLst>
+                                          <p:attrName>ppt_x</p:attrName>
+                                        </p:attrNameLst>
+                                      </p:cBhvr>
+                                      <p:tavLst>
+                                        <p:tav tm="0">
+                                          <p:val>
+                                            <p:strVal val="#ppt_x"/>
+                                          </p:val>
+                                        </p:tav>
+                                        <p:tav tm="100000">
+                                          <p:val>
+                                            <p:strVal val="#ppt_x"/>
+                                          </p:val>
+                                        </p:tav>
+                                      </p:tavLst>
+                                    </p:anim>
+                                    <p:anim calcmode="lin" valueType="num">
+                                      <p:cBhvr>
+                                        <p:cTn id="22" dur="1000" fill="hold"/>
+                                        <p:tgtEl>
+                                          <p:spTgt spid="16"/>
+                                        </p:tgtEl>
+                                        <p:attrNameLst>
+                                          <p:attrName>ppt_y</p:attrName>
+                                        </p:attrNameLst>
+                                      </p:cBhvr>
+                                      <p:tavLst>
+                                        <p:tav tm="0">
+                                          <p:val>
+                                            <p:strVal val="#ppt_y+.1"/>
+                                          </p:val>
+                                        </p:tav>
+                                        <p:tav tm="100000">
+                                          <p:val>
+                                            <p:strVal val="#ppt_y"/>
+                                          </p:val>
+                                        </p:tav>
+                                      </p:tavLst>
+                                    </p:anim>
+                                  </p:childTnLst>
+                                </p:cTn>
+                              </p:par>
+                              <p:par>
+                                <p:cTn id="23" presetID="42" presetClass="entr" presetSubtype="0" fill="hold" nodeType="withEffect">
+                                  <p:stCondLst>
+                                    <p:cond delay="0"/>
+                                  </p:stCondLst>
+                                  <p:childTnLst>
+                                    <p:set>
+                                      <p:cBhvr>
+                                        <p:cTn id="24" dur="1" fill="hold">
+                                          <p:stCondLst>
+                                            <p:cond delay="0"/>
+                                          </p:stCondLst>
+                                        </p:cTn>
+                                        <p:tgtEl>
+                                          <p:spTgt spid="19"/>
+                                        </p:tgtEl>
+                                        <p:attrNameLst>
+                                          <p:attrName>style.visibility</p:attrName>
+                                        </p:attrNameLst>
+                                      </p:cBhvr>
+                                      <p:to>
+                                        <p:strVal val="visible"/>
+                                      </p:to>
+                                    </p:set>
+                                    <p:animEffect transition="in" filter="fade">
+                                      <p:cBhvr>
+                                        <p:cTn id="25" dur="1000"/>
+                                        <p:tgtEl>
+                                          <p:spTgt spid="19"/>
+                                        </p:tgtEl>
+                                      </p:cBhvr>
+                                    </p:animEffect>
+                                    <p:anim calcmode="lin" valueType="num">
+                                      <p:cBhvr>
+                                        <p:cTn id="26" dur="1000" fill="hold"/>
+                                        <p:tgtEl>
+                                          <p:spTgt spid="19"/>
+                                        </p:tgtEl>
+                                        <p:attrNameLst>
+                                          <p:attrName>ppt_x</p:attrName>
+                                        </p:attrNameLst>
+                                      </p:cBhvr>
+                                      <p:tavLst>
+                                        <p:tav tm="0">
+                                          <p:val>
+                                            <p:strVal val="#ppt_x"/>
+                                          </p:val>
+                                        </p:tav>
+                                        <p:tav tm="100000">
+                                          <p:val>
+                                            <p:strVal val="#ppt_x"/>
+                                          </p:val>
+                                        </p:tav>
+                                      </p:tavLst>
+                                    </p:anim>
+                                    <p:anim calcmode="lin" valueType="num">
+                                      <p:cBhvr>
+                                        <p:cTn id="27" dur="1000" fill="hold"/>
+                                        <p:tgtEl>
+                                          <p:spTgt spid="19"/>
+                                        </p:tgtEl>
+                                        <p:attrNameLst>
+                                          <p:attrName>ppt_y</p:attrName>
+                                        </p:attrNameLst>
+                                      </p:cBhvr>
+                                      <p:tavLst>
+                                        <p:tav tm="0">
+                                          <p:val>
+                                            <p:strVal val="#ppt_y+.1"/>
+                                          </p:val>
+                                        </p:tav>
+                                        <p:tav tm="100000">
+                                          <p:val>
+                                            <p:strVal val="#ppt_y"/>
+                                          </p:val>
+                                        </p:tav>
+                                      </p:tavLst>
+                                    </p:anim>
+                                  </p:childTnLst>
+                                </p:cTn>
+                              </p:par>
+                              <p:par>
+                                <p:cTn id="28" presetID="42" presetClass="entr" presetSubtype="0" fill="hold" grpId="0" nodeType="withEffect">
+                                  <p:stCondLst>
+                                    <p:cond delay="0"/>
+                                  </p:stCondLst>
+                                  <p:childTnLst>
+                                    <p:set>
+                                      <p:cBhvr>
+                                        <p:cTn id="29" dur="1" fill="hold">
+                                          <p:stCondLst>
+                                            <p:cond delay="0"/>
+                                          </p:stCondLst>
+                                        </p:cTn>
+                                        <p:tgtEl>
+                                          <p:spTgt spid="17"/>
+                                        </p:tgtEl>
+                                        <p:attrNameLst>
+                                          <p:attrName>style.visibility</p:attrName>
+                                        </p:attrNameLst>
+                                      </p:cBhvr>
+                                      <p:to>
+                                        <p:strVal val="visible"/>
+                                      </p:to>
+                                    </p:set>
+                                    <p:animEffect transition="in" filter="fade">
+                                      <p:cBhvr>
+                                        <p:cTn id="30" dur="1000"/>
+                                        <p:tgtEl>
+                                          <p:spTgt spid="17"/>
+                                        </p:tgtEl>
+                                      </p:cBhvr>
+                                    </p:animEffect>
+                                    <p:anim calcmode="lin" valueType="num">
+                                      <p:cBhvr>
+                                        <p:cTn id="31" dur="1000" fill="hold"/>
+                                        <p:tgtEl>
+                                          <p:spTgt spid="17"/>
+                                        </p:tgtEl>
+                                        <p:attrNameLst>
+                                          <p:attrName>ppt_x</p:attrName>
+                                        </p:attrNameLst>
+                                      </p:cBhvr>
+                                      <p:tavLst>
+                                        <p:tav tm="0">
+                                          <p:val>
+                                            <p:strVal val="#ppt_x"/>
+                                          </p:val>
+                                        </p:tav>
+                                        <p:tav tm="100000">
+                                          <p:val>
+                                            <p:strVal val="#ppt_x"/>
+                                          </p:val>
+                                        </p:tav>
+                                      </p:tavLst>
+                                    </p:anim>
+                                    <p:anim calcmode="lin" valueType="num">
+                                      <p:cBhvr>
+                                        <p:cTn id="32" dur="1000" fill="hold"/>
+                                        <p:tgtEl>
+                                          <p:spTgt spid="17"/>
+                                        </p:tgtEl>
+                                        <p:attrNameLst>
+                                          <p:attrName>ppt_y</p:attrName>
+                                        </p:attrNameLst>
+                                      </p:cBhvr>
+                                      <p:tavLst>
+                                        <p:tav tm="0">
+                                          <p:val>
+                                            <p:strVal val="#ppt_y+.1"/>
+                                          </p:val>
+                                        </p:tav>
+                                        <p:tav tm="100000">
+                                          <p:val>
+                                            <p:strVal val="#ppt_y"/>
+                                          </p:val>
+                                        </p:tav>
+                                      </p:tavLst>
+                                    </p:anim>
+                                  </p:childTnLst>
+                                </p:cTn>
+                              </p:par>
+                            </p:childTnLst>
+                          </p:cTn>
+                        </p:par>
+                      </p:childTnLst>
+                    </p:cTn>
+                  </p:par>
+                  <p:par>
+                    <p:cTn id="33" fill="hold">
+                      <p:stCondLst>
+                        <p:cond delay="indefinite"/>
+                      </p:stCondLst>
+                      <p:childTnLst>
+                        <p:par>
+                          <p:cTn id="34" fill="hold">
+                            <p:stCondLst>
+                              <p:cond delay="0"/>
+                            </p:stCondLst>
+                            <p:childTnLst>
+                              <p:par>
+                                <p:cTn id="35" presetID="42" presetClass="entr" presetSubtype="0" fill="hold" grpId="0" nodeType="clickEffect">
+                                  <p:stCondLst>
+                                    <p:cond delay="0"/>
+                                  </p:stCondLst>
+                                  <p:childTnLst>
+                                    <p:set>
+                                      <p:cBhvr>
+                                        <p:cTn id="36" dur="1" fill="hold">
+                                          <p:stCondLst>
+                                            <p:cond delay="0"/>
+                                          </p:stCondLst>
+                                        </p:cTn>
+                                        <p:tgtEl>
+                                          <p:spTgt spid="12"/>
+                                        </p:tgtEl>
+                                        <p:attrNameLst>
+                                          <p:attrName>style.visibility</p:attrName>
+                                        </p:attrNameLst>
+                                      </p:cBhvr>
+                                      <p:to>
+                                        <p:strVal val="visible"/>
+                                      </p:to>
+                                    </p:set>
+                                    <p:animEffect transition="in" filter="fade">
+                                      <p:cBhvr>
+                                        <p:cTn id="37" dur="1000"/>
+                                        <p:tgtEl>
+                                          <p:spTgt spid="12"/>
+                                        </p:tgtEl>
+                                      </p:cBhvr>
+                                    </p:animEffect>
+                                    <p:anim calcmode="lin" valueType="num">
+                                      <p:cBhvr>
+                                        <p:cTn id="38" dur="1000" fill="hold"/>
+                                        <p:tgtEl>
+                                          <p:spTgt spid="12"/>
+                                        </p:tgtEl>
+                                        <p:attrNameLst>
+                                          <p:attrName>ppt_x</p:attrName>
+                                        </p:attrNameLst>
+                                      </p:cBhvr>
+                                      <p:tavLst>
+                                        <p:tav tm="0">
+                                          <p:val>
+                                            <p:strVal val="#ppt_x"/>
+                                          </p:val>
+                                        </p:tav>
+                                        <p:tav tm="100000">
+                                          <p:val>
+                                            <p:strVal val="#ppt_x"/>
+                                          </p:val>
+                                        </p:tav>
+                                      </p:tavLst>
+                                    </p:anim>
+                                    <p:anim calcmode="lin" valueType="num">
+                                      <p:cBhvr>
+                                        <p:cTn id="39" dur="1000" fill="hold"/>
+                                        <p:tgtEl>
+                                          <p:spTgt spid="12"/>
+                                        </p:tgtEl>
+                                        <p:attrNameLst>
+                                          <p:attrName>ppt_y</p:attrName>
+                                        </p:attrNameLst>
+                                      </p:cBhvr>
+                                      <p:tavLst>
+                                        <p:tav tm="0">
+                                          <p:val>
+                                            <p:strVal val="#ppt_y+.1"/>
+                                          </p:val>
+                                        </p:tav>
+                                        <p:tav tm="100000">
+                                          <p:val>
+                                            <p:strVal val="#ppt_y"/>
+                                          </p:val>
+                                        </p:tav>
+                                      </p:tavLst>
+                                    </p:anim>
+                                  </p:childTnLst>
+                                </p:cTn>
+                              </p:par>
+                              <p:par>
+                                <p:cTn id="40" presetID="42" presetClass="entr" presetSubtype="0" fill="hold" nodeType="withEffect">
+                                  <p:stCondLst>
+                                    <p:cond delay="0"/>
+                                  </p:stCondLst>
+                                  <p:childTnLst>
+                                    <p:set>
+                                      <p:cBhvr>
+                                        <p:cTn id="41" dur="1" fill="hold">
+                                          <p:stCondLst>
+                                            <p:cond delay="0"/>
+                                          </p:stCondLst>
+                                        </p:cTn>
+                                        <p:tgtEl>
+                                          <p:spTgt spid="20"/>
+                                        </p:tgtEl>
+                                        <p:attrNameLst>
+                                          <p:attrName>style.visibility</p:attrName>
+                                        </p:attrNameLst>
+                                      </p:cBhvr>
+                                      <p:to>
+                                        <p:strVal val="visible"/>
+                                      </p:to>
+                                    </p:set>
+                                    <p:animEffect transition="in" filter="fade">
+                                      <p:cBhvr>
+                                        <p:cTn id="42" dur="1000"/>
+                                        <p:tgtEl>
+                                          <p:spTgt spid="20"/>
+                                        </p:tgtEl>
+                                      </p:cBhvr>
+                                    </p:animEffect>
+                                    <p:anim calcmode="lin" valueType="num">
+                                      <p:cBhvr>
+                                        <p:cTn id="43" dur="1000" fill="hold"/>
+                                        <p:tgtEl>
+                                          <p:spTgt spid="20"/>
+                                        </p:tgtEl>
+                                        <p:attrNameLst>
+                                          <p:attrName>ppt_x</p:attrName>
+                                        </p:attrNameLst>
+                                      </p:cBhvr>
+                                      <p:tavLst>
+                                        <p:tav tm="0">
+                                          <p:val>
+                                            <p:strVal val="#ppt_x"/>
+                                          </p:val>
+                                        </p:tav>
+                                        <p:tav tm="100000">
+                                          <p:val>
+                                            <p:strVal val="#ppt_x"/>
+                                          </p:val>
+                                        </p:tav>
+                                      </p:tavLst>
+                                    </p:anim>
+                                    <p:anim calcmode="lin" valueType="num">
+                                      <p:cBhvr>
+                                        <p:cTn id="44" dur="1000" fill="hold"/>
+                                        <p:tgtEl>
+                                          <p:spTgt spid="20"/>
+                                        </p:tgtEl>
+                                        <p:attrNameLst>
+                                          <p:attrName>ppt_y</p:attrName>
+                                        </p:attrNameLst>
+                                      </p:cBhvr>
+                                      <p:tavLst>
+                                        <p:tav tm="0">
+                                          <p:val>
+                                            <p:strVal val="#ppt_y+.1"/>
+                                          </p:val>
+                                        </p:tav>
+                                        <p:tav tm="100000">
+                                          <p:val>
+                                            <p:strVal val="#ppt_y"/>
+                                          </p:val>
+                                        </p:tav>
+                                      </p:tavLst>
+                                    </p:anim>
+                                  </p:childTnLst>
+                                </p:cTn>
+                              </p:par>
+                              <p:par>
+                                <p:cTn id="45" presetID="42" presetClass="entr" presetSubtype="0" fill="hold" grpId="0" nodeType="withEffect">
+                                  <p:stCondLst>
+                                    <p:cond delay="0"/>
+                                  </p:stCondLst>
+                                  <p:childTnLst>
+                                    <p:set>
+                                      <p:cBhvr>
+                                        <p:cTn id="46" dur="1" fill="hold">
+                                          <p:stCondLst>
+                                            <p:cond delay="0"/>
+                                          </p:stCondLst>
+                                        </p:cTn>
+                                        <p:tgtEl>
+                                          <p:spTgt spid="14"/>
+                                        </p:tgtEl>
+                                        <p:attrNameLst>
+                                          <p:attrName>style.visibility</p:attrName>
+                                        </p:attrNameLst>
+                                      </p:cBhvr>
+                                      <p:to>
+                                        <p:strVal val="visible"/>
+                                      </p:to>
+                                    </p:set>
+                                    <p:animEffect transition="in" filter="fade">
+                                      <p:cBhvr>
+                                        <p:cTn id="47" dur="1000"/>
+                                        <p:tgtEl>
+                                          <p:spTgt spid="14"/>
+                                        </p:tgtEl>
+                                      </p:cBhvr>
+                                    </p:animEffect>
+                                    <p:anim calcmode="lin" valueType="num">
+                                      <p:cBhvr>
+                                        <p:cTn id="48" dur="1000" fill="hold"/>
+                                        <p:tgtEl>
+                                          <p:spTgt spid="14"/>
+                                        </p:tgtEl>
+                                        <p:attrNameLst>
+                                          <p:attrName>ppt_x</p:attrName>
+                                        </p:attrNameLst>
+                                      </p:cBhvr>
+                                      <p:tavLst>
+                                        <p:tav tm="0">
+                                          <p:val>
+                                            <p:strVal val="#ppt_x"/>
+                                          </p:val>
+                                        </p:tav>
+                                        <p:tav tm="100000">
+                                          <p:val>
+                                            <p:strVal val="#ppt_x"/>
+                                          </p:val>
+                                        </p:tav>
+                                      </p:tavLst>
+                                    </p:anim>
+                                    <p:anim calcmode="lin" valueType="num">
+                                      <p:cBhvr>
+                                        <p:cTn id="49" dur="1000" fill="hold"/>
+                                        <p:tgtEl>
+                                          <p:spTgt spid="14"/>
+                                        </p:tgtEl>
+                                        <p:attrNameLst>
+                                          <p:attrName>ppt_y</p:attrName>
+                                        </p:attrNameLst>
+                                      </p:cBhvr>
+                                      <p:tavLst>
+                                        <p:tav tm="0">
+                                          <p:val>
+                                            <p:strVal val="#ppt_y+.1"/>
+                                          </p:val>
+                                        </p:tav>
+                                        <p:tav tm="100000">
+                                          <p:val>
+                                            <p:strVal val="#ppt_y"/>
+                                          </p:val>
+                                        </p:tav>
+                                      </p:tavLst>
+                                    </p:anim>
+                                  </p:childTnLst>
+                                </p:cTn>
+                              </p:par>
+                            </p:childTnLst>
+                          </p:cTn>
+                        </p:par>
+                      </p:childTnLst>
+                    </p:cTn>
+                  </p:par>
+                  <p:par>
+                    <p:cTn id="50" fill="hold">
+                      <p:stCondLst>
+                        <p:cond delay="indefinite"/>
+                      </p:stCondLst>
+                      <p:childTnLst>
+                        <p:par>
+                          <p:cTn id="51" fill="hold">
+                            <p:stCondLst>
+                              <p:cond delay="0"/>
+                            </p:stCondLst>
+                            <p:childTnLst>
+                              <p:par>
+                                <p:cTn id="52" presetID="42" presetClass="entr" presetSubtype="0" fill="hold" nodeType="clickEffect">
+                                  <p:stCondLst>
+                                    <p:cond delay="0"/>
+                                  </p:stCondLst>
+                                  <p:childTnLst>
+                                    <p:set>
+                                      <p:cBhvr>
+                                        <p:cTn id="53" dur="1" fill="hold">
+                                          <p:stCondLst>
+                                            <p:cond delay="0"/>
+                                          </p:stCondLst>
+                                        </p:cTn>
+                                        <p:tgtEl>
+                                          <p:spTgt spid="23"/>
+                                        </p:tgtEl>
+                                        <p:attrNameLst>
+                                          <p:attrName>style.visibility</p:attrName>
+                                        </p:attrNameLst>
+                                      </p:cBhvr>
+                                      <p:to>
+                                        <p:strVal val="visible"/>
+                                      </p:to>
+                                    </p:set>
+                                    <p:animEffect transition="in" filter="fade">
+                                      <p:cBhvr>
+                                        <p:cTn id="54" dur="1000"/>
+                                        <p:tgtEl>
+                                          <p:spTgt spid="23"/>
+                                        </p:tgtEl>
+                                      </p:cBhvr>
+                                    </p:animEffect>
+                                    <p:anim calcmode="lin" valueType="num">
+                                      <p:cBhvr>
+                                        <p:cTn id="55" dur="1000" fill="hold"/>
+                                        <p:tgtEl>
+                                          <p:spTgt spid="23"/>
+                                        </p:tgtEl>
+                                        <p:attrNameLst>
+                                          <p:attrName>ppt_x</p:attrName>
+                                        </p:attrNameLst>
+                                      </p:cBhvr>
+                                      <p:tavLst>
+                                        <p:tav tm="0">
+                                          <p:val>
+                                            <p:strVal val="#ppt_x"/>
+                                          </p:val>
+                                        </p:tav>
+                                        <p:tav tm="100000">
+                                          <p:val>
+                                            <p:strVal val="#ppt_x"/>
+                                          </p:val>
+                                        </p:tav>
+                                      </p:tavLst>
+                                    </p:anim>
+                                    <p:anim calcmode="lin" valueType="num">
+                                      <p:cBhvr>
+                                        <p:cTn id="56" dur="1000" fill="hold"/>
+                                        <p:tgtEl>
+                                          <p:spTgt spid="23"/>
+                                        </p:tgtEl>
+                                        <p:attrNameLst>
+                                          <p:attrName>ppt_y</p:attrName>
+                                        </p:attrNameLst>
+                                      </p:cBhvr>
+                                      <p:tavLst>
+                                        <p:tav tm="0">
+                                          <p:val>
+                                            <p:strVal val="#ppt_y+.1"/>
+                                          </p:val>
+                                        </p:tav>
+                                        <p:tav tm="100000">
+                                          <p:val>
+                                            <p:strVal val="#ppt_y"/>
+                                          </p:val>
+                                        </p:tav>
+                                      </p:tavLst>
+                                    </p:anim>
+                                  </p:childTnLst>
+                                </p:cTn>
+                              </p:par>
+                              <p:par>
+                                <p:cTn id="57" presetID="42" presetClass="entr" presetSubtype="0" fill="hold" grpId="0" nodeType="withEffect">
+                                  <p:stCondLst>
+                                    <p:cond delay="0"/>
+                                  </p:stCondLst>
+                                  <p:childTnLst>
+                                    <p:set>
+                                      <p:cBhvr>
+                                        <p:cTn id="58" dur="1" fill="hold">
+                                          <p:stCondLst>
+                                            <p:cond delay="0"/>
+                                          </p:stCondLst>
+                                        </p:cTn>
+                                        <p:tgtEl>
+                                          <p:spTgt spid="13"/>
+                                        </p:tgtEl>
+                                        <p:attrNameLst>
+                                          <p:attrName>style.visibility</p:attrName>
+                                        </p:attrNameLst>
+                                      </p:cBhvr>
+                                      <p:to>
+                                        <p:strVal val="visible"/>
+                                      </p:to>
+                                    </p:set>
+                                    <p:animEffect transition="in" filter="fade">
+                                      <p:cBhvr>
+                                        <p:cTn id="59" dur="1000"/>
+                                        <p:tgtEl>
+                                          <p:spTgt spid="13"/>
+                                        </p:tgtEl>
+                                      </p:cBhvr>
+                                    </p:animEffect>
+                                    <p:anim calcmode="lin" valueType="num">
+                                      <p:cBhvr>
+                                        <p:cTn id="60" dur="1000" fill="hold"/>
+                                        <p:tgtEl>
+                                          <p:spTgt spid="13"/>
+                                        </p:tgtEl>
+                                        <p:attrNameLst>
+                                          <p:attrName>ppt_x</p:attrName>
+                                        </p:attrNameLst>
+                                      </p:cBhvr>
+                                      <p:tavLst>
+                                        <p:tav tm="0">
+                                          <p:val>
+                                            <p:strVal val="#ppt_x"/>
+                                          </p:val>
+                                        </p:tav>
+                                        <p:tav tm="100000">
+                                          <p:val>
+                                            <p:strVal val="#ppt_x"/>
+                                          </p:val>
+                                        </p:tav>
+                                      </p:tavLst>
+                                    </p:anim>
+                                    <p:anim calcmode="lin" valueType="num">
+                                      <p:cBhvr>
+                                        <p:cTn id="61" dur="1000" fill="hold"/>
+                                        <p:tgtEl>
+                                          <p:spTgt spid="13"/>
+                                        </p:tgtEl>
+                                        <p:attrNameLst>
+                                          <p:attrName>ppt_y</p:attrName>
+                                        </p:attrNameLst>
+                                      </p:cBhvr>
+                                      <p:tavLst>
+                                        <p:tav tm="0">
+                                          <p:val>
+                                            <p:strVal val="#ppt_y+.1"/>
+                                          </p:val>
+                                        </p:tav>
+                                        <p:tav tm="100000">
+                                          <p:val>
+                                            <p:strVal val="#ppt_y"/>
+                                          </p:val>
+                                        </p:tav>
+                                      </p:tavLst>
+                                    </p:anim>
+                                  </p:childTnLst>
+                                </p:cTn>
+                              </p:par>
+                              <p:par>
+                                <p:cTn id="62" presetID="42" presetClass="entr" presetSubtype="0" fill="hold" grpId="0" nodeType="withEffect">
+                                  <p:stCondLst>
+                                    <p:cond delay="0"/>
+                                  </p:stCondLst>
+                                  <p:childTnLst>
+                                    <p:set>
+                                      <p:cBhvr>
+                                        <p:cTn id="63" dur="1" fill="hold">
+                                          <p:stCondLst>
+                                            <p:cond delay="0"/>
+                                          </p:stCondLst>
+                                        </p:cTn>
+                                        <p:tgtEl>
+                                          <p:spTgt spid="15"/>
+                                        </p:tgtEl>
+                                        <p:attrNameLst>
+                                          <p:attrName>style.visibility</p:attrName>
+                                        </p:attrNameLst>
+                                      </p:cBhvr>
+                                      <p:to>
+                                        <p:strVal val="visible"/>
+                                      </p:to>
+                                    </p:set>
+                                    <p:animEffect transition="in" filter="fade">
+                                      <p:cBhvr>
+                                        <p:cTn id="64" dur="1000"/>
+                                        <p:tgtEl>
+                                          <p:spTgt spid="15"/>
+                                        </p:tgtEl>
+                                      </p:cBhvr>
+                                    </p:animEffect>
+                                    <p:anim calcmode="lin" valueType="num">
+                                      <p:cBhvr>
+                                        <p:cTn id="65" dur="1000" fill="hold"/>
+                                        <p:tgtEl>
+                                          <p:spTgt spid="15"/>
+                                        </p:tgtEl>
+                                        <p:attrNameLst>
+                                          <p:attrName>ppt_x</p:attrName>
+                                        </p:attrNameLst>
+                                      </p:cBhvr>
+                                      <p:tavLst>
+                                        <p:tav tm="0">
+                                          <p:val>
+                                            <p:strVal val="#ppt_x"/>
+                                          </p:val>
+                                        </p:tav>
+                                        <p:tav tm="100000">
+                                          <p:val>
+                                            <p:strVal val="#ppt_x"/>
+                                          </p:val>
+                                        </p:tav>
+                                      </p:tavLst>
+                                    </p:anim>
+                                    <p:anim calcmode="lin" valueType="num">
+                                      <p:cBhvr>
+                                        <p:cTn id="66" dur="1000" fill="hold"/>
+                                        <p:tgtEl>
+                                          <p:spTgt spid="15"/>
+                                        </p:tgtEl>
+                                        <p:attrNameLst>
+                                          <p:attrName>ppt_y</p:attrName>
+                                        </p:attrNameLst>
+                                      </p:cBhvr>
+                                      <p:tavLst>
+                                        <p:tav tm="0">
+                                          <p:val>
+                                            <p:strVal val="#ppt_y+.1"/>
+                                          </p:val>
+                                        </p:tav>
+                                        <p:tav tm="100000">
+                                          <p:val>
+                                            <p:strVal val="#ppt_y"/>
+                                          </p:val>
+                                        </p:tav>
+                                      </p:tavLst>
+                                    </p:anim>
+                                  </p:childTnLst>
+                                </p:cTn>
+                              </p:par>
+                            </p:childTnLst>
+                          </p:cTn>
+                        </p:par>
+                      </p:childTnLst>
+                    </p:cTn>
+                  </p:par>
+                </p:childTnLst>
+              </p:cTn>
+              <p:prevCondLst>
+                <p:cond evt="onPrev" delay="0">
+                  <p:tgtEl>
+                    <p:sldTgt/>
+                  </p:tgtEl>
+                </p:cond>
+              </p:prevCondLst>
+              <p:nextCondLst>
+                <p:cond evt="onNext" delay="0">
+                  <p:tgtEl>
+                    <p:sldTgt/>
+                  </p:tgtEl>
+                </p:cond>
+              </p:nextCondLst>
+            </p:seq>
+          </p:childTnLst>
+        </p:cTn>
+      </p:par>
+    </p:tnLst>
+    <p:bldLst>
+      <p:bldP spid="12" grpId="0" animBg="1"/>
+      <p:bldP spid="13" grpId="0" animBg="1"/>
+      <p:bldP spid="14" grpId="0" animBg="1"/>
+      <p:bldP spid="15" grpId="0" animBg="1"/>
+      <p:bldP spid="16" grpId="0" animBg="1"/>
+      <p:bldP spid="17" grpId="0" animBg="1"/>
+    </p:bldLst>
+  </p:timing>
+</p:sld>
+</file>
+
 <file path=ppt/theme/theme1.xml><?xml version="1.0" encoding="utf-8"?>
 <a:theme xmlns:a="http://schemas.openxmlformats.org/drawingml/2006/main" name="Retrospect">
   <a:themeElements>

</xml_diff>

<commit_message>
Revert "pivotcharts and update files to xlsm from xlsx. bugtesting underway to ensure everything is working"
This reverts commit 9d2ade76096177b8722e415382841824c8adac1c.
</commit_message>
<xml_diff>
--- a/P0 presentation.pptx
+++ b/P0 presentation.pptx
@@ -12,7 +12,6 @@
     <p:sldId id="258" r:id="rId6"/>
     <p:sldId id="260" r:id="rId7"/>
     <p:sldId id="262" r:id="rId8"/>
-    <p:sldId id="263" r:id="rId9"/>
   </p:sldIdLst>
   <p:sldSz cx="12192000" cy="6858000"/>
   <p:notesSz cx="6858000" cy="9144000"/>
@@ -4430,7 +4429,7 @@
           <a:p>
             <a:r>
               <a:rPr lang="en-US" dirty="0"/>
-              <a:t>Menu Option for User Interface</a:t>
+              <a:t>Menu Option for UX</a:t>
             </a:r>
             <a:br>
               <a:rPr lang="en-US" dirty="0"/>
@@ -4441,10 +4440,10 @@
       </p:sp>
       <p:pic>
         <p:nvPicPr>
-          <p:cNvPr id="6" name="Content Placeholder 5" descr="Graphical user interface, text, application&#10;&#10;Description automatically generated">
+          <p:cNvPr id="7" name="Content Placeholder 6" descr="Graphical user interface, application&#10;&#10;Description automatically generated">
             <a:extLst>
               <a:ext uri="{FF2B5EF4-FFF2-40B4-BE49-F238E27FC236}">
-                <a16:creationId xmlns:a16="http://schemas.microsoft.com/office/drawing/2014/main" id="{0D288DA2-698A-4899-AAC7-7EF86DE2D7CB}"/>
+                <a16:creationId xmlns:a16="http://schemas.microsoft.com/office/drawing/2014/main" id="{360D227F-BBCD-44F7-8CC2-44756CDD7F3B}"/>
               </a:ext>
             </a:extLst>
           </p:cNvPr>
@@ -4469,12 +4468,12 @@
         </p:blipFill>
         <p:spPr>
           <a:xfrm>
-            <a:off x="2759682" y="1451857"/>
-            <a:ext cx="6672635" cy="4877187"/>
+            <a:off x="3316287" y="1737360"/>
+            <a:ext cx="6341107" cy="4634865"/>
           </a:xfrm>
           <a:ln w="38100">
             <a:solidFill>
-              <a:schemeClr val="accent1"/>
+              <a:srgbClr val="00B0F0"/>
             </a:solidFill>
           </a:ln>
         </p:spPr>
@@ -5744,148 +5743,6 @@
           </a:ln>
         </p:spPr>
       </p:pic>
-      <p:sp>
-        <p:nvSpPr>
-          <p:cNvPr id="4" name="Right Bracket 3">
-            <a:extLst>
-              <a:ext uri="{FF2B5EF4-FFF2-40B4-BE49-F238E27FC236}">
-                <a16:creationId xmlns:a16="http://schemas.microsoft.com/office/drawing/2014/main" id="{2447E070-24C5-479D-8A98-552A2ABFA279}"/>
-              </a:ext>
-            </a:extLst>
-          </p:cNvPr>
-          <p:cNvSpPr/>
-          <p:nvPr/>
-        </p:nvSpPr>
-        <p:spPr>
-          <a:xfrm>
-            <a:off x="1895475" y="1971675"/>
-            <a:ext cx="742950" cy="4343399"/>
-          </a:xfrm>
-          <a:prstGeom prst="rightBracket">
-            <a:avLst/>
-          </a:prstGeom>
-          <a:ln w="57150">
-            <a:solidFill>
-              <a:srgbClr val="FF0000"/>
-            </a:solidFill>
-          </a:ln>
-        </p:spPr>
-        <p:style>
-          <a:lnRef idx="1">
-            <a:schemeClr val="accent1"/>
-          </a:lnRef>
-          <a:fillRef idx="0">
-            <a:schemeClr val="accent1"/>
-          </a:fillRef>
-          <a:effectRef idx="0">
-            <a:schemeClr val="accent1"/>
-          </a:effectRef>
-          <a:fontRef idx="minor">
-            <a:schemeClr val="tx1"/>
-          </a:fontRef>
-        </p:style>
-        <p:txBody>
-          <a:bodyPr rtlCol="0" anchor="ctr"/>
-          <a:lstStyle/>
-          <a:p>
-            <a:pPr algn="ctr"/>
-            <a:endParaRPr lang="en-US"/>
-          </a:p>
-        </p:txBody>
-      </p:sp>
-      <p:cxnSp>
-        <p:nvCxnSpPr>
-          <p:cNvPr id="8" name="Straight Arrow Connector 7">
-            <a:extLst>
-              <a:ext uri="{FF2B5EF4-FFF2-40B4-BE49-F238E27FC236}">
-                <a16:creationId xmlns:a16="http://schemas.microsoft.com/office/drawing/2014/main" id="{0A2EA6E0-1426-45B3-95FC-3DFCC61FE1AF}"/>
-              </a:ext>
-            </a:extLst>
-          </p:cNvPr>
-          <p:cNvCxnSpPr>
-            <a:cxnSpLocks/>
-          </p:cNvCxnSpPr>
-          <p:nvPr/>
-        </p:nvCxnSpPr>
-        <p:spPr>
-          <a:xfrm flipV="1">
-            <a:off x="2847975" y="3514725"/>
-            <a:ext cx="3248025" cy="285752"/>
-          </a:xfrm>
-          <a:prstGeom prst="straightConnector1">
-            <a:avLst/>
-          </a:prstGeom>
-          <a:ln w="57150">
-            <a:solidFill>
-              <a:srgbClr val="FF0000"/>
-            </a:solidFill>
-            <a:tailEnd type="triangle"/>
-          </a:ln>
-        </p:spPr>
-        <p:style>
-          <a:lnRef idx="1">
-            <a:schemeClr val="accent1"/>
-          </a:lnRef>
-          <a:fillRef idx="0">
-            <a:schemeClr val="accent1"/>
-          </a:fillRef>
-          <a:effectRef idx="0">
-            <a:schemeClr val="accent1"/>
-          </a:effectRef>
-          <a:fontRef idx="minor">
-            <a:schemeClr val="tx1"/>
-          </a:fontRef>
-        </p:style>
-      </p:cxnSp>
-      <p:sp>
-        <p:nvSpPr>
-          <p:cNvPr id="13" name="Left Bracket 12">
-            <a:extLst>
-              <a:ext uri="{FF2B5EF4-FFF2-40B4-BE49-F238E27FC236}">
-                <a16:creationId xmlns:a16="http://schemas.microsoft.com/office/drawing/2014/main" id="{74FFCAD2-20BE-4152-B90E-94EA4D645031}"/>
-              </a:ext>
-            </a:extLst>
-          </p:cNvPr>
-          <p:cNvSpPr/>
-          <p:nvPr/>
-        </p:nvSpPr>
-        <p:spPr>
-          <a:xfrm>
-            <a:off x="6172202" y="2866031"/>
-            <a:ext cx="247650" cy="1304925"/>
-          </a:xfrm>
-          <a:prstGeom prst="leftBracket">
-            <a:avLst/>
-          </a:prstGeom>
-          <a:ln w="38100">
-            <a:solidFill>
-              <a:srgbClr val="FF0000"/>
-            </a:solidFill>
-          </a:ln>
-        </p:spPr>
-        <p:style>
-          <a:lnRef idx="1">
-            <a:schemeClr val="accent1"/>
-          </a:lnRef>
-          <a:fillRef idx="0">
-            <a:schemeClr val="accent1"/>
-          </a:fillRef>
-          <a:effectRef idx="0">
-            <a:schemeClr val="accent1"/>
-          </a:effectRef>
-          <a:fontRef idx="minor">
-            <a:schemeClr val="tx1"/>
-          </a:fontRef>
-        </p:style>
-        <p:txBody>
-          <a:bodyPr rtlCol="0" anchor="ctr"/>
-          <a:lstStyle/>
-          <a:p>
-            <a:pPr algn="ctr"/>
-            <a:endParaRPr lang="en-US"/>
-          </a:p>
-        </p:txBody>
-      </p:sp>
     </p:spTree>
     <p:extLst>
       <p:ext uri="{BB962C8B-B14F-4D97-AF65-F5344CB8AC3E}">
@@ -6010,165 +5867,6 @@
                       </p:childTnLst>
                     </p:cTn>
                   </p:par>
-                  <p:par>
-                    <p:cTn id="13" fill="hold">
-                      <p:stCondLst>
-                        <p:cond delay="indefinite"/>
-                      </p:stCondLst>
-                      <p:childTnLst>
-                        <p:par>
-                          <p:cTn id="14" fill="hold">
-                            <p:stCondLst>
-                              <p:cond delay="0"/>
-                            </p:stCondLst>
-                            <p:childTnLst>
-                              <p:par>
-                                <p:cTn id="15" presetID="10" presetClass="entr" presetSubtype="0" fill="hold" grpId="0" nodeType="clickEffect">
-                                  <p:stCondLst>
-                                    <p:cond delay="0"/>
-                                  </p:stCondLst>
-                                  <p:childTnLst>
-                                    <p:set>
-                                      <p:cBhvr>
-                                        <p:cTn id="16" dur="1" fill="hold">
-                                          <p:stCondLst>
-                                            <p:cond delay="0"/>
-                                          </p:stCondLst>
-                                        </p:cTn>
-                                        <p:tgtEl>
-                                          <p:spTgt spid="4"/>
-                                        </p:tgtEl>
-                                        <p:attrNameLst>
-                                          <p:attrName>style.visibility</p:attrName>
-                                        </p:attrNameLst>
-                                      </p:cBhvr>
-                                      <p:to>
-                                        <p:strVal val="visible"/>
-                                      </p:to>
-                                    </p:set>
-                                    <p:animEffect transition="in" filter="fade">
-                                      <p:cBhvr>
-                                        <p:cTn id="17" dur="500"/>
-                                        <p:tgtEl>
-                                          <p:spTgt spid="4"/>
-                                        </p:tgtEl>
-                                      </p:cBhvr>
-                                    </p:animEffect>
-                                  </p:childTnLst>
-                                </p:cTn>
-                              </p:par>
-                            </p:childTnLst>
-                          </p:cTn>
-                        </p:par>
-                      </p:childTnLst>
-                    </p:cTn>
-                  </p:par>
-                  <p:par>
-                    <p:cTn id="18" fill="hold">
-                      <p:stCondLst>
-                        <p:cond delay="indefinite"/>
-                      </p:stCondLst>
-                      <p:childTnLst>
-                        <p:par>
-                          <p:cTn id="19" fill="hold">
-                            <p:stCondLst>
-                              <p:cond delay="0"/>
-                            </p:stCondLst>
-                            <p:childTnLst>
-                              <p:par>
-                                <p:cTn id="20" presetID="10" presetClass="entr" presetSubtype="0" fill="hold" nodeType="clickEffect">
-                                  <p:stCondLst>
-                                    <p:cond delay="0"/>
-                                  </p:stCondLst>
-                                  <p:childTnLst>
-                                    <p:set>
-                                      <p:cBhvr>
-                                        <p:cTn id="21" dur="1" fill="hold">
-                                          <p:stCondLst>
-                                            <p:cond delay="0"/>
-                                          </p:stCondLst>
-                                        </p:cTn>
-                                        <p:tgtEl>
-                                          <p:spTgt spid="8"/>
-                                        </p:tgtEl>
-                                        <p:attrNameLst>
-                                          <p:attrName>style.visibility</p:attrName>
-                                        </p:attrNameLst>
-                                      </p:cBhvr>
-                                      <p:to>
-                                        <p:strVal val="visible"/>
-                                      </p:to>
-                                    </p:set>
-                                    <p:animEffect transition="in" filter="fade">
-                                      <p:cBhvr>
-                                        <p:cTn id="22" dur="500"/>
-                                        <p:tgtEl>
-                                          <p:spTgt spid="8"/>
-                                        </p:tgtEl>
-                                      </p:cBhvr>
-                                    </p:animEffect>
-                                  </p:childTnLst>
-                                </p:cTn>
-                              </p:par>
-                            </p:childTnLst>
-                          </p:cTn>
-                        </p:par>
-                      </p:childTnLst>
-                    </p:cTn>
-                  </p:par>
-                  <p:par>
-                    <p:cTn id="23" fill="hold">
-                      <p:stCondLst>
-                        <p:cond delay="indefinite"/>
-                      </p:stCondLst>
-                      <p:childTnLst>
-                        <p:par>
-                          <p:cTn id="24" fill="hold">
-                            <p:stCondLst>
-                              <p:cond delay="0"/>
-                            </p:stCondLst>
-                            <p:childTnLst>
-                              <p:par>
-                                <p:cTn id="25" presetID="10" presetClass="entr" presetSubtype="0" fill="hold" grpId="0" nodeType="clickEffect">
-                                  <p:stCondLst>
-                                    <p:cond delay="0"/>
-                                  </p:stCondLst>
-                                  <p:childTnLst>
-                                    <p:set>
-                                      <p:cBhvr>
-                                        <p:cTn id="26" dur="1" fill="hold">
-                                          <p:stCondLst>
-                                            <p:cond delay="0"/>
-                                          </p:stCondLst>
-                                        </p:cTn>
-                                        <p:tgtEl>
-                                          <p:spTgt spid="13"/>
-                                        </p:tgtEl>
-                                        <p:attrNameLst>
-                                          <p:attrName>style.visibility</p:attrName>
-                                        </p:attrNameLst>
-                                      </p:cBhvr>
-                                      <p:to>
-                                        <p:strVal val="visible"/>
-                                      </p:to>
-                                    </p:set>
-                                    <p:animEffect transition="in" filter="fade">
-                                      <p:cBhvr>
-                                        <p:cTn id="27" dur="500"/>
-                                        <p:tgtEl>
-                                          <p:spTgt spid="13"/>
-                                        </p:tgtEl>
-                                      </p:cBhvr>
-                                    </p:animEffect>
-                                  </p:childTnLst>
-                                </p:cTn>
-                              </p:par>
-                            </p:childTnLst>
-                          </p:cTn>
-                        </p:par>
-                      </p:childTnLst>
-                    </p:cTn>
-                  </p:par>
                 </p:childTnLst>
               </p:cTn>
               <p:prevCondLst>
@@ -6190,10 +5888,6 @@
         </p:cTn>
       </p:par>
     </p:tnLst>
-    <p:bldLst>
-      <p:bldP spid="4" grpId="0" animBg="1"/>
-      <p:bldP spid="13" grpId="0" animBg="1"/>
-    </p:bldLst>
   </p:timing>
 </p:sld>
 </file>
@@ -6971,1560 +6665,6 @@
 </p:sld>
 </file>
 
-<file path=ppt/slides/slide8.xml><?xml version="1.0" encoding="utf-8"?>
-<p:sld xmlns:a="http://schemas.openxmlformats.org/drawingml/2006/main" xmlns:r="http://schemas.openxmlformats.org/officeDocument/2006/relationships" xmlns:p="http://schemas.openxmlformats.org/presentationml/2006/main">
-  <p:cSld>
-    <p:spTree>
-      <p:nvGrpSpPr>
-        <p:cNvPr id="1" name=""/>
-        <p:cNvGrpSpPr/>
-        <p:nvPr/>
-      </p:nvGrpSpPr>
-      <p:grpSpPr>
-        <a:xfrm>
-          <a:off x="0" y="0"/>
-          <a:ext cx="0" cy="0"/>
-          <a:chOff x="0" y="0"/>
-          <a:chExt cx="0" cy="0"/>
-        </a:xfrm>
-      </p:grpSpPr>
-      <p:sp>
-        <p:nvSpPr>
-          <p:cNvPr id="2" name="Title 1">
-            <a:extLst>
-              <a:ext uri="{FF2B5EF4-FFF2-40B4-BE49-F238E27FC236}">
-                <a16:creationId xmlns:a16="http://schemas.microsoft.com/office/drawing/2014/main" id="{35F4DFF8-F9F1-49A3-8D7E-5ADB3D73907F}"/>
-              </a:ext>
-            </a:extLst>
-          </p:cNvPr>
-          <p:cNvSpPr>
-            <a:spLocks noGrp="1"/>
-          </p:cNvSpPr>
-          <p:nvPr>
-            <p:ph type="title"/>
-          </p:nvPr>
-        </p:nvSpPr>
-        <p:spPr/>
-        <p:txBody>
-          <a:bodyPr>
-            <a:normAutofit/>
-          </a:bodyPr>
-          <a:lstStyle/>
-          <a:p>
-            <a:r>
-              <a:rPr lang="en-US" sz="4000" dirty="0"/>
-              <a:t>Feature: Automatic Updating Pivot Charts For Vendor Inventory And Incoming Shipments</a:t>
-            </a:r>
-          </a:p>
-        </p:txBody>
-      </p:sp>
-      <p:pic>
-        <p:nvPicPr>
-          <p:cNvPr id="7" name="Picture 6">
-            <a:extLst>
-              <a:ext uri="{FF2B5EF4-FFF2-40B4-BE49-F238E27FC236}">
-                <a16:creationId xmlns:a16="http://schemas.microsoft.com/office/drawing/2014/main" id="{1942B0ED-FBFF-4A76-9DD9-B6138F0D4D5A}"/>
-              </a:ext>
-            </a:extLst>
-          </p:cNvPr>
-          <p:cNvPicPr>
-            <a:picLocks noChangeAspect="1"/>
-          </p:cNvPicPr>
-          <p:nvPr/>
-        </p:nvPicPr>
-        <p:blipFill>
-          <a:blip r:embed="rId2"/>
-          <a:stretch>
-            <a:fillRect/>
-          </a:stretch>
-        </p:blipFill>
-        <p:spPr>
-          <a:xfrm>
-            <a:off x="0" y="0"/>
-            <a:ext cx="5567680" cy="6852530"/>
-          </a:xfrm>
-          <a:prstGeom prst="rect">
-            <a:avLst/>
-          </a:prstGeom>
-        </p:spPr>
-      </p:pic>
-      <p:pic>
-        <p:nvPicPr>
-          <p:cNvPr id="9" name="Picture 8">
-            <a:extLst>
-              <a:ext uri="{FF2B5EF4-FFF2-40B4-BE49-F238E27FC236}">
-                <a16:creationId xmlns:a16="http://schemas.microsoft.com/office/drawing/2014/main" id="{D78DAEA0-3526-44C3-BD4B-06EAC3C656A9}"/>
-              </a:ext>
-            </a:extLst>
-          </p:cNvPr>
-          <p:cNvPicPr>
-            <a:picLocks noChangeAspect="1"/>
-          </p:cNvPicPr>
-          <p:nvPr/>
-        </p:nvPicPr>
-        <p:blipFill>
-          <a:blip r:embed="rId3"/>
-          <a:stretch>
-            <a:fillRect/>
-          </a:stretch>
-        </p:blipFill>
-        <p:spPr>
-          <a:xfrm>
-            <a:off x="5644796" y="3454014"/>
-            <a:ext cx="3478884" cy="3374255"/>
-          </a:xfrm>
-          <a:prstGeom prst="rect">
-            <a:avLst/>
-          </a:prstGeom>
-        </p:spPr>
-      </p:pic>
-      <p:pic>
-        <p:nvPicPr>
-          <p:cNvPr id="11" name="Picture 10">
-            <a:extLst>
-              <a:ext uri="{FF2B5EF4-FFF2-40B4-BE49-F238E27FC236}">
-                <a16:creationId xmlns:a16="http://schemas.microsoft.com/office/drawing/2014/main" id="{76DDB02B-FA33-4F30-A5D5-CBCD230E83B5}"/>
-              </a:ext>
-            </a:extLst>
-          </p:cNvPr>
-          <p:cNvPicPr>
-            <a:picLocks noChangeAspect="1"/>
-          </p:cNvPicPr>
-          <p:nvPr/>
-        </p:nvPicPr>
-        <p:blipFill>
-          <a:blip r:embed="rId4"/>
-          <a:stretch>
-            <a:fillRect/>
-          </a:stretch>
-        </p:blipFill>
-        <p:spPr>
-          <a:xfrm>
-            <a:off x="5567680" y="57480"/>
-            <a:ext cx="6085840" cy="3346506"/>
-          </a:xfrm>
-          <a:prstGeom prst="rect">
-            <a:avLst/>
-          </a:prstGeom>
-        </p:spPr>
-      </p:pic>
-      <p:sp>
-        <p:nvSpPr>
-          <p:cNvPr id="12" name="Rectangle 11">
-            <a:extLst>
-              <a:ext uri="{FF2B5EF4-FFF2-40B4-BE49-F238E27FC236}">
-                <a16:creationId xmlns:a16="http://schemas.microsoft.com/office/drawing/2014/main" id="{0627E335-FEDD-49A0-B792-D0FE1F88F3DB}"/>
-              </a:ext>
-            </a:extLst>
-          </p:cNvPr>
-          <p:cNvSpPr/>
-          <p:nvPr/>
-        </p:nvSpPr>
-        <p:spPr>
-          <a:xfrm>
-            <a:off x="1933576" y="4075870"/>
-            <a:ext cx="419100" cy="438150"/>
-          </a:xfrm>
-          <a:prstGeom prst="rect">
-            <a:avLst/>
-          </a:prstGeom>
-          <a:noFill/>
-          <a:ln w="38100">
-            <a:solidFill>
-              <a:srgbClr val="FF0000"/>
-            </a:solidFill>
-          </a:ln>
-        </p:spPr>
-        <p:style>
-          <a:lnRef idx="2">
-            <a:schemeClr val="accent1">
-              <a:shade val="50000"/>
-            </a:schemeClr>
-          </a:lnRef>
-          <a:fillRef idx="1">
-            <a:schemeClr val="accent1"/>
-          </a:fillRef>
-          <a:effectRef idx="0">
-            <a:schemeClr val="accent1"/>
-          </a:effectRef>
-          <a:fontRef idx="minor">
-            <a:schemeClr val="lt1"/>
-          </a:fontRef>
-        </p:style>
-        <p:txBody>
-          <a:bodyPr rtlCol="0" anchor="ctr"/>
-          <a:lstStyle/>
-          <a:p>
-            <a:pPr algn="ctr"/>
-            <a:endParaRPr lang="en-US"/>
-          </a:p>
-        </p:txBody>
-      </p:sp>
-      <p:sp>
-        <p:nvSpPr>
-          <p:cNvPr id="13" name="Rectangle 12">
-            <a:extLst>
-              <a:ext uri="{FF2B5EF4-FFF2-40B4-BE49-F238E27FC236}">
-                <a16:creationId xmlns:a16="http://schemas.microsoft.com/office/drawing/2014/main" id="{1DD38293-6697-458B-AFEA-A3CB24B96780}"/>
-              </a:ext>
-            </a:extLst>
-          </p:cNvPr>
-          <p:cNvSpPr/>
-          <p:nvPr/>
-        </p:nvSpPr>
-        <p:spPr>
-          <a:xfrm>
-            <a:off x="338138" y="4514020"/>
-            <a:ext cx="419100" cy="438150"/>
-          </a:xfrm>
-          <a:prstGeom prst="rect">
-            <a:avLst/>
-          </a:prstGeom>
-          <a:noFill/>
-          <a:ln w="38100">
-            <a:solidFill>
-              <a:srgbClr val="FF0000"/>
-            </a:solidFill>
-          </a:ln>
-        </p:spPr>
-        <p:style>
-          <a:lnRef idx="2">
-            <a:schemeClr val="accent1">
-              <a:shade val="50000"/>
-            </a:schemeClr>
-          </a:lnRef>
-          <a:fillRef idx="1">
-            <a:schemeClr val="accent1"/>
-          </a:fillRef>
-          <a:effectRef idx="0">
-            <a:schemeClr val="accent1"/>
-          </a:effectRef>
-          <a:fontRef idx="minor">
-            <a:schemeClr val="lt1"/>
-          </a:fontRef>
-        </p:style>
-        <p:txBody>
-          <a:bodyPr rtlCol="0" anchor="ctr"/>
-          <a:lstStyle/>
-          <a:p>
-            <a:pPr algn="ctr"/>
-            <a:endParaRPr lang="en-US"/>
-          </a:p>
-        </p:txBody>
-      </p:sp>
-      <p:sp>
-        <p:nvSpPr>
-          <p:cNvPr id="14" name="Rectangle 13">
-            <a:extLst>
-              <a:ext uri="{FF2B5EF4-FFF2-40B4-BE49-F238E27FC236}">
-                <a16:creationId xmlns:a16="http://schemas.microsoft.com/office/drawing/2014/main" id="{7344ADAC-FF3B-42C2-8398-C1B32F631D41}"/>
-              </a:ext>
-            </a:extLst>
-          </p:cNvPr>
-          <p:cNvSpPr/>
-          <p:nvPr/>
-        </p:nvSpPr>
-        <p:spPr>
-          <a:xfrm>
-            <a:off x="8704580" y="4018224"/>
-            <a:ext cx="419100" cy="438150"/>
-          </a:xfrm>
-          <a:prstGeom prst="rect">
-            <a:avLst/>
-          </a:prstGeom>
-          <a:noFill/>
-          <a:ln w="38100">
-            <a:solidFill>
-              <a:srgbClr val="FF0000"/>
-            </a:solidFill>
-          </a:ln>
-        </p:spPr>
-        <p:style>
-          <a:lnRef idx="2">
-            <a:schemeClr val="accent1">
-              <a:shade val="50000"/>
-            </a:schemeClr>
-          </a:lnRef>
-          <a:fillRef idx="1">
-            <a:schemeClr val="accent1"/>
-          </a:fillRef>
-          <a:effectRef idx="0">
-            <a:schemeClr val="accent1"/>
-          </a:effectRef>
-          <a:fontRef idx="minor">
-            <a:schemeClr val="lt1"/>
-          </a:fontRef>
-        </p:style>
-        <p:txBody>
-          <a:bodyPr rtlCol="0" anchor="ctr"/>
-          <a:lstStyle/>
-          <a:p>
-            <a:pPr algn="ctr"/>
-            <a:endParaRPr lang="en-US"/>
-          </a:p>
-        </p:txBody>
-      </p:sp>
-      <p:sp>
-        <p:nvSpPr>
-          <p:cNvPr id="15" name="Rectangle 14">
-            <a:extLst>
-              <a:ext uri="{FF2B5EF4-FFF2-40B4-BE49-F238E27FC236}">
-                <a16:creationId xmlns:a16="http://schemas.microsoft.com/office/drawing/2014/main" id="{33CDC63A-139E-4898-B2F0-8410B13A5466}"/>
-              </a:ext>
-            </a:extLst>
-          </p:cNvPr>
-          <p:cNvSpPr/>
-          <p:nvPr/>
-        </p:nvSpPr>
-        <p:spPr>
-          <a:xfrm>
-            <a:off x="8704580" y="4690108"/>
-            <a:ext cx="419100" cy="438150"/>
-          </a:xfrm>
-          <a:prstGeom prst="rect">
-            <a:avLst/>
-          </a:prstGeom>
-          <a:noFill/>
-          <a:ln w="38100">
-            <a:solidFill>
-              <a:srgbClr val="FF0000"/>
-            </a:solidFill>
-          </a:ln>
-        </p:spPr>
-        <p:style>
-          <a:lnRef idx="2">
-            <a:schemeClr val="accent1">
-              <a:shade val="50000"/>
-            </a:schemeClr>
-          </a:lnRef>
-          <a:fillRef idx="1">
-            <a:schemeClr val="accent1"/>
-          </a:fillRef>
-          <a:effectRef idx="0">
-            <a:schemeClr val="accent1"/>
-          </a:effectRef>
-          <a:fontRef idx="minor">
-            <a:schemeClr val="lt1"/>
-          </a:fontRef>
-        </p:style>
-        <p:txBody>
-          <a:bodyPr rtlCol="0" anchor="ctr"/>
-          <a:lstStyle/>
-          <a:p>
-            <a:pPr algn="ctr"/>
-            <a:endParaRPr lang="en-US"/>
-          </a:p>
-        </p:txBody>
-      </p:sp>
-      <p:sp>
-        <p:nvSpPr>
-          <p:cNvPr id="16" name="Rectangle 15">
-            <a:extLst>
-              <a:ext uri="{FF2B5EF4-FFF2-40B4-BE49-F238E27FC236}">
-                <a16:creationId xmlns:a16="http://schemas.microsoft.com/office/drawing/2014/main" id="{D81E73E2-77A9-4654-8B7A-2EBADC75A355}"/>
-              </a:ext>
-            </a:extLst>
-          </p:cNvPr>
-          <p:cNvSpPr/>
-          <p:nvPr/>
-        </p:nvSpPr>
-        <p:spPr>
-          <a:xfrm>
-            <a:off x="2560461" y="792906"/>
-            <a:ext cx="419100" cy="438150"/>
-          </a:xfrm>
-          <a:prstGeom prst="rect">
-            <a:avLst/>
-          </a:prstGeom>
-          <a:noFill/>
-          <a:ln w="38100">
-            <a:solidFill>
-              <a:srgbClr val="FF0000"/>
-            </a:solidFill>
-          </a:ln>
-        </p:spPr>
-        <p:style>
-          <a:lnRef idx="2">
-            <a:schemeClr val="accent1">
-              <a:shade val="50000"/>
-            </a:schemeClr>
-          </a:lnRef>
-          <a:fillRef idx="1">
-            <a:schemeClr val="accent1"/>
-          </a:fillRef>
-          <a:effectRef idx="0">
-            <a:schemeClr val="accent1"/>
-          </a:effectRef>
-          <a:fontRef idx="minor">
-            <a:schemeClr val="lt1"/>
-          </a:fontRef>
-        </p:style>
-        <p:txBody>
-          <a:bodyPr rtlCol="0" anchor="ctr"/>
-          <a:lstStyle/>
-          <a:p>
-            <a:pPr algn="ctr"/>
-            <a:endParaRPr lang="en-US"/>
-          </a:p>
-        </p:txBody>
-      </p:sp>
-      <p:sp>
-        <p:nvSpPr>
-          <p:cNvPr id="17" name="Rectangle 16">
-            <a:extLst>
-              <a:ext uri="{FF2B5EF4-FFF2-40B4-BE49-F238E27FC236}">
-                <a16:creationId xmlns:a16="http://schemas.microsoft.com/office/drawing/2014/main" id="{51F433AD-4BD1-4AC7-B101-755CEFAD720C}"/>
-              </a:ext>
-            </a:extLst>
-          </p:cNvPr>
-          <p:cNvSpPr/>
-          <p:nvPr/>
-        </p:nvSpPr>
-        <p:spPr>
-          <a:xfrm>
-            <a:off x="11249624" y="1656520"/>
-            <a:ext cx="419100" cy="438150"/>
-          </a:xfrm>
-          <a:prstGeom prst="rect">
-            <a:avLst/>
-          </a:prstGeom>
-          <a:noFill/>
-          <a:ln w="38100">
-            <a:solidFill>
-              <a:srgbClr val="FF0000"/>
-            </a:solidFill>
-          </a:ln>
-        </p:spPr>
-        <p:style>
-          <a:lnRef idx="2">
-            <a:schemeClr val="accent1">
-              <a:shade val="50000"/>
-            </a:schemeClr>
-          </a:lnRef>
-          <a:fillRef idx="1">
-            <a:schemeClr val="accent1"/>
-          </a:fillRef>
-          <a:effectRef idx="0">
-            <a:schemeClr val="accent1"/>
-          </a:effectRef>
-          <a:fontRef idx="minor">
-            <a:schemeClr val="lt1"/>
-          </a:fontRef>
-        </p:style>
-        <p:txBody>
-          <a:bodyPr rtlCol="0" anchor="ctr"/>
-          <a:lstStyle/>
-          <a:p>
-            <a:pPr algn="ctr"/>
-            <a:endParaRPr lang="en-US"/>
-          </a:p>
-        </p:txBody>
-      </p:sp>
-      <p:cxnSp>
-        <p:nvCxnSpPr>
-          <p:cNvPr id="19" name="Straight Arrow Connector 18">
-            <a:extLst>
-              <a:ext uri="{FF2B5EF4-FFF2-40B4-BE49-F238E27FC236}">
-                <a16:creationId xmlns:a16="http://schemas.microsoft.com/office/drawing/2014/main" id="{9EF15BC9-EC7C-4826-AA22-2CCFC7F612BF}"/>
-              </a:ext>
-            </a:extLst>
-          </p:cNvPr>
-          <p:cNvCxnSpPr/>
-          <p:nvPr/>
-        </p:nvCxnSpPr>
-        <p:spPr>
-          <a:xfrm>
-            <a:off x="3048000" y="1123950"/>
-            <a:ext cx="7962900" cy="733425"/>
-          </a:xfrm>
-          <a:prstGeom prst="straightConnector1">
-            <a:avLst/>
-          </a:prstGeom>
-          <a:ln w="38100">
-            <a:solidFill>
-              <a:srgbClr val="FF0000"/>
-            </a:solidFill>
-            <a:tailEnd type="triangle"/>
-          </a:ln>
-        </p:spPr>
-        <p:style>
-          <a:lnRef idx="1">
-            <a:schemeClr val="accent1"/>
-          </a:lnRef>
-          <a:fillRef idx="0">
-            <a:schemeClr val="accent1"/>
-          </a:fillRef>
-          <a:effectRef idx="0">
-            <a:schemeClr val="accent1"/>
-          </a:effectRef>
-          <a:fontRef idx="minor">
-            <a:schemeClr val="tx1"/>
-          </a:fontRef>
-        </p:style>
-      </p:cxnSp>
-      <p:cxnSp>
-        <p:nvCxnSpPr>
-          <p:cNvPr id="20" name="Straight Arrow Connector 19">
-            <a:extLst>
-              <a:ext uri="{FF2B5EF4-FFF2-40B4-BE49-F238E27FC236}">
-                <a16:creationId xmlns:a16="http://schemas.microsoft.com/office/drawing/2014/main" id="{E6780AE2-5940-4500-A19D-AA9A59F6DFB2}"/>
-              </a:ext>
-            </a:extLst>
-          </p:cNvPr>
-          <p:cNvCxnSpPr>
-            <a:cxnSpLocks/>
-          </p:cNvCxnSpPr>
-          <p:nvPr/>
-        </p:nvCxnSpPr>
-        <p:spPr>
-          <a:xfrm flipV="1">
-            <a:off x="2446656" y="4255566"/>
-            <a:ext cx="6257924" cy="57646"/>
-          </a:xfrm>
-          <a:prstGeom prst="straightConnector1">
-            <a:avLst/>
-          </a:prstGeom>
-          <a:ln w="38100">
-            <a:solidFill>
-              <a:srgbClr val="FF0000"/>
-            </a:solidFill>
-            <a:tailEnd type="triangle"/>
-          </a:ln>
-        </p:spPr>
-        <p:style>
-          <a:lnRef idx="1">
-            <a:schemeClr val="accent1"/>
-          </a:lnRef>
-          <a:fillRef idx="0">
-            <a:schemeClr val="accent1"/>
-          </a:fillRef>
-          <a:effectRef idx="0">
-            <a:schemeClr val="accent1"/>
-          </a:effectRef>
-          <a:fontRef idx="minor">
-            <a:schemeClr val="tx1"/>
-          </a:fontRef>
-        </p:style>
-      </p:cxnSp>
-      <p:cxnSp>
-        <p:nvCxnSpPr>
-          <p:cNvPr id="23" name="Straight Arrow Connector 22">
-            <a:extLst>
-              <a:ext uri="{FF2B5EF4-FFF2-40B4-BE49-F238E27FC236}">
-                <a16:creationId xmlns:a16="http://schemas.microsoft.com/office/drawing/2014/main" id="{7063558D-3815-426D-BE07-14F167379C00}"/>
-              </a:ext>
-            </a:extLst>
-          </p:cNvPr>
-          <p:cNvCxnSpPr>
-            <a:cxnSpLocks/>
-          </p:cNvCxnSpPr>
-          <p:nvPr/>
-        </p:nvCxnSpPr>
-        <p:spPr>
-          <a:xfrm>
-            <a:off x="757238" y="4690109"/>
-            <a:ext cx="7930478" cy="262061"/>
-          </a:xfrm>
-          <a:prstGeom prst="straightConnector1">
-            <a:avLst/>
-          </a:prstGeom>
-          <a:ln w="38100">
-            <a:solidFill>
-              <a:srgbClr val="FF0000"/>
-            </a:solidFill>
-            <a:tailEnd type="triangle"/>
-          </a:ln>
-        </p:spPr>
-        <p:style>
-          <a:lnRef idx="1">
-            <a:schemeClr val="accent1"/>
-          </a:lnRef>
-          <a:fillRef idx="0">
-            <a:schemeClr val="accent1"/>
-          </a:fillRef>
-          <a:effectRef idx="0">
-            <a:schemeClr val="accent1"/>
-          </a:effectRef>
-          <a:fontRef idx="minor">
-            <a:schemeClr val="tx1"/>
-          </a:fontRef>
-        </p:style>
-      </p:cxnSp>
-    </p:spTree>
-    <p:extLst>
-      <p:ext uri="{BB962C8B-B14F-4D97-AF65-F5344CB8AC3E}">
-        <p14:creationId xmlns:p14="http://schemas.microsoft.com/office/powerpoint/2010/main" val="3935973818"/>
-      </p:ext>
-    </p:extLst>
-  </p:cSld>
-  <p:clrMapOvr>
-    <a:masterClrMapping/>
-  </p:clrMapOvr>
-  <p:timing>
-    <p:tnLst>
-      <p:par>
-        <p:cTn id="1" dur="indefinite" restart="never" nodeType="tmRoot">
-          <p:childTnLst>
-            <p:seq concurrent="1" nextAc="seek">
-              <p:cTn id="2" dur="indefinite" nodeType="mainSeq">
-                <p:childTnLst>
-                  <p:par>
-                    <p:cTn id="3" fill="hold">
-                      <p:stCondLst>
-                        <p:cond delay="indefinite"/>
-                      </p:stCondLst>
-                      <p:childTnLst>
-                        <p:par>
-                          <p:cTn id="4" fill="hold">
-                            <p:stCondLst>
-                              <p:cond delay="0"/>
-                            </p:stCondLst>
-                            <p:childTnLst>
-                              <p:par>
-                                <p:cTn id="5" presetID="10" presetClass="entr" presetSubtype="0" fill="hold" nodeType="clickEffect">
-                                  <p:stCondLst>
-                                    <p:cond delay="0"/>
-                                  </p:stCondLst>
-                                  <p:childTnLst>
-                                    <p:set>
-                                      <p:cBhvr>
-                                        <p:cTn id="6" dur="1" fill="hold">
-                                          <p:stCondLst>
-                                            <p:cond delay="0"/>
-                                          </p:stCondLst>
-                                        </p:cTn>
-                                        <p:tgtEl>
-                                          <p:spTgt spid="7"/>
-                                        </p:tgtEl>
-                                        <p:attrNameLst>
-                                          <p:attrName>style.visibility</p:attrName>
-                                        </p:attrNameLst>
-                                      </p:cBhvr>
-                                      <p:to>
-                                        <p:strVal val="visible"/>
-                                      </p:to>
-                                    </p:set>
-                                    <p:animEffect transition="in" filter="fade">
-                                      <p:cBhvr>
-                                        <p:cTn id="7" dur="500"/>
-                                        <p:tgtEl>
-                                          <p:spTgt spid="7"/>
-                                        </p:tgtEl>
-                                      </p:cBhvr>
-                                    </p:animEffect>
-                                  </p:childTnLst>
-                                </p:cTn>
-                              </p:par>
-                            </p:childTnLst>
-                          </p:cTn>
-                        </p:par>
-                      </p:childTnLst>
-                    </p:cTn>
-                  </p:par>
-                  <p:par>
-                    <p:cTn id="8" fill="hold">
-                      <p:stCondLst>
-                        <p:cond delay="indefinite"/>
-                      </p:stCondLst>
-                      <p:childTnLst>
-                        <p:par>
-                          <p:cTn id="9" fill="hold">
-                            <p:stCondLst>
-                              <p:cond delay="0"/>
-                            </p:stCondLst>
-                            <p:childTnLst>
-                              <p:par>
-                                <p:cTn id="10" presetID="10" presetClass="entr" presetSubtype="0" fill="hold" nodeType="clickEffect">
-                                  <p:stCondLst>
-                                    <p:cond delay="0"/>
-                                  </p:stCondLst>
-                                  <p:childTnLst>
-                                    <p:set>
-                                      <p:cBhvr>
-                                        <p:cTn id="11" dur="1" fill="hold">
-                                          <p:stCondLst>
-                                            <p:cond delay="0"/>
-                                          </p:stCondLst>
-                                        </p:cTn>
-                                        <p:tgtEl>
-                                          <p:spTgt spid="11"/>
-                                        </p:tgtEl>
-                                        <p:attrNameLst>
-                                          <p:attrName>style.visibility</p:attrName>
-                                        </p:attrNameLst>
-                                      </p:cBhvr>
-                                      <p:to>
-                                        <p:strVal val="visible"/>
-                                      </p:to>
-                                    </p:set>
-                                    <p:animEffect transition="in" filter="fade">
-                                      <p:cBhvr>
-                                        <p:cTn id="12" dur="500"/>
-                                        <p:tgtEl>
-                                          <p:spTgt spid="11"/>
-                                        </p:tgtEl>
-                                      </p:cBhvr>
-                                    </p:animEffect>
-                                  </p:childTnLst>
-                                </p:cTn>
-                              </p:par>
-                              <p:par>
-                                <p:cTn id="13" presetID="10" presetClass="entr" presetSubtype="0" fill="hold" nodeType="withEffect">
-                                  <p:stCondLst>
-                                    <p:cond delay="0"/>
-                                  </p:stCondLst>
-                                  <p:childTnLst>
-                                    <p:set>
-                                      <p:cBhvr>
-                                        <p:cTn id="14" dur="1" fill="hold">
-                                          <p:stCondLst>
-                                            <p:cond delay="0"/>
-                                          </p:stCondLst>
-                                        </p:cTn>
-                                        <p:tgtEl>
-                                          <p:spTgt spid="9"/>
-                                        </p:tgtEl>
-                                        <p:attrNameLst>
-                                          <p:attrName>style.visibility</p:attrName>
-                                        </p:attrNameLst>
-                                      </p:cBhvr>
-                                      <p:to>
-                                        <p:strVal val="visible"/>
-                                      </p:to>
-                                    </p:set>
-                                    <p:animEffect transition="in" filter="fade">
-                                      <p:cBhvr>
-                                        <p:cTn id="15" dur="500"/>
-                                        <p:tgtEl>
-                                          <p:spTgt spid="9"/>
-                                        </p:tgtEl>
-                                      </p:cBhvr>
-                                    </p:animEffect>
-                                  </p:childTnLst>
-                                </p:cTn>
-                              </p:par>
-                            </p:childTnLst>
-                          </p:cTn>
-                        </p:par>
-                      </p:childTnLst>
-                    </p:cTn>
-                  </p:par>
-                  <p:par>
-                    <p:cTn id="16" fill="hold">
-                      <p:stCondLst>
-                        <p:cond delay="indefinite"/>
-                      </p:stCondLst>
-                      <p:childTnLst>
-                        <p:par>
-                          <p:cTn id="17" fill="hold">
-                            <p:stCondLst>
-                              <p:cond delay="0"/>
-                            </p:stCondLst>
-                            <p:childTnLst>
-                              <p:par>
-                                <p:cTn id="18" presetID="42" presetClass="entr" presetSubtype="0" fill="hold" grpId="0" nodeType="clickEffect">
-                                  <p:stCondLst>
-                                    <p:cond delay="0"/>
-                                  </p:stCondLst>
-                                  <p:childTnLst>
-                                    <p:set>
-                                      <p:cBhvr>
-                                        <p:cTn id="19" dur="1" fill="hold">
-                                          <p:stCondLst>
-                                            <p:cond delay="0"/>
-                                          </p:stCondLst>
-                                        </p:cTn>
-                                        <p:tgtEl>
-                                          <p:spTgt spid="16"/>
-                                        </p:tgtEl>
-                                        <p:attrNameLst>
-                                          <p:attrName>style.visibility</p:attrName>
-                                        </p:attrNameLst>
-                                      </p:cBhvr>
-                                      <p:to>
-                                        <p:strVal val="visible"/>
-                                      </p:to>
-                                    </p:set>
-                                    <p:animEffect transition="in" filter="fade">
-                                      <p:cBhvr>
-                                        <p:cTn id="20" dur="1000"/>
-                                        <p:tgtEl>
-                                          <p:spTgt spid="16"/>
-                                        </p:tgtEl>
-                                      </p:cBhvr>
-                                    </p:animEffect>
-                                    <p:anim calcmode="lin" valueType="num">
-                                      <p:cBhvr>
-                                        <p:cTn id="21" dur="1000" fill="hold"/>
-                                        <p:tgtEl>
-                                          <p:spTgt spid="16"/>
-                                        </p:tgtEl>
-                                        <p:attrNameLst>
-                                          <p:attrName>ppt_x</p:attrName>
-                                        </p:attrNameLst>
-                                      </p:cBhvr>
-                                      <p:tavLst>
-                                        <p:tav tm="0">
-                                          <p:val>
-                                            <p:strVal val="#ppt_x"/>
-                                          </p:val>
-                                        </p:tav>
-                                        <p:tav tm="100000">
-                                          <p:val>
-                                            <p:strVal val="#ppt_x"/>
-                                          </p:val>
-                                        </p:tav>
-                                      </p:tavLst>
-                                    </p:anim>
-                                    <p:anim calcmode="lin" valueType="num">
-                                      <p:cBhvr>
-                                        <p:cTn id="22" dur="1000" fill="hold"/>
-                                        <p:tgtEl>
-                                          <p:spTgt spid="16"/>
-                                        </p:tgtEl>
-                                        <p:attrNameLst>
-                                          <p:attrName>ppt_y</p:attrName>
-                                        </p:attrNameLst>
-                                      </p:cBhvr>
-                                      <p:tavLst>
-                                        <p:tav tm="0">
-                                          <p:val>
-                                            <p:strVal val="#ppt_y+.1"/>
-                                          </p:val>
-                                        </p:tav>
-                                        <p:tav tm="100000">
-                                          <p:val>
-                                            <p:strVal val="#ppt_y"/>
-                                          </p:val>
-                                        </p:tav>
-                                      </p:tavLst>
-                                    </p:anim>
-                                  </p:childTnLst>
-                                </p:cTn>
-                              </p:par>
-                              <p:par>
-                                <p:cTn id="23" presetID="42" presetClass="entr" presetSubtype="0" fill="hold" nodeType="withEffect">
-                                  <p:stCondLst>
-                                    <p:cond delay="0"/>
-                                  </p:stCondLst>
-                                  <p:childTnLst>
-                                    <p:set>
-                                      <p:cBhvr>
-                                        <p:cTn id="24" dur="1" fill="hold">
-                                          <p:stCondLst>
-                                            <p:cond delay="0"/>
-                                          </p:stCondLst>
-                                        </p:cTn>
-                                        <p:tgtEl>
-                                          <p:spTgt spid="19"/>
-                                        </p:tgtEl>
-                                        <p:attrNameLst>
-                                          <p:attrName>style.visibility</p:attrName>
-                                        </p:attrNameLst>
-                                      </p:cBhvr>
-                                      <p:to>
-                                        <p:strVal val="visible"/>
-                                      </p:to>
-                                    </p:set>
-                                    <p:animEffect transition="in" filter="fade">
-                                      <p:cBhvr>
-                                        <p:cTn id="25" dur="1000"/>
-                                        <p:tgtEl>
-                                          <p:spTgt spid="19"/>
-                                        </p:tgtEl>
-                                      </p:cBhvr>
-                                    </p:animEffect>
-                                    <p:anim calcmode="lin" valueType="num">
-                                      <p:cBhvr>
-                                        <p:cTn id="26" dur="1000" fill="hold"/>
-                                        <p:tgtEl>
-                                          <p:spTgt spid="19"/>
-                                        </p:tgtEl>
-                                        <p:attrNameLst>
-                                          <p:attrName>ppt_x</p:attrName>
-                                        </p:attrNameLst>
-                                      </p:cBhvr>
-                                      <p:tavLst>
-                                        <p:tav tm="0">
-                                          <p:val>
-                                            <p:strVal val="#ppt_x"/>
-                                          </p:val>
-                                        </p:tav>
-                                        <p:tav tm="100000">
-                                          <p:val>
-                                            <p:strVal val="#ppt_x"/>
-                                          </p:val>
-                                        </p:tav>
-                                      </p:tavLst>
-                                    </p:anim>
-                                    <p:anim calcmode="lin" valueType="num">
-                                      <p:cBhvr>
-                                        <p:cTn id="27" dur="1000" fill="hold"/>
-                                        <p:tgtEl>
-                                          <p:spTgt spid="19"/>
-                                        </p:tgtEl>
-                                        <p:attrNameLst>
-                                          <p:attrName>ppt_y</p:attrName>
-                                        </p:attrNameLst>
-                                      </p:cBhvr>
-                                      <p:tavLst>
-                                        <p:tav tm="0">
-                                          <p:val>
-                                            <p:strVal val="#ppt_y+.1"/>
-                                          </p:val>
-                                        </p:tav>
-                                        <p:tav tm="100000">
-                                          <p:val>
-                                            <p:strVal val="#ppt_y"/>
-                                          </p:val>
-                                        </p:tav>
-                                      </p:tavLst>
-                                    </p:anim>
-                                  </p:childTnLst>
-                                </p:cTn>
-                              </p:par>
-                              <p:par>
-                                <p:cTn id="28" presetID="42" presetClass="entr" presetSubtype="0" fill="hold" grpId="0" nodeType="withEffect">
-                                  <p:stCondLst>
-                                    <p:cond delay="0"/>
-                                  </p:stCondLst>
-                                  <p:childTnLst>
-                                    <p:set>
-                                      <p:cBhvr>
-                                        <p:cTn id="29" dur="1" fill="hold">
-                                          <p:stCondLst>
-                                            <p:cond delay="0"/>
-                                          </p:stCondLst>
-                                        </p:cTn>
-                                        <p:tgtEl>
-                                          <p:spTgt spid="17"/>
-                                        </p:tgtEl>
-                                        <p:attrNameLst>
-                                          <p:attrName>style.visibility</p:attrName>
-                                        </p:attrNameLst>
-                                      </p:cBhvr>
-                                      <p:to>
-                                        <p:strVal val="visible"/>
-                                      </p:to>
-                                    </p:set>
-                                    <p:animEffect transition="in" filter="fade">
-                                      <p:cBhvr>
-                                        <p:cTn id="30" dur="1000"/>
-                                        <p:tgtEl>
-                                          <p:spTgt spid="17"/>
-                                        </p:tgtEl>
-                                      </p:cBhvr>
-                                    </p:animEffect>
-                                    <p:anim calcmode="lin" valueType="num">
-                                      <p:cBhvr>
-                                        <p:cTn id="31" dur="1000" fill="hold"/>
-                                        <p:tgtEl>
-                                          <p:spTgt spid="17"/>
-                                        </p:tgtEl>
-                                        <p:attrNameLst>
-                                          <p:attrName>ppt_x</p:attrName>
-                                        </p:attrNameLst>
-                                      </p:cBhvr>
-                                      <p:tavLst>
-                                        <p:tav tm="0">
-                                          <p:val>
-                                            <p:strVal val="#ppt_x"/>
-                                          </p:val>
-                                        </p:tav>
-                                        <p:tav tm="100000">
-                                          <p:val>
-                                            <p:strVal val="#ppt_x"/>
-                                          </p:val>
-                                        </p:tav>
-                                      </p:tavLst>
-                                    </p:anim>
-                                    <p:anim calcmode="lin" valueType="num">
-                                      <p:cBhvr>
-                                        <p:cTn id="32" dur="1000" fill="hold"/>
-                                        <p:tgtEl>
-                                          <p:spTgt spid="17"/>
-                                        </p:tgtEl>
-                                        <p:attrNameLst>
-                                          <p:attrName>ppt_y</p:attrName>
-                                        </p:attrNameLst>
-                                      </p:cBhvr>
-                                      <p:tavLst>
-                                        <p:tav tm="0">
-                                          <p:val>
-                                            <p:strVal val="#ppt_y+.1"/>
-                                          </p:val>
-                                        </p:tav>
-                                        <p:tav tm="100000">
-                                          <p:val>
-                                            <p:strVal val="#ppt_y"/>
-                                          </p:val>
-                                        </p:tav>
-                                      </p:tavLst>
-                                    </p:anim>
-                                  </p:childTnLst>
-                                </p:cTn>
-                              </p:par>
-                            </p:childTnLst>
-                          </p:cTn>
-                        </p:par>
-                      </p:childTnLst>
-                    </p:cTn>
-                  </p:par>
-                  <p:par>
-                    <p:cTn id="33" fill="hold">
-                      <p:stCondLst>
-                        <p:cond delay="indefinite"/>
-                      </p:stCondLst>
-                      <p:childTnLst>
-                        <p:par>
-                          <p:cTn id="34" fill="hold">
-                            <p:stCondLst>
-                              <p:cond delay="0"/>
-                            </p:stCondLst>
-                            <p:childTnLst>
-                              <p:par>
-                                <p:cTn id="35" presetID="42" presetClass="entr" presetSubtype="0" fill="hold" grpId="0" nodeType="clickEffect">
-                                  <p:stCondLst>
-                                    <p:cond delay="0"/>
-                                  </p:stCondLst>
-                                  <p:childTnLst>
-                                    <p:set>
-                                      <p:cBhvr>
-                                        <p:cTn id="36" dur="1" fill="hold">
-                                          <p:stCondLst>
-                                            <p:cond delay="0"/>
-                                          </p:stCondLst>
-                                        </p:cTn>
-                                        <p:tgtEl>
-                                          <p:spTgt spid="12"/>
-                                        </p:tgtEl>
-                                        <p:attrNameLst>
-                                          <p:attrName>style.visibility</p:attrName>
-                                        </p:attrNameLst>
-                                      </p:cBhvr>
-                                      <p:to>
-                                        <p:strVal val="visible"/>
-                                      </p:to>
-                                    </p:set>
-                                    <p:animEffect transition="in" filter="fade">
-                                      <p:cBhvr>
-                                        <p:cTn id="37" dur="1000"/>
-                                        <p:tgtEl>
-                                          <p:spTgt spid="12"/>
-                                        </p:tgtEl>
-                                      </p:cBhvr>
-                                    </p:animEffect>
-                                    <p:anim calcmode="lin" valueType="num">
-                                      <p:cBhvr>
-                                        <p:cTn id="38" dur="1000" fill="hold"/>
-                                        <p:tgtEl>
-                                          <p:spTgt spid="12"/>
-                                        </p:tgtEl>
-                                        <p:attrNameLst>
-                                          <p:attrName>ppt_x</p:attrName>
-                                        </p:attrNameLst>
-                                      </p:cBhvr>
-                                      <p:tavLst>
-                                        <p:tav tm="0">
-                                          <p:val>
-                                            <p:strVal val="#ppt_x"/>
-                                          </p:val>
-                                        </p:tav>
-                                        <p:tav tm="100000">
-                                          <p:val>
-                                            <p:strVal val="#ppt_x"/>
-                                          </p:val>
-                                        </p:tav>
-                                      </p:tavLst>
-                                    </p:anim>
-                                    <p:anim calcmode="lin" valueType="num">
-                                      <p:cBhvr>
-                                        <p:cTn id="39" dur="1000" fill="hold"/>
-                                        <p:tgtEl>
-                                          <p:spTgt spid="12"/>
-                                        </p:tgtEl>
-                                        <p:attrNameLst>
-                                          <p:attrName>ppt_y</p:attrName>
-                                        </p:attrNameLst>
-                                      </p:cBhvr>
-                                      <p:tavLst>
-                                        <p:tav tm="0">
-                                          <p:val>
-                                            <p:strVal val="#ppt_y+.1"/>
-                                          </p:val>
-                                        </p:tav>
-                                        <p:tav tm="100000">
-                                          <p:val>
-                                            <p:strVal val="#ppt_y"/>
-                                          </p:val>
-                                        </p:tav>
-                                      </p:tavLst>
-                                    </p:anim>
-                                  </p:childTnLst>
-                                </p:cTn>
-                              </p:par>
-                              <p:par>
-                                <p:cTn id="40" presetID="42" presetClass="entr" presetSubtype="0" fill="hold" nodeType="withEffect">
-                                  <p:stCondLst>
-                                    <p:cond delay="0"/>
-                                  </p:stCondLst>
-                                  <p:childTnLst>
-                                    <p:set>
-                                      <p:cBhvr>
-                                        <p:cTn id="41" dur="1" fill="hold">
-                                          <p:stCondLst>
-                                            <p:cond delay="0"/>
-                                          </p:stCondLst>
-                                        </p:cTn>
-                                        <p:tgtEl>
-                                          <p:spTgt spid="20"/>
-                                        </p:tgtEl>
-                                        <p:attrNameLst>
-                                          <p:attrName>style.visibility</p:attrName>
-                                        </p:attrNameLst>
-                                      </p:cBhvr>
-                                      <p:to>
-                                        <p:strVal val="visible"/>
-                                      </p:to>
-                                    </p:set>
-                                    <p:animEffect transition="in" filter="fade">
-                                      <p:cBhvr>
-                                        <p:cTn id="42" dur="1000"/>
-                                        <p:tgtEl>
-                                          <p:spTgt spid="20"/>
-                                        </p:tgtEl>
-                                      </p:cBhvr>
-                                    </p:animEffect>
-                                    <p:anim calcmode="lin" valueType="num">
-                                      <p:cBhvr>
-                                        <p:cTn id="43" dur="1000" fill="hold"/>
-                                        <p:tgtEl>
-                                          <p:spTgt spid="20"/>
-                                        </p:tgtEl>
-                                        <p:attrNameLst>
-                                          <p:attrName>ppt_x</p:attrName>
-                                        </p:attrNameLst>
-                                      </p:cBhvr>
-                                      <p:tavLst>
-                                        <p:tav tm="0">
-                                          <p:val>
-                                            <p:strVal val="#ppt_x"/>
-                                          </p:val>
-                                        </p:tav>
-                                        <p:tav tm="100000">
-                                          <p:val>
-                                            <p:strVal val="#ppt_x"/>
-                                          </p:val>
-                                        </p:tav>
-                                      </p:tavLst>
-                                    </p:anim>
-                                    <p:anim calcmode="lin" valueType="num">
-                                      <p:cBhvr>
-                                        <p:cTn id="44" dur="1000" fill="hold"/>
-                                        <p:tgtEl>
-                                          <p:spTgt spid="20"/>
-                                        </p:tgtEl>
-                                        <p:attrNameLst>
-                                          <p:attrName>ppt_y</p:attrName>
-                                        </p:attrNameLst>
-                                      </p:cBhvr>
-                                      <p:tavLst>
-                                        <p:tav tm="0">
-                                          <p:val>
-                                            <p:strVal val="#ppt_y+.1"/>
-                                          </p:val>
-                                        </p:tav>
-                                        <p:tav tm="100000">
-                                          <p:val>
-                                            <p:strVal val="#ppt_y"/>
-                                          </p:val>
-                                        </p:tav>
-                                      </p:tavLst>
-                                    </p:anim>
-                                  </p:childTnLst>
-                                </p:cTn>
-                              </p:par>
-                              <p:par>
-                                <p:cTn id="45" presetID="42" presetClass="entr" presetSubtype="0" fill="hold" grpId="0" nodeType="withEffect">
-                                  <p:stCondLst>
-                                    <p:cond delay="0"/>
-                                  </p:stCondLst>
-                                  <p:childTnLst>
-                                    <p:set>
-                                      <p:cBhvr>
-                                        <p:cTn id="46" dur="1" fill="hold">
-                                          <p:stCondLst>
-                                            <p:cond delay="0"/>
-                                          </p:stCondLst>
-                                        </p:cTn>
-                                        <p:tgtEl>
-                                          <p:spTgt spid="14"/>
-                                        </p:tgtEl>
-                                        <p:attrNameLst>
-                                          <p:attrName>style.visibility</p:attrName>
-                                        </p:attrNameLst>
-                                      </p:cBhvr>
-                                      <p:to>
-                                        <p:strVal val="visible"/>
-                                      </p:to>
-                                    </p:set>
-                                    <p:animEffect transition="in" filter="fade">
-                                      <p:cBhvr>
-                                        <p:cTn id="47" dur="1000"/>
-                                        <p:tgtEl>
-                                          <p:spTgt spid="14"/>
-                                        </p:tgtEl>
-                                      </p:cBhvr>
-                                    </p:animEffect>
-                                    <p:anim calcmode="lin" valueType="num">
-                                      <p:cBhvr>
-                                        <p:cTn id="48" dur="1000" fill="hold"/>
-                                        <p:tgtEl>
-                                          <p:spTgt spid="14"/>
-                                        </p:tgtEl>
-                                        <p:attrNameLst>
-                                          <p:attrName>ppt_x</p:attrName>
-                                        </p:attrNameLst>
-                                      </p:cBhvr>
-                                      <p:tavLst>
-                                        <p:tav tm="0">
-                                          <p:val>
-                                            <p:strVal val="#ppt_x"/>
-                                          </p:val>
-                                        </p:tav>
-                                        <p:tav tm="100000">
-                                          <p:val>
-                                            <p:strVal val="#ppt_x"/>
-                                          </p:val>
-                                        </p:tav>
-                                      </p:tavLst>
-                                    </p:anim>
-                                    <p:anim calcmode="lin" valueType="num">
-                                      <p:cBhvr>
-                                        <p:cTn id="49" dur="1000" fill="hold"/>
-                                        <p:tgtEl>
-                                          <p:spTgt spid="14"/>
-                                        </p:tgtEl>
-                                        <p:attrNameLst>
-                                          <p:attrName>ppt_y</p:attrName>
-                                        </p:attrNameLst>
-                                      </p:cBhvr>
-                                      <p:tavLst>
-                                        <p:tav tm="0">
-                                          <p:val>
-                                            <p:strVal val="#ppt_y+.1"/>
-                                          </p:val>
-                                        </p:tav>
-                                        <p:tav tm="100000">
-                                          <p:val>
-                                            <p:strVal val="#ppt_y"/>
-                                          </p:val>
-                                        </p:tav>
-                                      </p:tavLst>
-                                    </p:anim>
-                                  </p:childTnLst>
-                                </p:cTn>
-                              </p:par>
-                            </p:childTnLst>
-                          </p:cTn>
-                        </p:par>
-                      </p:childTnLst>
-                    </p:cTn>
-                  </p:par>
-                  <p:par>
-                    <p:cTn id="50" fill="hold">
-                      <p:stCondLst>
-                        <p:cond delay="indefinite"/>
-                      </p:stCondLst>
-                      <p:childTnLst>
-                        <p:par>
-                          <p:cTn id="51" fill="hold">
-                            <p:stCondLst>
-                              <p:cond delay="0"/>
-                            </p:stCondLst>
-                            <p:childTnLst>
-                              <p:par>
-                                <p:cTn id="52" presetID="42" presetClass="entr" presetSubtype="0" fill="hold" nodeType="clickEffect">
-                                  <p:stCondLst>
-                                    <p:cond delay="0"/>
-                                  </p:stCondLst>
-                                  <p:childTnLst>
-                                    <p:set>
-                                      <p:cBhvr>
-                                        <p:cTn id="53" dur="1" fill="hold">
-                                          <p:stCondLst>
-                                            <p:cond delay="0"/>
-                                          </p:stCondLst>
-                                        </p:cTn>
-                                        <p:tgtEl>
-                                          <p:spTgt spid="23"/>
-                                        </p:tgtEl>
-                                        <p:attrNameLst>
-                                          <p:attrName>style.visibility</p:attrName>
-                                        </p:attrNameLst>
-                                      </p:cBhvr>
-                                      <p:to>
-                                        <p:strVal val="visible"/>
-                                      </p:to>
-                                    </p:set>
-                                    <p:animEffect transition="in" filter="fade">
-                                      <p:cBhvr>
-                                        <p:cTn id="54" dur="1000"/>
-                                        <p:tgtEl>
-                                          <p:spTgt spid="23"/>
-                                        </p:tgtEl>
-                                      </p:cBhvr>
-                                    </p:animEffect>
-                                    <p:anim calcmode="lin" valueType="num">
-                                      <p:cBhvr>
-                                        <p:cTn id="55" dur="1000" fill="hold"/>
-                                        <p:tgtEl>
-                                          <p:spTgt spid="23"/>
-                                        </p:tgtEl>
-                                        <p:attrNameLst>
-                                          <p:attrName>ppt_x</p:attrName>
-                                        </p:attrNameLst>
-                                      </p:cBhvr>
-                                      <p:tavLst>
-                                        <p:tav tm="0">
-                                          <p:val>
-                                            <p:strVal val="#ppt_x"/>
-                                          </p:val>
-                                        </p:tav>
-                                        <p:tav tm="100000">
-                                          <p:val>
-                                            <p:strVal val="#ppt_x"/>
-                                          </p:val>
-                                        </p:tav>
-                                      </p:tavLst>
-                                    </p:anim>
-                                    <p:anim calcmode="lin" valueType="num">
-                                      <p:cBhvr>
-                                        <p:cTn id="56" dur="1000" fill="hold"/>
-                                        <p:tgtEl>
-                                          <p:spTgt spid="23"/>
-                                        </p:tgtEl>
-                                        <p:attrNameLst>
-                                          <p:attrName>ppt_y</p:attrName>
-                                        </p:attrNameLst>
-                                      </p:cBhvr>
-                                      <p:tavLst>
-                                        <p:tav tm="0">
-                                          <p:val>
-                                            <p:strVal val="#ppt_y+.1"/>
-                                          </p:val>
-                                        </p:tav>
-                                        <p:tav tm="100000">
-                                          <p:val>
-                                            <p:strVal val="#ppt_y"/>
-                                          </p:val>
-                                        </p:tav>
-                                      </p:tavLst>
-                                    </p:anim>
-                                  </p:childTnLst>
-                                </p:cTn>
-                              </p:par>
-                              <p:par>
-                                <p:cTn id="57" presetID="42" presetClass="entr" presetSubtype="0" fill="hold" grpId="0" nodeType="withEffect">
-                                  <p:stCondLst>
-                                    <p:cond delay="0"/>
-                                  </p:stCondLst>
-                                  <p:childTnLst>
-                                    <p:set>
-                                      <p:cBhvr>
-                                        <p:cTn id="58" dur="1" fill="hold">
-                                          <p:stCondLst>
-                                            <p:cond delay="0"/>
-                                          </p:stCondLst>
-                                        </p:cTn>
-                                        <p:tgtEl>
-                                          <p:spTgt spid="13"/>
-                                        </p:tgtEl>
-                                        <p:attrNameLst>
-                                          <p:attrName>style.visibility</p:attrName>
-                                        </p:attrNameLst>
-                                      </p:cBhvr>
-                                      <p:to>
-                                        <p:strVal val="visible"/>
-                                      </p:to>
-                                    </p:set>
-                                    <p:animEffect transition="in" filter="fade">
-                                      <p:cBhvr>
-                                        <p:cTn id="59" dur="1000"/>
-                                        <p:tgtEl>
-                                          <p:spTgt spid="13"/>
-                                        </p:tgtEl>
-                                      </p:cBhvr>
-                                    </p:animEffect>
-                                    <p:anim calcmode="lin" valueType="num">
-                                      <p:cBhvr>
-                                        <p:cTn id="60" dur="1000" fill="hold"/>
-                                        <p:tgtEl>
-                                          <p:spTgt spid="13"/>
-                                        </p:tgtEl>
-                                        <p:attrNameLst>
-                                          <p:attrName>ppt_x</p:attrName>
-                                        </p:attrNameLst>
-                                      </p:cBhvr>
-                                      <p:tavLst>
-                                        <p:tav tm="0">
-                                          <p:val>
-                                            <p:strVal val="#ppt_x"/>
-                                          </p:val>
-                                        </p:tav>
-                                        <p:tav tm="100000">
-                                          <p:val>
-                                            <p:strVal val="#ppt_x"/>
-                                          </p:val>
-                                        </p:tav>
-                                      </p:tavLst>
-                                    </p:anim>
-                                    <p:anim calcmode="lin" valueType="num">
-                                      <p:cBhvr>
-                                        <p:cTn id="61" dur="1000" fill="hold"/>
-                                        <p:tgtEl>
-                                          <p:spTgt spid="13"/>
-                                        </p:tgtEl>
-                                        <p:attrNameLst>
-                                          <p:attrName>ppt_y</p:attrName>
-                                        </p:attrNameLst>
-                                      </p:cBhvr>
-                                      <p:tavLst>
-                                        <p:tav tm="0">
-                                          <p:val>
-                                            <p:strVal val="#ppt_y+.1"/>
-                                          </p:val>
-                                        </p:tav>
-                                        <p:tav tm="100000">
-                                          <p:val>
-                                            <p:strVal val="#ppt_y"/>
-                                          </p:val>
-                                        </p:tav>
-                                      </p:tavLst>
-                                    </p:anim>
-                                  </p:childTnLst>
-                                </p:cTn>
-                              </p:par>
-                              <p:par>
-                                <p:cTn id="62" presetID="42" presetClass="entr" presetSubtype="0" fill="hold" grpId="0" nodeType="withEffect">
-                                  <p:stCondLst>
-                                    <p:cond delay="0"/>
-                                  </p:stCondLst>
-                                  <p:childTnLst>
-                                    <p:set>
-                                      <p:cBhvr>
-                                        <p:cTn id="63" dur="1" fill="hold">
-                                          <p:stCondLst>
-                                            <p:cond delay="0"/>
-                                          </p:stCondLst>
-                                        </p:cTn>
-                                        <p:tgtEl>
-                                          <p:spTgt spid="15"/>
-                                        </p:tgtEl>
-                                        <p:attrNameLst>
-                                          <p:attrName>style.visibility</p:attrName>
-                                        </p:attrNameLst>
-                                      </p:cBhvr>
-                                      <p:to>
-                                        <p:strVal val="visible"/>
-                                      </p:to>
-                                    </p:set>
-                                    <p:animEffect transition="in" filter="fade">
-                                      <p:cBhvr>
-                                        <p:cTn id="64" dur="1000"/>
-                                        <p:tgtEl>
-                                          <p:spTgt spid="15"/>
-                                        </p:tgtEl>
-                                      </p:cBhvr>
-                                    </p:animEffect>
-                                    <p:anim calcmode="lin" valueType="num">
-                                      <p:cBhvr>
-                                        <p:cTn id="65" dur="1000" fill="hold"/>
-                                        <p:tgtEl>
-                                          <p:spTgt spid="15"/>
-                                        </p:tgtEl>
-                                        <p:attrNameLst>
-                                          <p:attrName>ppt_x</p:attrName>
-                                        </p:attrNameLst>
-                                      </p:cBhvr>
-                                      <p:tavLst>
-                                        <p:tav tm="0">
-                                          <p:val>
-                                            <p:strVal val="#ppt_x"/>
-                                          </p:val>
-                                        </p:tav>
-                                        <p:tav tm="100000">
-                                          <p:val>
-                                            <p:strVal val="#ppt_x"/>
-                                          </p:val>
-                                        </p:tav>
-                                      </p:tavLst>
-                                    </p:anim>
-                                    <p:anim calcmode="lin" valueType="num">
-                                      <p:cBhvr>
-                                        <p:cTn id="66" dur="1000" fill="hold"/>
-                                        <p:tgtEl>
-                                          <p:spTgt spid="15"/>
-                                        </p:tgtEl>
-                                        <p:attrNameLst>
-                                          <p:attrName>ppt_y</p:attrName>
-                                        </p:attrNameLst>
-                                      </p:cBhvr>
-                                      <p:tavLst>
-                                        <p:tav tm="0">
-                                          <p:val>
-                                            <p:strVal val="#ppt_y+.1"/>
-                                          </p:val>
-                                        </p:tav>
-                                        <p:tav tm="100000">
-                                          <p:val>
-                                            <p:strVal val="#ppt_y"/>
-                                          </p:val>
-                                        </p:tav>
-                                      </p:tavLst>
-                                    </p:anim>
-                                  </p:childTnLst>
-                                </p:cTn>
-                              </p:par>
-                            </p:childTnLst>
-                          </p:cTn>
-                        </p:par>
-                      </p:childTnLst>
-                    </p:cTn>
-                  </p:par>
-                </p:childTnLst>
-              </p:cTn>
-              <p:prevCondLst>
-                <p:cond evt="onPrev" delay="0">
-                  <p:tgtEl>
-                    <p:sldTgt/>
-                  </p:tgtEl>
-                </p:cond>
-              </p:prevCondLst>
-              <p:nextCondLst>
-                <p:cond evt="onNext" delay="0">
-                  <p:tgtEl>
-                    <p:sldTgt/>
-                  </p:tgtEl>
-                </p:cond>
-              </p:nextCondLst>
-            </p:seq>
-          </p:childTnLst>
-        </p:cTn>
-      </p:par>
-    </p:tnLst>
-    <p:bldLst>
-      <p:bldP spid="12" grpId="0" animBg="1"/>
-      <p:bldP spid="13" grpId="0" animBg="1"/>
-      <p:bldP spid="14" grpId="0" animBg="1"/>
-      <p:bldP spid="15" grpId="0" animBg="1"/>
-      <p:bldP spid="16" grpId="0" animBg="1"/>
-      <p:bldP spid="17" grpId="0" animBg="1"/>
-    </p:bldLst>
-  </p:timing>
-</p:sld>
-</file>
-
 <file path=ppt/theme/theme1.xml><?xml version="1.0" encoding="utf-8"?>
 <a:theme xmlns:a="http://schemas.openxmlformats.org/drawingml/2006/main" name="Retrospect">
   <a:themeElements>

</xml_diff>

<commit_message>
ppt update removed slide no longer relevant and added intro slide
</commit_message>
<xml_diff>
--- a/P0 presentation.pptx
+++ b/P0 presentation.pptx
@@ -5,13 +5,13 @@
     <p:sldMasterId id="2147483672" r:id="rId1"/>
   </p:sldMasterIdLst>
   <p:sldIdLst>
-    <p:sldId id="261" r:id="rId2"/>
-    <p:sldId id="259" r:id="rId3"/>
-    <p:sldId id="257" r:id="rId4"/>
-    <p:sldId id="258" r:id="rId5"/>
-    <p:sldId id="260" r:id="rId6"/>
-    <p:sldId id="262" r:id="rId7"/>
-    <p:sldId id="263" r:id="rId8"/>
+    <p:sldId id="264" r:id="rId2"/>
+    <p:sldId id="261" r:id="rId3"/>
+    <p:sldId id="259" r:id="rId4"/>
+    <p:sldId id="257" r:id="rId5"/>
+    <p:sldId id="258" r:id="rId6"/>
+    <p:sldId id="260" r:id="rId7"/>
+    <p:sldId id="262" r:id="rId8"/>
   </p:sldIdLst>
   <p:sldSz cx="12192000" cy="6858000"/>
   <p:notesSz cx="6858000" cy="9144000"/>
@@ -3816,6 +3816,565 @@
       </p:grpSpPr>
       <p:sp>
         <p:nvSpPr>
+          <p:cNvPr id="11" name="Rectangle 10">
+            <a:extLst>
+              <a:ext uri="{FF2B5EF4-FFF2-40B4-BE49-F238E27FC236}">
+                <a16:creationId xmlns:a16="http://schemas.microsoft.com/office/drawing/2014/main" id="{F240A2FC-E2C3-458D-96B4-5DF9028D93A5}"/>
+              </a:ext>
+              <a:ext uri="{C183D7F6-B498-43B3-948B-1728B52AA6E4}">
+                <adec:decorative xmlns:adec="http://schemas.microsoft.com/office/drawing/2017/decorative" val="1"/>
+              </a:ext>
+            </a:extLst>
+          </p:cNvPr>
+          <p:cNvSpPr>
+            <a:spLocks noGrp="1" noRot="1" noChangeAspect="1" noMove="1" noResize="1" noEditPoints="1" noAdjustHandles="1" noChangeArrowheads="1" noChangeShapeType="1" noTextEdit="1"/>
+          </p:cNvSpPr>
+          <p:nvPr>
+            <p:extLst>
+              <p:ext uri="{386F3935-93C4-4BCD-93E2-E3B085C9AB24}">
+                <p16:designElem xmlns:p16="http://schemas.microsoft.com/office/powerpoint/2015/main" val="1"/>
+              </p:ext>
+            </p:extLst>
+          </p:nvPr>
+        </p:nvSpPr>
+        <p:spPr>
+          <a:xfrm>
+            <a:off x="1" y="6400800"/>
+            <a:ext cx="12192000" cy="457200"/>
+          </a:xfrm>
+          <a:prstGeom prst="rect">
+            <a:avLst/>
+          </a:prstGeom>
+          <a:solidFill>
+            <a:schemeClr val="accent2"/>
+          </a:solidFill>
+          <a:ln>
+            <a:noFill/>
+          </a:ln>
+        </p:spPr>
+        <p:style>
+          <a:lnRef idx="2">
+            <a:schemeClr val="accent1">
+              <a:shade val="50000"/>
+            </a:schemeClr>
+          </a:lnRef>
+          <a:fillRef idx="1">
+            <a:schemeClr val="accent1"/>
+          </a:fillRef>
+          <a:effectRef idx="0">
+            <a:schemeClr val="accent1"/>
+          </a:effectRef>
+          <a:fontRef idx="minor">
+            <a:schemeClr val="lt1"/>
+          </a:fontRef>
+        </p:style>
+      </p:sp>
+      <p:sp>
+        <p:nvSpPr>
+          <p:cNvPr id="13" name="Rectangle 12">
+            <a:extLst>
+              <a:ext uri="{FF2B5EF4-FFF2-40B4-BE49-F238E27FC236}">
+                <a16:creationId xmlns:a16="http://schemas.microsoft.com/office/drawing/2014/main" id="{5F097929-F3D6-4D1F-8AFC-CF348171A9E1}"/>
+              </a:ext>
+              <a:ext uri="{C183D7F6-B498-43B3-948B-1728B52AA6E4}">
+                <adec:decorative xmlns:adec="http://schemas.microsoft.com/office/drawing/2017/decorative" val="1"/>
+              </a:ext>
+            </a:extLst>
+          </p:cNvPr>
+          <p:cNvSpPr>
+            <a:spLocks noGrp="1" noRot="1" noChangeAspect="1" noMove="1" noResize="1" noEditPoints="1" noAdjustHandles="1" noChangeArrowheads="1" noChangeShapeType="1" noTextEdit="1"/>
+          </p:cNvSpPr>
+          <p:nvPr>
+            <p:extLst>
+              <p:ext uri="{386F3935-93C4-4BCD-93E2-E3B085C9AB24}">
+                <p16:designElem xmlns:p16="http://schemas.microsoft.com/office/powerpoint/2015/main" val="1"/>
+              </p:ext>
+            </p:extLst>
+          </p:nvPr>
+        </p:nvSpPr>
+        <p:spPr>
+          <a:xfrm>
+            <a:off x="1" y="6334316"/>
+            <a:ext cx="12192000" cy="66484"/>
+          </a:xfrm>
+          <a:prstGeom prst="rect">
+            <a:avLst/>
+          </a:prstGeom>
+          <a:solidFill>
+            <a:schemeClr val="accent1"/>
+          </a:solidFill>
+          <a:ln>
+            <a:noFill/>
+          </a:ln>
+        </p:spPr>
+        <p:style>
+          <a:lnRef idx="2">
+            <a:schemeClr val="accent1">
+              <a:shade val="50000"/>
+            </a:schemeClr>
+          </a:lnRef>
+          <a:fillRef idx="1">
+            <a:schemeClr val="accent1"/>
+          </a:fillRef>
+          <a:effectRef idx="0">
+            <a:schemeClr val="accent1"/>
+          </a:effectRef>
+          <a:fontRef idx="minor">
+            <a:schemeClr val="lt1"/>
+          </a:fontRef>
+        </p:style>
+      </p:sp>
+      <p:cxnSp>
+        <p:nvCxnSpPr>
+          <p:cNvPr id="15" name="Straight Connector 14">
+            <a:extLst>
+              <a:ext uri="{FF2B5EF4-FFF2-40B4-BE49-F238E27FC236}">
+                <a16:creationId xmlns:a16="http://schemas.microsoft.com/office/drawing/2014/main" id="{43074C91-9045-414B-B5F9-567DAE3EED25}"/>
+              </a:ext>
+              <a:ext uri="{C183D7F6-B498-43B3-948B-1728B52AA6E4}">
+                <adec:decorative xmlns:adec="http://schemas.microsoft.com/office/drawing/2017/decorative" val="1"/>
+              </a:ext>
+            </a:extLst>
+          </p:cNvPr>
+          <p:cNvCxnSpPr>
+            <a:cxnSpLocks noGrp="1" noRot="1" noChangeAspect="1" noMove="1" noResize="1" noEditPoints="1" noAdjustHandles="1" noChangeArrowheads="1" noChangeShapeType="1"/>
+          </p:cNvCxnSpPr>
+          <p:nvPr>
+            <p:extLst>
+              <p:ext uri="{386F3935-93C4-4BCD-93E2-E3B085C9AB24}">
+                <p16:designElem xmlns:p16="http://schemas.microsoft.com/office/powerpoint/2015/main" val="1"/>
+              </p:ext>
+            </p:extLst>
+          </p:nvPr>
+        </p:nvCxnSpPr>
+        <p:spPr>
+          <a:xfrm>
+            <a:off x="1207658" y="4343400"/>
+            <a:ext cx="9875520" cy="0"/>
+          </a:xfrm>
+          <a:prstGeom prst="line">
+            <a:avLst/>
+          </a:prstGeom>
+          <a:ln w="6350">
+            <a:solidFill>
+              <a:schemeClr val="tx1">
+                <a:lumMod val="50000"/>
+                <a:lumOff val="50000"/>
+              </a:schemeClr>
+            </a:solidFill>
+          </a:ln>
+        </p:spPr>
+        <p:style>
+          <a:lnRef idx="1">
+            <a:schemeClr val="accent1"/>
+          </a:lnRef>
+          <a:fillRef idx="0">
+            <a:schemeClr val="accent1"/>
+          </a:fillRef>
+          <a:effectRef idx="0">
+            <a:schemeClr val="accent1"/>
+          </a:effectRef>
+          <a:fontRef idx="minor">
+            <a:schemeClr val="tx1"/>
+          </a:fontRef>
+        </p:style>
+      </p:cxnSp>
+      <p:sp useBgFill="1">
+        <p:nvSpPr>
+          <p:cNvPr id="17" name="Rectangle 16">
+            <a:extLst>
+              <a:ext uri="{FF2B5EF4-FFF2-40B4-BE49-F238E27FC236}">
+                <a16:creationId xmlns:a16="http://schemas.microsoft.com/office/drawing/2014/main" id="{34461041-8413-4023-ABA7-9E499B0AD995}"/>
+              </a:ext>
+              <a:ext uri="{C183D7F6-B498-43B3-948B-1728B52AA6E4}">
+                <adec:decorative xmlns:adec="http://schemas.microsoft.com/office/drawing/2017/decorative" val="1"/>
+              </a:ext>
+            </a:extLst>
+          </p:cNvPr>
+          <p:cNvSpPr>
+            <a:spLocks noGrp="1" noRot="1" noChangeAspect="1" noMove="1" noResize="1" noEditPoints="1" noAdjustHandles="1" noChangeArrowheads="1" noChangeShapeType="1" noTextEdit="1"/>
+          </p:cNvSpPr>
+          <p:nvPr>
+            <p:extLst>
+              <p:ext uri="{386F3935-93C4-4BCD-93E2-E3B085C9AB24}">
+                <p16:designElem xmlns:p16="http://schemas.microsoft.com/office/powerpoint/2015/main" val="1"/>
+              </p:ext>
+            </p:extLst>
+          </p:nvPr>
+        </p:nvSpPr>
+        <p:spPr>
+          <a:xfrm>
+            <a:off x="0" y="0"/>
+            <a:ext cx="12192001" cy="6334316"/>
+          </a:xfrm>
+          <a:prstGeom prst="rect">
+            <a:avLst/>
+          </a:prstGeom>
+          <a:ln>
+            <a:noFill/>
+          </a:ln>
+        </p:spPr>
+        <p:style>
+          <a:lnRef idx="2">
+            <a:schemeClr val="accent1">
+              <a:shade val="50000"/>
+            </a:schemeClr>
+          </a:lnRef>
+          <a:fillRef idx="1">
+            <a:schemeClr val="accent1"/>
+          </a:fillRef>
+          <a:effectRef idx="0">
+            <a:schemeClr val="accent1"/>
+          </a:effectRef>
+          <a:fontRef idx="minor">
+            <a:schemeClr val="lt1"/>
+          </a:fontRef>
+        </p:style>
+        <p:txBody>
+          <a:bodyPr rtlCol="0" anchor="ctr"/>
+          <a:lstStyle/>
+          <a:p>
+            <a:pPr algn="ctr"/>
+            <a:endParaRPr lang="en-US"/>
+          </a:p>
+        </p:txBody>
+      </p:sp>
+      <p:sp>
+        <p:nvSpPr>
+          <p:cNvPr id="2" name="Title 1">
+            <a:extLst>
+              <a:ext uri="{FF2B5EF4-FFF2-40B4-BE49-F238E27FC236}">
+                <a16:creationId xmlns:a16="http://schemas.microsoft.com/office/drawing/2014/main" id="{B7DDE93B-F00D-4F20-AFAD-39D4B64C526C}"/>
+              </a:ext>
+            </a:extLst>
+          </p:cNvPr>
+          <p:cNvSpPr>
+            <a:spLocks noGrp="1"/>
+          </p:cNvSpPr>
+          <p:nvPr>
+            <p:ph type="title"/>
+          </p:nvPr>
+        </p:nvSpPr>
+        <p:spPr>
+          <a:xfrm>
+            <a:off x="633999" y="2010376"/>
+            <a:ext cx="10909073" cy="1057655"/>
+          </a:xfrm>
+        </p:spPr>
+        <p:txBody>
+          <a:bodyPr vert="horz" lIns="91440" tIns="45720" rIns="91440" bIns="45720" rtlCol="0" anchor="b">
+            <a:normAutofit/>
+          </a:bodyPr>
+          <a:lstStyle/>
+          <a:p>
+            <a:r>
+              <a:rPr lang="en-US" sz="6000" dirty="0">
+                <a:solidFill>
+                  <a:schemeClr val="tx1">
+                    <a:lumMod val="85000"/>
+                    <a:lumOff val="15000"/>
+                  </a:schemeClr>
+                </a:solidFill>
+              </a:rPr>
+              <a:t>Project 0</a:t>
+            </a:r>
+          </a:p>
+        </p:txBody>
+      </p:sp>
+      <p:cxnSp>
+        <p:nvCxnSpPr>
+          <p:cNvPr id="19" name="Straight Connector 18">
+            <a:extLst>
+              <a:ext uri="{FF2B5EF4-FFF2-40B4-BE49-F238E27FC236}">
+                <a16:creationId xmlns:a16="http://schemas.microsoft.com/office/drawing/2014/main" id="{F05BCF04-4702-43D0-BE8F-DBF6C2F65131}"/>
+              </a:ext>
+              <a:ext uri="{C183D7F6-B498-43B3-948B-1728B52AA6E4}">
+                <adec:decorative xmlns:adec="http://schemas.microsoft.com/office/drawing/2017/decorative" val="1"/>
+              </a:ext>
+            </a:extLst>
+          </p:cNvPr>
+          <p:cNvCxnSpPr>
+            <a:cxnSpLocks noGrp="1" noRot="1" noChangeAspect="1" noMove="1" noResize="1" noEditPoints="1" noAdjustHandles="1" noChangeArrowheads="1" noChangeShapeType="1"/>
+          </p:cNvCxnSpPr>
+          <p:nvPr>
+            <p:extLst>
+              <p:ext uri="{386F3935-93C4-4BCD-93E2-E3B085C9AB24}">
+                <p16:designElem xmlns:p16="http://schemas.microsoft.com/office/powerpoint/2015/main" val="1"/>
+              </p:ext>
+            </p:extLst>
+          </p:nvPr>
+        </p:nvCxnSpPr>
+        <p:spPr>
+          <a:xfrm>
+            <a:off x="721086" y="5618770"/>
+            <a:ext cx="10515600" cy="0"/>
+          </a:xfrm>
+          <a:prstGeom prst="line">
+            <a:avLst/>
+          </a:prstGeom>
+          <a:ln w="6350">
+            <a:solidFill>
+              <a:schemeClr val="tx2">
+                <a:alpha val="90000"/>
+              </a:schemeClr>
+            </a:solidFill>
+          </a:ln>
+        </p:spPr>
+        <p:style>
+          <a:lnRef idx="1">
+            <a:schemeClr val="accent1"/>
+          </a:lnRef>
+          <a:fillRef idx="0">
+            <a:schemeClr val="accent1"/>
+          </a:fillRef>
+          <a:effectRef idx="0">
+            <a:schemeClr val="accent1"/>
+          </a:effectRef>
+          <a:fontRef idx="minor">
+            <a:schemeClr val="tx1"/>
+          </a:fontRef>
+        </p:style>
+      </p:cxnSp>
+      <p:sp>
+        <p:nvSpPr>
+          <p:cNvPr id="21" name="Rectangle 20">
+            <a:extLst>
+              <a:ext uri="{FF2B5EF4-FFF2-40B4-BE49-F238E27FC236}">
+                <a16:creationId xmlns:a16="http://schemas.microsoft.com/office/drawing/2014/main" id="{D841E764-4629-49E0-994A-6F92FEFB9B5D}"/>
+              </a:ext>
+              <a:ext uri="{C183D7F6-B498-43B3-948B-1728B52AA6E4}">
+                <adec:decorative xmlns:adec="http://schemas.microsoft.com/office/drawing/2017/decorative" val="1"/>
+              </a:ext>
+            </a:extLst>
+          </p:cNvPr>
+          <p:cNvSpPr>
+            <a:spLocks noGrp="1" noRot="1" noChangeAspect="1" noMove="1" noResize="1" noEditPoints="1" noAdjustHandles="1" noChangeArrowheads="1" noChangeShapeType="1" noTextEdit="1"/>
+          </p:cNvSpPr>
+          <p:nvPr>
+            <p:extLst>
+              <p:ext uri="{386F3935-93C4-4BCD-93E2-E3B085C9AB24}">
+                <p16:designElem xmlns:p16="http://schemas.microsoft.com/office/powerpoint/2015/main" val="1"/>
+              </p:ext>
+            </p:extLst>
+          </p:nvPr>
+        </p:nvSpPr>
+        <p:spPr>
+          <a:xfrm>
+            <a:off x="15" y="6334316"/>
+            <a:ext cx="12191985" cy="66484"/>
+          </a:xfrm>
+          <a:prstGeom prst="rect">
+            <a:avLst/>
+          </a:prstGeom>
+          <a:solidFill>
+            <a:schemeClr val="accent1"/>
+          </a:solidFill>
+          <a:ln>
+            <a:noFill/>
+          </a:ln>
+        </p:spPr>
+        <p:style>
+          <a:lnRef idx="2">
+            <a:schemeClr val="accent1">
+              <a:shade val="50000"/>
+            </a:schemeClr>
+          </a:lnRef>
+          <a:fillRef idx="1">
+            <a:schemeClr val="accent1"/>
+          </a:fillRef>
+          <a:effectRef idx="0">
+            <a:schemeClr val="accent1"/>
+          </a:effectRef>
+          <a:fontRef idx="minor">
+            <a:schemeClr val="lt1"/>
+          </a:fontRef>
+        </p:style>
+      </p:sp>
+      <p:sp>
+        <p:nvSpPr>
+          <p:cNvPr id="23" name="Rectangle 22">
+            <a:extLst>
+              <a:ext uri="{FF2B5EF4-FFF2-40B4-BE49-F238E27FC236}">
+                <a16:creationId xmlns:a16="http://schemas.microsoft.com/office/drawing/2014/main" id="{95635077-9890-4CC8-9792-28743EBFE01D}"/>
+              </a:ext>
+              <a:ext uri="{C183D7F6-B498-43B3-948B-1728B52AA6E4}">
+                <adec:decorative xmlns:adec="http://schemas.microsoft.com/office/drawing/2017/decorative" val="1"/>
+              </a:ext>
+            </a:extLst>
+          </p:cNvPr>
+          <p:cNvSpPr>
+            <a:spLocks noGrp="1" noRot="1" noChangeAspect="1" noMove="1" noResize="1" noEditPoints="1" noAdjustHandles="1" noChangeArrowheads="1" noChangeShapeType="1" noTextEdit="1"/>
+          </p:cNvSpPr>
+          <p:nvPr>
+            <p:extLst>
+              <p:ext uri="{386F3935-93C4-4BCD-93E2-E3B085C9AB24}">
+                <p16:designElem xmlns:p16="http://schemas.microsoft.com/office/powerpoint/2015/main" val="1"/>
+              </p:ext>
+            </p:extLst>
+          </p:nvPr>
+        </p:nvSpPr>
+        <p:spPr>
+          <a:xfrm>
+            <a:off x="1" y="6400800"/>
+            <a:ext cx="12192000" cy="457200"/>
+          </a:xfrm>
+          <a:prstGeom prst="rect">
+            <a:avLst/>
+          </a:prstGeom>
+          <a:solidFill>
+            <a:schemeClr val="accent2"/>
+          </a:solidFill>
+          <a:ln>
+            <a:noFill/>
+          </a:ln>
+        </p:spPr>
+        <p:style>
+          <a:lnRef idx="2">
+            <a:schemeClr val="accent1">
+              <a:shade val="50000"/>
+            </a:schemeClr>
+          </a:lnRef>
+          <a:fillRef idx="1">
+            <a:schemeClr val="accent1"/>
+          </a:fillRef>
+          <a:effectRef idx="0">
+            <a:schemeClr val="accent1"/>
+          </a:effectRef>
+          <a:fontRef idx="minor">
+            <a:schemeClr val="lt1"/>
+          </a:fontRef>
+        </p:style>
+      </p:sp>
+      <p:sp>
+        <p:nvSpPr>
+          <p:cNvPr id="12" name="Title 1">
+            <a:extLst>
+              <a:ext uri="{FF2B5EF4-FFF2-40B4-BE49-F238E27FC236}">
+                <a16:creationId xmlns:a16="http://schemas.microsoft.com/office/drawing/2014/main" id="{C81BCE6D-E0EC-4569-9EBF-234096AF6319}"/>
+              </a:ext>
+            </a:extLst>
+          </p:cNvPr>
+          <p:cNvSpPr txBox="1">
+            <a:spLocks/>
+          </p:cNvSpPr>
+          <p:nvPr/>
+        </p:nvSpPr>
+        <p:spPr>
+          <a:xfrm>
+            <a:off x="633998" y="3065061"/>
+            <a:ext cx="10909073" cy="1057655"/>
+          </a:xfrm>
+          <a:prstGeom prst="rect">
+            <a:avLst/>
+          </a:prstGeom>
+        </p:spPr>
+        <p:txBody>
+          <a:bodyPr vert="horz" lIns="91440" tIns="45720" rIns="91440" bIns="45720" rtlCol="0" anchor="b">
+            <a:normAutofit fontScale="47500" lnSpcReduction="20000"/>
+          </a:bodyPr>
+          <a:lstStyle>
+            <a:lvl1pPr algn="l" defTabSz="914400" rtl="0" eaLnBrk="1" latinLnBrk="0" hangingPunct="1">
+              <a:lnSpc>
+                <a:spcPct val="85000"/>
+              </a:lnSpc>
+              <a:spcBef>
+                <a:spcPct val="0"/>
+              </a:spcBef>
+              <a:buNone/>
+              <a:defRPr sz="4800" kern="1200" spc="-50" baseline="0">
+                <a:solidFill>
+                  <a:schemeClr val="tx1">
+                    <a:lumMod val="75000"/>
+                    <a:lumOff val="25000"/>
+                  </a:schemeClr>
+                </a:solidFill>
+                <a:latin typeface="+mj-lt"/>
+                <a:ea typeface="+mj-ea"/>
+                <a:cs typeface="+mj-cs"/>
+              </a:defRPr>
+            </a:lvl1pPr>
+          </a:lstStyle>
+          <a:p>
+            <a:r>
+              <a:rPr lang="en-US" sz="6000" dirty="0">
+                <a:solidFill>
+                  <a:schemeClr val="tx1">
+                    <a:lumMod val="85000"/>
+                    <a:lumOff val="15000"/>
+                  </a:schemeClr>
+                </a:solidFill>
+              </a:rPr>
+              <a:t>Timothy Yu</a:t>
+            </a:r>
+          </a:p>
+          <a:p>
+            <a:r>
+              <a:rPr lang="en-US" sz="6000" dirty="0">
+                <a:solidFill>
+                  <a:schemeClr val="tx1">
+                    <a:lumMod val="85000"/>
+                    <a:lumOff val="15000"/>
+                  </a:schemeClr>
+                </a:solidFill>
+              </a:rPr>
+              <a:t>Kenneth Bradburn</a:t>
+            </a:r>
+          </a:p>
+          <a:p>
+            <a:r>
+              <a:rPr lang="en-US" sz="6000" dirty="0">
+                <a:solidFill>
+                  <a:schemeClr val="tx1">
+                    <a:lumMod val="85000"/>
+                    <a:lumOff val="15000"/>
+                  </a:schemeClr>
+                </a:solidFill>
+              </a:rPr>
+              <a:t>10/14/21</a:t>
+            </a:r>
+          </a:p>
+        </p:txBody>
+      </p:sp>
+    </p:spTree>
+    <p:extLst>
+      <p:ext uri="{BB962C8B-B14F-4D97-AF65-F5344CB8AC3E}">
+        <p14:creationId xmlns:p14="http://schemas.microsoft.com/office/powerpoint/2010/main" val="242579596"/>
+      </p:ext>
+    </p:extLst>
+  </p:cSld>
+  <p:clrMapOvr>
+    <a:masterClrMapping/>
+  </p:clrMapOvr>
+</p:sld>
+</file>
+
+<file path=ppt/slides/slide2.xml><?xml version="1.0" encoding="utf-8"?>
+<p:sld xmlns:a="http://schemas.openxmlformats.org/drawingml/2006/main" xmlns:r="http://schemas.openxmlformats.org/officeDocument/2006/relationships" xmlns:p="http://schemas.openxmlformats.org/presentationml/2006/main">
+  <p:cSld>
+    <p:bg>
+      <p:bgPr>
+        <a:solidFill>
+          <a:schemeClr val="bg1"/>
+        </a:solidFill>
+        <a:effectLst/>
+      </p:bgPr>
+    </p:bg>
+    <p:spTree>
+      <p:nvGrpSpPr>
+        <p:cNvPr id="1" name=""/>
+        <p:cNvGrpSpPr/>
+        <p:nvPr/>
+      </p:nvGrpSpPr>
+      <p:grpSpPr>
+        <a:xfrm>
+          <a:off x="0" y="0"/>
+          <a:ext cx="0" cy="0"/>
+          <a:chOff x="0" y="0"/>
+          <a:chExt cx="0" cy="0"/>
+        </a:xfrm>
+      </p:grpSpPr>
+      <p:sp>
+        <p:nvSpPr>
           <p:cNvPr id="9" name="Rectangle 8">
             <a:extLst>
               <a:ext uri="{FF2B5EF4-FFF2-40B4-BE49-F238E27FC236}">
@@ -4297,7 +4856,7 @@
 </p:sld>
 </file>
 
-<file path=ppt/slides/slide2.xml><?xml version="1.0" encoding="utf-8"?>
+<file path=ppt/slides/slide3.xml><?xml version="1.0" encoding="utf-8"?>
 <p:sld xmlns:a="http://schemas.openxmlformats.org/drawingml/2006/main" xmlns:r="http://schemas.openxmlformats.org/officeDocument/2006/relationships" xmlns:p="http://schemas.openxmlformats.org/presentationml/2006/main">
   <p:cSld>
     <p:spTree>
@@ -4399,7 +4958,7 @@
 </p:sld>
 </file>
 
-<file path=ppt/slides/slide3.xml><?xml version="1.0" encoding="utf-8"?>
+<file path=ppt/slides/slide4.xml><?xml version="1.0" encoding="utf-8"?>
 <p:sld xmlns:a="http://schemas.openxmlformats.org/drawingml/2006/main" xmlns:r="http://schemas.openxmlformats.org/officeDocument/2006/relationships" xmlns:p="http://schemas.openxmlformats.org/presentationml/2006/main">
   <p:cSld>
     <p:spTree>
@@ -5103,7 +5662,7 @@
 </p:sld>
 </file>
 
-<file path=ppt/slides/slide4.xml><?xml version="1.0" encoding="utf-8"?>
+<file path=ppt/slides/slide5.xml><?xml version="1.0" encoding="utf-8"?>
 <p:sld xmlns:a="http://schemas.openxmlformats.org/drawingml/2006/main" xmlns:r="http://schemas.openxmlformats.org/officeDocument/2006/relationships" xmlns:p="http://schemas.openxmlformats.org/presentationml/2006/main">
   <p:cSld>
     <p:spTree>
@@ -5537,7 +6096,7 @@
 </p:sld>
 </file>
 
-<file path=ppt/slides/slide5.xml><?xml version="1.0" encoding="utf-8"?>
+<file path=ppt/slides/slide6.xml><?xml version="1.0" encoding="utf-8"?>
 <p:sld xmlns:a="http://schemas.openxmlformats.org/drawingml/2006/main" xmlns:r="http://schemas.openxmlformats.org/officeDocument/2006/relationships" xmlns:p="http://schemas.openxmlformats.org/presentationml/2006/main">
   <p:cSld>
     <p:spTree>
@@ -6105,7 +6664,7 @@
 </p:sld>
 </file>
 
-<file path=ppt/slides/slide6.xml><?xml version="1.0" encoding="utf-8"?>
+<file path=ppt/slides/slide7.xml><?xml version="1.0" encoding="utf-8"?>
 <p:sld xmlns:a="http://schemas.openxmlformats.org/drawingml/2006/main" xmlns:r="http://schemas.openxmlformats.org/officeDocument/2006/relationships" xmlns:p="http://schemas.openxmlformats.org/presentationml/2006/main">
   <p:cSld>
     <p:spTree>
@@ -6878,1560 +7437,6 @@
 </p:sld>
 </file>
 
-<file path=ppt/slides/slide7.xml><?xml version="1.0" encoding="utf-8"?>
-<p:sld xmlns:a="http://schemas.openxmlformats.org/drawingml/2006/main" xmlns:r="http://schemas.openxmlformats.org/officeDocument/2006/relationships" xmlns:p="http://schemas.openxmlformats.org/presentationml/2006/main">
-  <p:cSld>
-    <p:spTree>
-      <p:nvGrpSpPr>
-        <p:cNvPr id="1" name=""/>
-        <p:cNvGrpSpPr/>
-        <p:nvPr/>
-      </p:nvGrpSpPr>
-      <p:grpSpPr>
-        <a:xfrm>
-          <a:off x="0" y="0"/>
-          <a:ext cx="0" cy="0"/>
-          <a:chOff x="0" y="0"/>
-          <a:chExt cx="0" cy="0"/>
-        </a:xfrm>
-      </p:grpSpPr>
-      <p:sp>
-        <p:nvSpPr>
-          <p:cNvPr id="2" name="Title 1">
-            <a:extLst>
-              <a:ext uri="{FF2B5EF4-FFF2-40B4-BE49-F238E27FC236}">
-                <a16:creationId xmlns:a16="http://schemas.microsoft.com/office/drawing/2014/main" id="{35F4DFF8-F9F1-49A3-8D7E-5ADB3D73907F}"/>
-              </a:ext>
-            </a:extLst>
-          </p:cNvPr>
-          <p:cNvSpPr>
-            <a:spLocks noGrp="1"/>
-          </p:cNvSpPr>
-          <p:nvPr>
-            <p:ph type="title"/>
-          </p:nvPr>
-        </p:nvSpPr>
-        <p:spPr/>
-        <p:txBody>
-          <a:bodyPr>
-            <a:normAutofit/>
-          </a:bodyPr>
-          <a:lstStyle/>
-          <a:p>
-            <a:r>
-              <a:rPr lang="en-US" sz="4000" dirty="0"/>
-              <a:t>Feature: Automatic Updating Pivot Charts For Vendor Inventory And Incoming Shipments</a:t>
-            </a:r>
-          </a:p>
-        </p:txBody>
-      </p:sp>
-      <p:pic>
-        <p:nvPicPr>
-          <p:cNvPr id="7" name="Picture 6">
-            <a:extLst>
-              <a:ext uri="{FF2B5EF4-FFF2-40B4-BE49-F238E27FC236}">
-                <a16:creationId xmlns:a16="http://schemas.microsoft.com/office/drawing/2014/main" id="{1942B0ED-FBFF-4A76-9DD9-B6138F0D4D5A}"/>
-              </a:ext>
-            </a:extLst>
-          </p:cNvPr>
-          <p:cNvPicPr>
-            <a:picLocks noChangeAspect="1"/>
-          </p:cNvPicPr>
-          <p:nvPr/>
-        </p:nvPicPr>
-        <p:blipFill>
-          <a:blip r:embed="rId2"/>
-          <a:stretch>
-            <a:fillRect/>
-          </a:stretch>
-        </p:blipFill>
-        <p:spPr>
-          <a:xfrm>
-            <a:off x="0" y="0"/>
-            <a:ext cx="5567680" cy="6852530"/>
-          </a:xfrm>
-          <a:prstGeom prst="rect">
-            <a:avLst/>
-          </a:prstGeom>
-        </p:spPr>
-      </p:pic>
-      <p:pic>
-        <p:nvPicPr>
-          <p:cNvPr id="9" name="Picture 8">
-            <a:extLst>
-              <a:ext uri="{FF2B5EF4-FFF2-40B4-BE49-F238E27FC236}">
-                <a16:creationId xmlns:a16="http://schemas.microsoft.com/office/drawing/2014/main" id="{D78DAEA0-3526-44C3-BD4B-06EAC3C656A9}"/>
-              </a:ext>
-            </a:extLst>
-          </p:cNvPr>
-          <p:cNvPicPr>
-            <a:picLocks noChangeAspect="1"/>
-          </p:cNvPicPr>
-          <p:nvPr/>
-        </p:nvPicPr>
-        <p:blipFill>
-          <a:blip r:embed="rId3"/>
-          <a:stretch>
-            <a:fillRect/>
-          </a:stretch>
-        </p:blipFill>
-        <p:spPr>
-          <a:xfrm>
-            <a:off x="5644796" y="3454014"/>
-            <a:ext cx="3478884" cy="3374255"/>
-          </a:xfrm>
-          <a:prstGeom prst="rect">
-            <a:avLst/>
-          </a:prstGeom>
-        </p:spPr>
-      </p:pic>
-      <p:pic>
-        <p:nvPicPr>
-          <p:cNvPr id="11" name="Picture 10">
-            <a:extLst>
-              <a:ext uri="{FF2B5EF4-FFF2-40B4-BE49-F238E27FC236}">
-                <a16:creationId xmlns:a16="http://schemas.microsoft.com/office/drawing/2014/main" id="{76DDB02B-FA33-4F30-A5D5-CBCD230E83B5}"/>
-              </a:ext>
-            </a:extLst>
-          </p:cNvPr>
-          <p:cNvPicPr>
-            <a:picLocks noChangeAspect="1"/>
-          </p:cNvPicPr>
-          <p:nvPr/>
-        </p:nvPicPr>
-        <p:blipFill>
-          <a:blip r:embed="rId4"/>
-          <a:stretch>
-            <a:fillRect/>
-          </a:stretch>
-        </p:blipFill>
-        <p:spPr>
-          <a:xfrm>
-            <a:off x="5567680" y="57480"/>
-            <a:ext cx="6085840" cy="3346506"/>
-          </a:xfrm>
-          <a:prstGeom prst="rect">
-            <a:avLst/>
-          </a:prstGeom>
-        </p:spPr>
-      </p:pic>
-      <p:sp>
-        <p:nvSpPr>
-          <p:cNvPr id="12" name="Rectangle 11">
-            <a:extLst>
-              <a:ext uri="{FF2B5EF4-FFF2-40B4-BE49-F238E27FC236}">
-                <a16:creationId xmlns:a16="http://schemas.microsoft.com/office/drawing/2014/main" id="{0627E335-FEDD-49A0-B792-D0FE1F88F3DB}"/>
-              </a:ext>
-            </a:extLst>
-          </p:cNvPr>
-          <p:cNvSpPr/>
-          <p:nvPr/>
-        </p:nvSpPr>
-        <p:spPr>
-          <a:xfrm>
-            <a:off x="1933576" y="4075870"/>
-            <a:ext cx="419100" cy="438150"/>
-          </a:xfrm>
-          <a:prstGeom prst="rect">
-            <a:avLst/>
-          </a:prstGeom>
-          <a:noFill/>
-          <a:ln w="38100">
-            <a:solidFill>
-              <a:srgbClr val="FF0000"/>
-            </a:solidFill>
-          </a:ln>
-        </p:spPr>
-        <p:style>
-          <a:lnRef idx="2">
-            <a:schemeClr val="accent1">
-              <a:shade val="50000"/>
-            </a:schemeClr>
-          </a:lnRef>
-          <a:fillRef idx="1">
-            <a:schemeClr val="accent1"/>
-          </a:fillRef>
-          <a:effectRef idx="0">
-            <a:schemeClr val="accent1"/>
-          </a:effectRef>
-          <a:fontRef idx="minor">
-            <a:schemeClr val="lt1"/>
-          </a:fontRef>
-        </p:style>
-        <p:txBody>
-          <a:bodyPr rtlCol="0" anchor="ctr"/>
-          <a:lstStyle/>
-          <a:p>
-            <a:pPr algn="ctr"/>
-            <a:endParaRPr lang="en-US"/>
-          </a:p>
-        </p:txBody>
-      </p:sp>
-      <p:sp>
-        <p:nvSpPr>
-          <p:cNvPr id="13" name="Rectangle 12">
-            <a:extLst>
-              <a:ext uri="{FF2B5EF4-FFF2-40B4-BE49-F238E27FC236}">
-                <a16:creationId xmlns:a16="http://schemas.microsoft.com/office/drawing/2014/main" id="{1DD38293-6697-458B-AFEA-A3CB24B96780}"/>
-              </a:ext>
-            </a:extLst>
-          </p:cNvPr>
-          <p:cNvSpPr/>
-          <p:nvPr/>
-        </p:nvSpPr>
-        <p:spPr>
-          <a:xfrm>
-            <a:off x="338138" y="4514020"/>
-            <a:ext cx="419100" cy="438150"/>
-          </a:xfrm>
-          <a:prstGeom prst="rect">
-            <a:avLst/>
-          </a:prstGeom>
-          <a:noFill/>
-          <a:ln w="38100">
-            <a:solidFill>
-              <a:srgbClr val="FF0000"/>
-            </a:solidFill>
-          </a:ln>
-        </p:spPr>
-        <p:style>
-          <a:lnRef idx="2">
-            <a:schemeClr val="accent1">
-              <a:shade val="50000"/>
-            </a:schemeClr>
-          </a:lnRef>
-          <a:fillRef idx="1">
-            <a:schemeClr val="accent1"/>
-          </a:fillRef>
-          <a:effectRef idx="0">
-            <a:schemeClr val="accent1"/>
-          </a:effectRef>
-          <a:fontRef idx="minor">
-            <a:schemeClr val="lt1"/>
-          </a:fontRef>
-        </p:style>
-        <p:txBody>
-          <a:bodyPr rtlCol="0" anchor="ctr"/>
-          <a:lstStyle/>
-          <a:p>
-            <a:pPr algn="ctr"/>
-            <a:endParaRPr lang="en-US"/>
-          </a:p>
-        </p:txBody>
-      </p:sp>
-      <p:sp>
-        <p:nvSpPr>
-          <p:cNvPr id="14" name="Rectangle 13">
-            <a:extLst>
-              <a:ext uri="{FF2B5EF4-FFF2-40B4-BE49-F238E27FC236}">
-                <a16:creationId xmlns:a16="http://schemas.microsoft.com/office/drawing/2014/main" id="{7344ADAC-FF3B-42C2-8398-C1B32F631D41}"/>
-              </a:ext>
-            </a:extLst>
-          </p:cNvPr>
-          <p:cNvSpPr/>
-          <p:nvPr/>
-        </p:nvSpPr>
-        <p:spPr>
-          <a:xfrm>
-            <a:off x="8704580" y="4018224"/>
-            <a:ext cx="419100" cy="438150"/>
-          </a:xfrm>
-          <a:prstGeom prst="rect">
-            <a:avLst/>
-          </a:prstGeom>
-          <a:noFill/>
-          <a:ln w="38100">
-            <a:solidFill>
-              <a:srgbClr val="FF0000"/>
-            </a:solidFill>
-          </a:ln>
-        </p:spPr>
-        <p:style>
-          <a:lnRef idx="2">
-            <a:schemeClr val="accent1">
-              <a:shade val="50000"/>
-            </a:schemeClr>
-          </a:lnRef>
-          <a:fillRef idx="1">
-            <a:schemeClr val="accent1"/>
-          </a:fillRef>
-          <a:effectRef idx="0">
-            <a:schemeClr val="accent1"/>
-          </a:effectRef>
-          <a:fontRef idx="minor">
-            <a:schemeClr val="lt1"/>
-          </a:fontRef>
-        </p:style>
-        <p:txBody>
-          <a:bodyPr rtlCol="0" anchor="ctr"/>
-          <a:lstStyle/>
-          <a:p>
-            <a:pPr algn="ctr"/>
-            <a:endParaRPr lang="en-US"/>
-          </a:p>
-        </p:txBody>
-      </p:sp>
-      <p:sp>
-        <p:nvSpPr>
-          <p:cNvPr id="15" name="Rectangle 14">
-            <a:extLst>
-              <a:ext uri="{FF2B5EF4-FFF2-40B4-BE49-F238E27FC236}">
-                <a16:creationId xmlns:a16="http://schemas.microsoft.com/office/drawing/2014/main" id="{33CDC63A-139E-4898-B2F0-8410B13A5466}"/>
-              </a:ext>
-            </a:extLst>
-          </p:cNvPr>
-          <p:cNvSpPr/>
-          <p:nvPr/>
-        </p:nvSpPr>
-        <p:spPr>
-          <a:xfrm>
-            <a:off x="8704580" y="4690108"/>
-            <a:ext cx="419100" cy="438150"/>
-          </a:xfrm>
-          <a:prstGeom prst="rect">
-            <a:avLst/>
-          </a:prstGeom>
-          <a:noFill/>
-          <a:ln w="38100">
-            <a:solidFill>
-              <a:srgbClr val="FF0000"/>
-            </a:solidFill>
-          </a:ln>
-        </p:spPr>
-        <p:style>
-          <a:lnRef idx="2">
-            <a:schemeClr val="accent1">
-              <a:shade val="50000"/>
-            </a:schemeClr>
-          </a:lnRef>
-          <a:fillRef idx="1">
-            <a:schemeClr val="accent1"/>
-          </a:fillRef>
-          <a:effectRef idx="0">
-            <a:schemeClr val="accent1"/>
-          </a:effectRef>
-          <a:fontRef idx="minor">
-            <a:schemeClr val="lt1"/>
-          </a:fontRef>
-        </p:style>
-        <p:txBody>
-          <a:bodyPr rtlCol="0" anchor="ctr"/>
-          <a:lstStyle/>
-          <a:p>
-            <a:pPr algn="ctr"/>
-            <a:endParaRPr lang="en-US"/>
-          </a:p>
-        </p:txBody>
-      </p:sp>
-      <p:sp>
-        <p:nvSpPr>
-          <p:cNvPr id="16" name="Rectangle 15">
-            <a:extLst>
-              <a:ext uri="{FF2B5EF4-FFF2-40B4-BE49-F238E27FC236}">
-                <a16:creationId xmlns:a16="http://schemas.microsoft.com/office/drawing/2014/main" id="{D81E73E2-77A9-4654-8B7A-2EBADC75A355}"/>
-              </a:ext>
-            </a:extLst>
-          </p:cNvPr>
-          <p:cNvSpPr/>
-          <p:nvPr/>
-        </p:nvSpPr>
-        <p:spPr>
-          <a:xfrm>
-            <a:off x="2560461" y="792906"/>
-            <a:ext cx="419100" cy="438150"/>
-          </a:xfrm>
-          <a:prstGeom prst="rect">
-            <a:avLst/>
-          </a:prstGeom>
-          <a:noFill/>
-          <a:ln w="38100">
-            <a:solidFill>
-              <a:srgbClr val="FF0000"/>
-            </a:solidFill>
-          </a:ln>
-        </p:spPr>
-        <p:style>
-          <a:lnRef idx="2">
-            <a:schemeClr val="accent1">
-              <a:shade val="50000"/>
-            </a:schemeClr>
-          </a:lnRef>
-          <a:fillRef idx="1">
-            <a:schemeClr val="accent1"/>
-          </a:fillRef>
-          <a:effectRef idx="0">
-            <a:schemeClr val="accent1"/>
-          </a:effectRef>
-          <a:fontRef idx="minor">
-            <a:schemeClr val="lt1"/>
-          </a:fontRef>
-        </p:style>
-        <p:txBody>
-          <a:bodyPr rtlCol="0" anchor="ctr"/>
-          <a:lstStyle/>
-          <a:p>
-            <a:pPr algn="ctr"/>
-            <a:endParaRPr lang="en-US"/>
-          </a:p>
-        </p:txBody>
-      </p:sp>
-      <p:sp>
-        <p:nvSpPr>
-          <p:cNvPr id="17" name="Rectangle 16">
-            <a:extLst>
-              <a:ext uri="{FF2B5EF4-FFF2-40B4-BE49-F238E27FC236}">
-                <a16:creationId xmlns:a16="http://schemas.microsoft.com/office/drawing/2014/main" id="{51F433AD-4BD1-4AC7-B101-755CEFAD720C}"/>
-              </a:ext>
-            </a:extLst>
-          </p:cNvPr>
-          <p:cNvSpPr/>
-          <p:nvPr/>
-        </p:nvSpPr>
-        <p:spPr>
-          <a:xfrm>
-            <a:off x="11249624" y="1656520"/>
-            <a:ext cx="419100" cy="438150"/>
-          </a:xfrm>
-          <a:prstGeom prst="rect">
-            <a:avLst/>
-          </a:prstGeom>
-          <a:noFill/>
-          <a:ln w="38100">
-            <a:solidFill>
-              <a:srgbClr val="FF0000"/>
-            </a:solidFill>
-          </a:ln>
-        </p:spPr>
-        <p:style>
-          <a:lnRef idx="2">
-            <a:schemeClr val="accent1">
-              <a:shade val="50000"/>
-            </a:schemeClr>
-          </a:lnRef>
-          <a:fillRef idx="1">
-            <a:schemeClr val="accent1"/>
-          </a:fillRef>
-          <a:effectRef idx="0">
-            <a:schemeClr val="accent1"/>
-          </a:effectRef>
-          <a:fontRef idx="minor">
-            <a:schemeClr val="lt1"/>
-          </a:fontRef>
-        </p:style>
-        <p:txBody>
-          <a:bodyPr rtlCol="0" anchor="ctr"/>
-          <a:lstStyle/>
-          <a:p>
-            <a:pPr algn="ctr"/>
-            <a:endParaRPr lang="en-US"/>
-          </a:p>
-        </p:txBody>
-      </p:sp>
-      <p:cxnSp>
-        <p:nvCxnSpPr>
-          <p:cNvPr id="19" name="Straight Arrow Connector 18">
-            <a:extLst>
-              <a:ext uri="{FF2B5EF4-FFF2-40B4-BE49-F238E27FC236}">
-                <a16:creationId xmlns:a16="http://schemas.microsoft.com/office/drawing/2014/main" id="{9EF15BC9-EC7C-4826-AA22-2CCFC7F612BF}"/>
-              </a:ext>
-            </a:extLst>
-          </p:cNvPr>
-          <p:cNvCxnSpPr/>
-          <p:nvPr/>
-        </p:nvCxnSpPr>
-        <p:spPr>
-          <a:xfrm>
-            <a:off x="3048000" y="1123950"/>
-            <a:ext cx="7962900" cy="733425"/>
-          </a:xfrm>
-          <a:prstGeom prst="straightConnector1">
-            <a:avLst/>
-          </a:prstGeom>
-          <a:ln w="38100">
-            <a:solidFill>
-              <a:srgbClr val="FF0000"/>
-            </a:solidFill>
-            <a:tailEnd type="triangle"/>
-          </a:ln>
-        </p:spPr>
-        <p:style>
-          <a:lnRef idx="1">
-            <a:schemeClr val="accent1"/>
-          </a:lnRef>
-          <a:fillRef idx="0">
-            <a:schemeClr val="accent1"/>
-          </a:fillRef>
-          <a:effectRef idx="0">
-            <a:schemeClr val="accent1"/>
-          </a:effectRef>
-          <a:fontRef idx="minor">
-            <a:schemeClr val="tx1"/>
-          </a:fontRef>
-        </p:style>
-      </p:cxnSp>
-      <p:cxnSp>
-        <p:nvCxnSpPr>
-          <p:cNvPr id="20" name="Straight Arrow Connector 19">
-            <a:extLst>
-              <a:ext uri="{FF2B5EF4-FFF2-40B4-BE49-F238E27FC236}">
-                <a16:creationId xmlns:a16="http://schemas.microsoft.com/office/drawing/2014/main" id="{E6780AE2-5940-4500-A19D-AA9A59F6DFB2}"/>
-              </a:ext>
-            </a:extLst>
-          </p:cNvPr>
-          <p:cNvCxnSpPr>
-            <a:cxnSpLocks/>
-          </p:cNvCxnSpPr>
-          <p:nvPr/>
-        </p:nvCxnSpPr>
-        <p:spPr>
-          <a:xfrm flipV="1">
-            <a:off x="2446656" y="4255566"/>
-            <a:ext cx="6257924" cy="57646"/>
-          </a:xfrm>
-          <a:prstGeom prst="straightConnector1">
-            <a:avLst/>
-          </a:prstGeom>
-          <a:ln w="38100">
-            <a:solidFill>
-              <a:srgbClr val="FF0000"/>
-            </a:solidFill>
-            <a:tailEnd type="triangle"/>
-          </a:ln>
-        </p:spPr>
-        <p:style>
-          <a:lnRef idx="1">
-            <a:schemeClr val="accent1"/>
-          </a:lnRef>
-          <a:fillRef idx="0">
-            <a:schemeClr val="accent1"/>
-          </a:fillRef>
-          <a:effectRef idx="0">
-            <a:schemeClr val="accent1"/>
-          </a:effectRef>
-          <a:fontRef idx="minor">
-            <a:schemeClr val="tx1"/>
-          </a:fontRef>
-        </p:style>
-      </p:cxnSp>
-      <p:cxnSp>
-        <p:nvCxnSpPr>
-          <p:cNvPr id="23" name="Straight Arrow Connector 22">
-            <a:extLst>
-              <a:ext uri="{FF2B5EF4-FFF2-40B4-BE49-F238E27FC236}">
-                <a16:creationId xmlns:a16="http://schemas.microsoft.com/office/drawing/2014/main" id="{7063558D-3815-426D-BE07-14F167379C00}"/>
-              </a:ext>
-            </a:extLst>
-          </p:cNvPr>
-          <p:cNvCxnSpPr>
-            <a:cxnSpLocks/>
-          </p:cNvCxnSpPr>
-          <p:nvPr/>
-        </p:nvCxnSpPr>
-        <p:spPr>
-          <a:xfrm>
-            <a:off x="757238" y="4690109"/>
-            <a:ext cx="7930478" cy="262061"/>
-          </a:xfrm>
-          <a:prstGeom prst="straightConnector1">
-            <a:avLst/>
-          </a:prstGeom>
-          <a:ln w="38100">
-            <a:solidFill>
-              <a:srgbClr val="FF0000"/>
-            </a:solidFill>
-            <a:tailEnd type="triangle"/>
-          </a:ln>
-        </p:spPr>
-        <p:style>
-          <a:lnRef idx="1">
-            <a:schemeClr val="accent1"/>
-          </a:lnRef>
-          <a:fillRef idx="0">
-            <a:schemeClr val="accent1"/>
-          </a:fillRef>
-          <a:effectRef idx="0">
-            <a:schemeClr val="accent1"/>
-          </a:effectRef>
-          <a:fontRef idx="minor">
-            <a:schemeClr val="tx1"/>
-          </a:fontRef>
-        </p:style>
-      </p:cxnSp>
-    </p:spTree>
-    <p:extLst>
-      <p:ext uri="{BB962C8B-B14F-4D97-AF65-F5344CB8AC3E}">
-        <p14:creationId xmlns:p14="http://schemas.microsoft.com/office/powerpoint/2010/main" val="3935973818"/>
-      </p:ext>
-    </p:extLst>
-  </p:cSld>
-  <p:clrMapOvr>
-    <a:masterClrMapping/>
-  </p:clrMapOvr>
-  <p:timing>
-    <p:tnLst>
-      <p:par>
-        <p:cTn id="1" dur="indefinite" restart="never" nodeType="tmRoot">
-          <p:childTnLst>
-            <p:seq concurrent="1" nextAc="seek">
-              <p:cTn id="2" dur="indefinite" nodeType="mainSeq">
-                <p:childTnLst>
-                  <p:par>
-                    <p:cTn id="3" fill="hold">
-                      <p:stCondLst>
-                        <p:cond delay="indefinite"/>
-                      </p:stCondLst>
-                      <p:childTnLst>
-                        <p:par>
-                          <p:cTn id="4" fill="hold">
-                            <p:stCondLst>
-                              <p:cond delay="0"/>
-                            </p:stCondLst>
-                            <p:childTnLst>
-                              <p:par>
-                                <p:cTn id="5" presetID="10" presetClass="entr" presetSubtype="0" fill="hold" nodeType="clickEffect">
-                                  <p:stCondLst>
-                                    <p:cond delay="0"/>
-                                  </p:stCondLst>
-                                  <p:childTnLst>
-                                    <p:set>
-                                      <p:cBhvr>
-                                        <p:cTn id="6" dur="1" fill="hold">
-                                          <p:stCondLst>
-                                            <p:cond delay="0"/>
-                                          </p:stCondLst>
-                                        </p:cTn>
-                                        <p:tgtEl>
-                                          <p:spTgt spid="7"/>
-                                        </p:tgtEl>
-                                        <p:attrNameLst>
-                                          <p:attrName>style.visibility</p:attrName>
-                                        </p:attrNameLst>
-                                      </p:cBhvr>
-                                      <p:to>
-                                        <p:strVal val="visible"/>
-                                      </p:to>
-                                    </p:set>
-                                    <p:animEffect transition="in" filter="fade">
-                                      <p:cBhvr>
-                                        <p:cTn id="7" dur="500"/>
-                                        <p:tgtEl>
-                                          <p:spTgt spid="7"/>
-                                        </p:tgtEl>
-                                      </p:cBhvr>
-                                    </p:animEffect>
-                                  </p:childTnLst>
-                                </p:cTn>
-                              </p:par>
-                            </p:childTnLst>
-                          </p:cTn>
-                        </p:par>
-                      </p:childTnLst>
-                    </p:cTn>
-                  </p:par>
-                  <p:par>
-                    <p:cTn id="8" fill="hold">
-                      <p:stCondLst>
-                        <p:cond delay="indefinite"/>
-                      </p:stCondLst>
-                      <p:childTnLst>
-                        <p:par>
-                          <p:cTn id="9" fill="hold">
-                            <p:stCondLst>
-                              <p:cond delay="0"/>
-                            </p:stCondLst>
-                            <p:childTnLst>
-                              <p:par>
-                                <p:cTn id="10" presetID="10" presetClass="entr" presetSubtype="0" fill="hold" nodeType="clickEffect">
-                                  <p:stCondLst>
-                                    <p:cond delay="0"/>
-                                  </p:stCondLst>
-                                  <p:childTnLst>
-                                    <p:set>
-                                      <p:cBhvr>
-                                        <p:cTn id="11" dur="1" fill="hold">
-                                          <p:stCondLst>
-                                            <p:cond delay="0"/>
-                                          </p:stCondLst>
-                                        </p:cTn>
-                                        <p:tgtEl>
-                                          <p:spTgt spid="11"/>
-                                        </p:tgtEl>
-                                        <p:attrNameLst>
-                                          <p:attrName>style.visibility</p:attrName>
-                                        </p:attrNameLst>
-                                      </p:cBhvr>
-                                      <p:to>
-                                        <p:strVal val="visible"/>
-                                      </p:to>
-                                    </p:set>
-                                    <p:animEffect transition="in" filter="fade">
-                                      <p:cBhvr>
-                                        <p:cTn id="12" dur="500"/>
-                                        <p:tgtEl>
-                                          <p:spTgt spid="11"/>
-                                        </p:tgtEl>
-                                      </p:cBhvr>
-                                    </p:animEffect>
-                                  </p:childTnLst>
-                                </p:cTn>
-                              </p:par>
-                              <p:par>
-                                <p:cTn id="13" presetID="10" presetClass="entr" presetSubtype="0" fill="hold" nodeType="withEffect">
-                                  <p:stCondLst>
-                                    <p:cond delay="0"/>
-                                  </p:stCondLst>
-                                  <p:childTnLst>
-                                    <p:set>
-                                      <p:cBhvr>
-                                        <p:cTn id="14" dur="1" fill="hold">
-                                          <p:stCondLst>
-                                            <p:cond delay="0"/>
-                                          </p:stCondLst>
-                                        </p:cTn>
-                                        <p:tgtEl>
-                                          <p:spTgt spid="9"/>
-                                        </p:tgtEl>
-                                        <p:attrNameLst>
-                                          <p:attrName>style.visibility</p:attrName>
-                                        </p:attrNameLst>
-                                      </p:cBhvr>
-                                      <p:to>
-                                        <p:strVal val="visible"/>
-                                      </p:to>
-                                    </p:set>
-                                    <p:animEffect transition="in" filter="fade">
-                                      <p:cBhvr>
-                                        <p:cTn id="15" dur="500"/>
-                                        <p:tgtEl>
-                                          <p:spTgt spid="9"/>
-                                        </p:tgtEl>
-                                      </p:cBhvr>
-                                    </p:animEffect>
-                                  </p:childTnLst>
-                                </p:cTn>
-                              </p:par>
-                            </p:childTnLst>
-                          </p:cTn>
-                        </p:par>
-                      </p:childTnLst>
-                    </p:cTn>
-                  </p:par>
-                  <p:par>
-                    <p:cTn id="16" fill="hold">
-                      <p:stCondLst>
-                        <p:cond delay="indefinite"/>
-                      </p:stCondLst>
-                      <p:childTnLst>
-                        <p:par>
-                          <p:cTn id="17" fill="hold">
-                            <p:stCondLst>
-                              <p:cond delay="0"/>
-                            </p:stCondLst>
-                            <p:childTnLst>
-                              <p:par>
-                                <p:cTn id="18" presetID="42" presetClass="entr" presetSubtype="0" fill="hold" grpId="0" nodeType="clickEffect">
-                                  <p:stCondLst>
-                                    <p:cond delay="0"/>
-                                  </p:stCondLst>
-                                  <p:childTnLst>
-                                    <p:set>
-                                      <p:cBhvr>
-                                        <p:cTn id="19" dur="1" fill="hold">
-                                          <p:stCondLst>
-                                            <p:cond delay="0"/>
-                                          </p:stCondLst>
-                                        </p:cTn>
-                                        <p:tgtEl>
-                                          <p:spTgt spid="16"/>
-                                        </p:tgtEl>
-                                        <p:attrNameLst>
-                                          <p:attrName>style.visibility</p:attrName>
-                                        </p:attrNameLst>
-                                      </p:cBhvr>
-                                      <p:to>
-                                        <p:strVal val="visible"/>
-                                      </p:to>
-                                    </p:set>
-                                    <p:animEffect transition="in" filter="fade">
-                                      <p:cBhvr>
-                                        <p:cTn id="20" dur="1000"/>
-                                        <p:tgtEl>
-                                          <p:spTgt spid="16"/>
-                                        </p:tgtEl>
-                                      </p:cBhvr>
-                                    </p:animEffect>
-                                    <p:anim calcmode="lin" valueType="num">
-                                      <p:cBhvr>
-                                        <p:cTn id="21" dur="1000" fill="hold"/>
-                                        <p:tgtEl>
-                                          <p:spTgt spid="16"/>
-                                        </p:tgtEl>
-                                        <p:attrNameLst>
-                                          <p:attrName>ppt_x</p:attrName>
-                                        </p:attrNameLst>
-                                      </p:cBhvr>
-                                      <p:tavLst>
-                                        <p:tav tm="0">
-                                          <p:val>
-                                            <p:strVal val="#ppt_x"/>
-                                          </p:val>
-                                        </p:tav>
-                                        <p:tav tm="100000">
-                                          <p:val>
-                                            <p:strVal val="#ppt_x"/>
-                                          </p:val>
-                                        </p:tav>
-                                      </p:tavLst>
-                                    </p:anim>
-                                    <p:anim calcmode="lin" valueType="num">
-                                      <p:cBhvr>
-                                        <p:cTn id="22" dur="1000" fill="hold"/>
-                                        <p:tgtEl>
-                                          <p:spTgt spid="16"/>
-                                        </p:tgtEl>
-                                        <p:attrNameLst>
-                                          <p:attrName>ppt_y</p:attrName>
-                                        </p:attrNameLst>
-                                      </p:cBhvr>
-                                      <p:tavLst>
-                                        <p:tav tm="0">
-                                          <p:val>
-                                            <p:strVal val="#ppt_y+.1"/>
-                                          </p:val>
-                                        </p:tav>
-                                        <p:tav tm="100000">
-                                          <p:val>
-                                            <p:strVal val="#ppt_y"/>
-                                          </p:val>
-                                        </p:tav>
-                                      </p:tavLst>
-                                    </p:anim>
-                                  </p:childTnLst>
-                                </p:cTn>
-                              </p:par>
-                              <p:par>
-                                <p:cTn id="23" presetID="42" presetClass="entr" presetSubtype="0" fill="hold" nodeType="withEffect">
-                                  <p:stCondLst>
-                                    <p:cond delay="0"/>
-                                  </p:stCondLst>
-                                  <p:childTnLst>
-                                    <p:set>
-                                      <p:cBhvr>
-                                        <p:cTn id="24" dur="1" fill="hold">
-                                          <p:stCondLst>
-                                            <p:cond delay="0"/>
-                                          </p:stCondLst>
-                                        </p:cTn>
-                                        <p:tgtEl>
-                                          <p:spTgt spid="19"/>
-                                        </p:tgtEl>
-                                        <p:attrNameLst>
-                                          <p:attrName>style.visibility</p:attrName>
-                                        </p:attrNameLst>
-                                      </p:cBhvr>
-                                      <p:to>
-                                        <p:strVal val="visible"/>
-                                      </p:to>
-                                    </p:set>
-                                    <p:animEffect transition="in" filter="fade">
-                                      <p:cBhvr>
-                                        <p:cTn id="25" dur="1000"/>
-                                        <p:tgtEl>
-                                          <p:spTgt spid="19"/>
-                                        </p:tgtEl>
-                                      </p:cBhvr>
-                                    </p:animEffect>
-                                    <p:anim calcmode="lin" valueType="num">
-                                      <p:cBhvr>
-                                        <p:cTn id="26" dur="1000" fill="hold"/>
-                                        <p:tgtEl>
-                                          <p:spTgt spid="19"/>
-                                        </p:tgtEl>
-                                        <p:attrNameLst>
-                                          <p:attrName>ppt_x</p:attrName>
-                                        </p:attrNameLst>
-                                      </p:cBhvr>
-                                      <p:tavLst>
-                                        <p:tav tm="0">
-                                          <p:val>
-                                            <p:strVal val="#ppt_x"/>
-                                          </p:val>
-                                        </p:tav>
-                                        <p:tav tm="100000">
-                                          <p:val>
-                                            <p:strVal val="#ppt_x"/>
-                                          </p:val>
-                                        </p:tav>
-                                      </p:tavLst>
-                                    </p:anim>
-                                    <p:anim calcmode="lin" valueType="num">
-                                      <p:cBhvr>
-                                        <p:cTn id="27" dur="1000" fill="hold"/>
-                                        <p:tgtEl>
-                                          <p:spTgt spid="19"/>
-                                        </p:tgtEl>
-                                        <p:attrNameLst>
-                                          <p:attrName>ppt_y</p:attrName>
-                                        </p:attrNameLst>
-                                      </p:cBhvr>
-                                      <p:tavLst>
-                                        <p:tav tm="0">
-                                          <p:val>
-                                            <p:strVal val="#ppt_y+.1"/>
-                                          </p:val>
-                                        </p:tav>
-                                        <p:tav tm="100000">
-                                          <p:val>
-                                            <p:strVal val="#ppt_y"/>
-                                          </p:val>
-                                        </p:tav>
-                                      </p:tavLst>
-                                    </p:anim>
-                                  </p:childTnLst>
-                                </p:cTn>
-                              </p:par>
-                              <p:par>
-                                <p:cTn id="28" presetID="42" presetClass="entr" presetSubtype="0" fill="hold" grpId="0" nodeType="withEffect">
-                                  <p:stCondLst>
-                                    <p:cond delay="0"/>
-                                  </p:stCondLst>
-                                  <p:childTnLst>
-                                    <p:set>
-                                      <p:cBhvr>
-                                        <p:cTn id="29" dur="1" fill="hold">
-                                          <p:stCondLst>
-                                            <p:cond delay="0"/>
-                                          </p:stCondLst>
-                                        </p:cTn>
-                                        <p:tgtEl>
-                                          <p:spTgt spid="17"/>
-                                        </p:tgtEl>
-                                        <p:attrNameLst>
-                                          <p:attrName>style.visibility</p:attrName>
-                                        </p:attrNameLst>
-                                      </p:cBhvr>
-                                      <p:to>
-                                        <p:strVal val="visible"/>
-                                      </p:to>
-                                    </p:set>
-                                    <p:animEffect transition="in" filter="fade">
-                                      <p:cBhvr>
-                                        <p:cTn id="30" dur="1000"/>
-                                        <p:tgtEl>
-                                          <p:spTgt spid="17"/>
-                                        </p:tgtEl>
-                                      </p:cBhvr>
-                                    </p:animEffect>
-                                    <p:anim calcmode="lin" valueType="num">
-                                      <p:cBhvr>
-                                        <p:cTn id="31" dur="1000" fill="hold"/>
-                                        <p:tgtEl>
-                                          <p:spTgt spid="17"/>
-                                        </p:tgtEl>
-                                        <p:attrNameLst>
-                                          <p:attrName>ppt_x</p:attrName>
-                                        </p:attrNameLst>
-                                      </p:cBhvr>
-                                      <p:tavLst>
-                                        <p:tav tm="0">
-                                          <p:val>
-                                            <p:strVal val="#ppt_x"/>
-                                          </p:val>
-                                        </p:tav>
-                                        <p:tav tm="100000">
-                                          <p:val>
-                                            <p:strVal val="#ppt_x"/>
-                                          </p:val>
-                                        </p:tav>
-                                      </p:tavLst>
-                                    </p:anim>
-                                    <p:anim calcmode="lin" valueType="num">
-                                      <p:cBhvr>
-                                        <p:cTn id="32" dur="1000" fill="hold"/>
-                                        <p:tgtEl>
-                                          <p:spTgt spid="17"/>
-                                        </p:tgtEl>
-                                        <p:attrNameLst>
-                                          <p:attrName>ppt_y</p:attrName>
-                                        </p:attrNameLst>
-                                      </p:cBhvr>
-                                      <p:tavLst>
-                                        <p:tav tm="0">
-                                          <p:val>
-                                            <p:strVal val="#ppt_y+.1"/>
-                                          </p:val>
-                                        </p:tav>
-                                        <p:tav tm="100000">
-                                          <p:val>
-                                            <p:strVal val="#ppt_y"/>
-                                          </p:val>
-                                        </p:tav>
-                                      </p:tavLst>
-                                    </p:anim>
-                                  </p:childTnLst>
-                                </p:cTn>
-                              </p:par>
-                            </p:childTnLst>
-                          </p:cTn>
-                        </p:par>
-                      </p:childTnLst>
-                    </p:cTn>
-                  </p:par>
-                  <p:par>
-                    <p:cTn id="33" fill="hold">
-                      <p:stCondLst>
-                        <p:cond delay="indefinite"/>
-                      </p:stCondLst>
-                      <p:childTnLst>
-                        <p:par>
-                          <p:cTn id="34" fill="hold">
-                            <p:stCondLst>
-                              <p:cond delay="0"/>
-                            </p:stCondLst>
-                            <p:childTnLst>
-                              <p:par>
-                                <p:cTn id="35" presetID="42" presetClass="entr" presetSubtype="0" fill="hold" grpId="0" nodeType="clickEffect">
-                                  <p:stCondLst>
-                                    <p:cond delay="0"/>
-                                  </p:stCondLst>
-                                  <p:childTnLst>
-                                    <p:set>
-                                      <p:cBhvr>
-                                        <p:cTn id="36" dur="1" fill="hold">
-                                          <p:stCondLst>
-                                            <p:cond delay="0"/>
-                                          </p:stCondLst>
-                                        </p:cTn>
-                                        <p:tgtEl>
-                                          <p:spTgt spid="12"/>
-                                        </p:tgtEl>
-                                        <p:attrNameLst>
-                                          <p:attrName>style.visibility</p:attrName>
-                                        </p:attrNameLst>
-                                      </p:cBhvr>
-                                      <p:to>
-                                        <p:strVal val="visible"/>
-                                      </p:to>
-                                    </p:set>
-                                    <p:animEffect transition="in" filter="fade">
-                                      <p:cBhvr>
-                                        <p:cTn id="37" dur="1000"/>
-                                        <p:tgtEl>
-                                          <p:spTgt spid="12"/>
-                                        </p:tgtEl>
-                                      </p:cBhvr>
-                                    </p:animEffect>
-                                    <p:anim calcmode="lin" valueType="num">
-                                      <p:cBhvr>
-                                        <p:cTn id="38" dur="1000" fill="hold"/>
-                                        <p:tgtEl>
-                                          <p:spTgt spid="12"/>
-                                        </p:tgtEl>
-                                        <p:attrNameLst>
-                                          <p:attrName>ppt_x</p:attrName>
-                                        </p:attrNameLst>
-                                      </p:cBhvr>
-                                      <p:tavLst>
-                                        <p:tav tm="0">
-                                          <p:val>
-                                            <p:strVal val="#ppt_x"/>
-                                          </p:val>
-                                        </p:tav>
-                                        <p:tav tm="100000">
-                                          <p:val>
-                                            <p:strVal val="#ppt_x"/>
-                                          </p:val>
-                                        </p:tav>
-                                      </p:tavLst>
-                                    </p:anim>
-                                    <p:anim calcmode="lin" valueType="num">
-                                      <p:cBhvr>
-                                        <p:cTn id="39" dur="1000" fill="hold"/>
-                                        <p:tgtEl>
-                                          <p:spTgt spid="12"/>
-                                        </p:tgtEl>
-                                        <p:attrNameLst>
-                                          <p:attrName>ppt_y</p:attrName>
-                                        </p:attrNameLst>
-                                      </p:cBhvr>
-                                      <p:tavLst>
-                                        <p:tav tm="0">
-                                          <p:val>
-                                            <p:strVal val="#ppt_y+.1"/>
-                                          </p:val>
-                                        </p:tav>
-                                        <p:tav tm="100000">
-                                          <p:val>
-                                            <p:strVal val="#ppt_y"/>
-                                          </p:val>
-                                        </p:tav>
-                                      </p:tavLst>
-                                    </p:anim>
-                                  </p:childTnLst>
-                                </p:cTn>
-                              </p:par>
-                              <p:par>
-                                <p:cTn id="40" presetID="42" presetClass="entr" presetSubtype="0" fill="hold" nodeType="withEffect">
-                                  <p:stCondLst>
-                                    <p:cond delay="0"/>
-                                  </p:stCondLst>
-                                  <p:childTnLst>
-                                    <p:set>
-                                      <p:cBhvr>
-                                        <p:cTn id="41" dur="1" fill="hold">
-                                          <p:stCondLst>
-                                            <p:cond delay="0"/>
-                                          </p:stCondLst>
-                                        </p:cTn>
-                                        <p:tgtEl>
-                                          <p:spTgt spid="20"/>
-                                        </p:tgtEl>
-                                        <p:attrNameLst>
-                                          <p:attrName>style.visibility</p:attrName>
-                                        </p:attrNameLst>
-                                      </p:cBhvr>
-                                      <p:to>
-                                        <p:strVal val="visible"/>
-                                      </p:to>
-                                    </p:set>
-                                    <p:animEffect transition="in" filter="fade">
-                                      <p:cBhvr>
-                                        <p:cTn id="42" dur="1000"/>
-                                        <p:tgtEl>
-                                          <p:spTgt spid="20"/>
-                                        </p:tgtEl>
-                                      </p:cBhvr>
-                                    </p:animEffect>
-                                    <p:anim calcmode="lin" valueType="num">
-                                      <p:cBhvr>
-                                        <p:cTn id="43" dur="1000" fill="hold"/>
-                                        <p:tgtEl>
-                                          <p:spTgt spid="20"/>
-                                        </p:tgtEl>
-                                        <p:attrNameLst>
-                                          <p:attrName>ppt_x</p:attrName>
-                                        </p:attrNameLst>
-                                      </p:cBhvr>
-                                      <p:tavLst>
-                                        <p:tav tm="0">
-                                          <p:val>
-                                            <p:strVal val="#ppt_x"/>
-                                          </p:val>
-                                        </p:tav>
-                                        <p:tav tm="100000">
-                                          <p:val>
-                                            <p:strVal val="#ppt_x"/>
-                                          </p:val>
-                                        </p:tav>
-                                      </p:tavLst>
-                                    </p:anim>
-                                    <p:anim calcmode="lin" valueType="num">
-                                      <p:cBhvr>
-                                        <p:cTn id="44" dur="1000" fill="hold"/>
-                                        <p:tgtEl>
-                                          <p:spTgt spid="20"/>
-                                        </p:tgtEl>
-                                        <p:attrNameLst>
-                                          <p:attrName>ppt_y</p:attrName>
-                                        </p:attrNameLst>
-                                      </p:cBhvr>
-                                      <p:tavLst>
-                                        <p:tav tm="0">
-                                          <p:val>
-                                            <p:strVal val="#ppt_y+.1"/>
-                                          </p:val>
-                                        </p:tav>
-                                        <p:tav tm="100000">
-                                          <p:val>
-                                            <p:strVal val="#ppt_y"/>
-                                          </p:val>
-                                        </p:tav>
-                                      </p:tavLst>
-                                    </p:anim>
-                                  </p:childTnLst>
-                                </p:cTn>
-                              </p:par>
-                              <p:par>
-                                <p:cTn id="45" presetID="42" presetClass="entr" presetSubtype="0" fill="hold" grpId="0" nodeType="withEffect">
-                                  <p:stCondLst>
-                                    <p:cond delay="0"/>
-                                  </p:stCondLst>
-                                  <p:childTnLst>
-                                    <p:set>
-                                      <p:cBhvr>
-                                        <p:cTn id="46" dur="1" fill="hold">
-                                          <p:stCondLst>
-                                            <p:cond delay="0"/>
-                                          </p:stCondLst>
-                                        </p:cTn>
-                                        <p:tgtEl>
-                                          <p:spTgt spid="14"/>
-                                        </p:tgtEl>
-                                        <p:attrNameLst>
-                                          <p:attrName>style.visibility</p:attrName>
-                                        </p:attrNameLst>
-                                      </p:cBhvr>
-                                      <p:to>
-                                        <p:strVal val="visible"/>
-                                      </p:to>
-                                    </p:set>
-                                    <p:animEffect transition="in" filter="fade">
-                                      <p:cBhvr>
-                                        <p:cTn id="47" dur="1000"/>
-                                        <p:tgtEl>
-                                          <p:spTgt spid="14"/>
-                                        </p:tgtEl>
-                                      </p:cBhvr>
-                                    </p:animEffect>
-                                    <p:anim calcmode="lin" valueType="num">
-                                      <p:cBhvr>
-                                        <p:cTn id="48" dur="1000" fill="hold"/>
-                                        <p:tgtEl>
-                                          <p:spTgt spid="14"/>
-                                        </p:tgtEl>
-                                        <p:attrNameLst>
-                                          <p:attrName>ppt_x</p:attrName>
-                                        </p:attrNameLst>
-                                      </p:cBhvr>
-                                      <p:tavLst>
-                                        <p:tav tm="0">
-                                          <p:val>
-                                            <p:strVal val="#ppt_x"/>
-                                          </p:val>
-                                        </p:tav>
-                                        <p:tav tm="100000">
-                                          <p:val>
-                                            <p:strVal val="#ppt_x"/>
-                                          </p:val>
-                                        </p:tav>
-                                      </p:tavLst>
-                                    </p:anim>
-                                    <p:anim calcmode="lin" valueType="num">
-                                      <p:cBhvr>
-                                        <p:cTn id="49" dur="1000" fill="hold"/>
-                                        <p:tgtEl>
-                                          <p:spTgt spid="14"/>
-                                        </p:tgtEl>
-                                        <p:attrNameLst>
-                                          <p:attrName>ppt_y</p:attrName>
-                                        </p:attrNameLst>
-                                      </p:cBhvr>
-                                      <p:tavLst>
-                                        <p:tav tm="0">
-                                          <p:val>
-                                            <p:strVal val="#ppt_y+.1"/>
-                                          </p:val>
-                                        </p:tav>
-                                        <p:tav tm="100000">
-                                          <p:val>
-                                            <p:strVal val="#ppt_y"/>
-                                          </p:val>
-                                        </p:tav>
-                                      </p:tavLst>
-                                    </p:anim>
-                                  </p:childTnLst>
-                                </p:cTn>
-                              </p:par>
-                            </p:childTnLst>
-                          </p:cTn>
-                        </p:par>
-                      </p:childTnLst>
-                    </p:cTn>
-                  </p:par>
-                  <p:par>
-                    <p:cTn id="50" fill="hold">
-                      <p:stCondLst>
-                        <p:cond delay="indefinite"/>
-                      </p:stCondLst>
-                      <p:childTnLst>
-                        <p:par>
-                          <p:cTn id="51" fill="hold">
-                            <p:stCondLst>
-                              <p:cond delay="0"/>
-                            </p:stCondLst>
-                            <p:childTnLst>
-                              <p:par>
-                                <p:cTn id="52" presetID="42" presetClass="entr" presetSubtype="0" fill="hold" nodeType="clickEffect">
-                                  <p:stCondLst>
-                                    <p:cond delay="0"/>
-                                  </p:stCondLst>
-                                  <p:childTnLst>
-                                    <p:set>
-                                      <p:cBhvr>
-                                        <p:cTn id="53" dur="1" fill="hold">
-                                          <p:stCondLst>
-                                            <p:cond delay="0"/>
-                                          </p:stCondLst>
-                                        </p:cTn>
-                                        <p:tgtEl>
-                                          <p:spTgt spid="23"/>
-                                        </p:tgtEl>
-                                        <p:attrNameLst>
-                                          <p:attrName>style.visibility</p:attrName>
-                                        </p:attrNameLst>
-                                      </p:cBhvr>
-                                      <p:to>
-                                        <p:strVal val="visible"/>
-                                      </p:to>
-                                    </p:set>
-                                    <p:animEffect transition="in" filter="fade">
-                                      <p:cBhvr>
-                                        <p:cTn id="54" dur="1000"/>
-                                        <p:tgtEl>
-                                          <p:spTgt spid="23"/>
-                                        </p:tgtEl>
-                                      </p:cBhvr>
-                                    </p:animEffect>
-                                    <p:anim calcmode="lin" valueType="num">
-                                      <p:cBhvr>
-                                        <p:cTn id="55" dur="1000" fill="hold"/>
-                                        <p:tgtEl>
-                                          <p:spTgt spid="23"/>
-                                        </p:tgtEl>
-                                        <p:attrNameLst>
-                                          <p:attrName>ppt_x</p:attrName>
-                                        </p:attrNameLst>
-                                      </p:cBhvr>
-                                      <p:tavLst>
-                                        <p:tav tm="0">
-                                          <p:val>
-                                            <p:strVal val="#ppt_x"/>
-                                          </p:val>
-                                        </p:tav>
-                                        <p:tav tm="100000">
-                                          <p:val>
-                                            <p:strVal val="#ppt_x"/>
-                                          </p:val>
-                                        </p:tav>
-                                      </p:tavLst>
-                                    </p:anim>
-                                    <p:anim calcmode="lin" valueType="num">
-                                      <p:cBhvr>
-                                        <p:cTn id="56" dur="1000" fill="hold"/>
-                                        <p:tgtEl>
-                                          <p:spTgt spid="23"/>
-                                        </p:tgtEl>
-                                        <p:attrNameLst>
-                                          <p:attrName>ppt_y</p:attrName>
-                                        </p:attrNameLst>
-                                      </p:cBhvr>
-                                      <p:tavLst>
-                                        <p:tav tm="0">
-                                          <p:val>
-                                            <p:strVal val="#ppt_y+.1"/>
-                                          </p:val>
-                                        </p:tav>
-                                        <p:tav tm="100000">
-                                          <p:val>
-                                            <p:strVal val="#ppt_y"/>
-                                          </p:val>
-                                        </p:tav>
-                                      </p:tavLst>
-                                    </p:anim>
-                                  </p:childTnLst>
-                                </p:cTn>
-                              </p:par>
-                              <p:par>
-                                <p:cTn id="57" presetID="42" presetClass="entr" presetSubtype="0" fill="hold" grpId="0" nodeType="withEffect">
-                                  <p:stCondLst>
-                                    <p:cond delay="0"/>
-                                  </p:stCondLst>
-                                  <p:childTnLst>
-                                    <p:set>
-                                      <p:cBhvr>
-                                        <p:cTn id="58" dur="1" fill="hold">
-                                          <p:stCondLst>
-                                            <p:cond delay="0"/>
-                                          </p:stCondLst>
-                                        </p:cTn>
-                                        <p:tgtEl>
-                                          <p:spTgt spid="13"/>
-                                        </p:tgtEl>
-                                        <p:attrNameLst>
-                                          <p:attrName>style.visibility</p:attrName>
-                                        </p:attrNameLst>
-                                      </p:cBhvr>
-                                      <p:to>
-                                        <p:strVal val="visible"/>
-                                      </p:to>
-                                    </p:set>
-                                    <p:animEffect transition="in" filter="fade">
-                                      <p:cBhvr>
-                                        <p:cTn id="59" dur="1000"/>
-                                        <p:tgtEl>
-                                          <p:spTgt spid="13"/>
-                                        </p:tgtEl>
-                                      </p:cBhvr>
-                                    </p:animEffect>
-                                    <p:anim calcmode="lin" valueType="num">
-                                      <p:cBhvr>
-                                        <p:cTn id="60" dur="1000" fill="hold"/>
-                                        <p:tgtEl>
-                                          <p:spTgt spid="13"/>
-                                        </p:tgtEl>
-                                        <p:attrNameLst>
-                                          <p:attrName>ppt_x</p:attrName>
-                                        </p:attrNameLst>
-                                      </p:cBhvr>
-                                      <p:tavLst>
-                                        <p:tav tm="0">
-                                          <p:val>
-                                            <p:strVal val="#ppt_x"/>
-                                          </p:val>
-                                        </p:tav>
-                                        <p:tav tm="100000">
-                                          <p:val>
-                                            <p:strVal val="#ppt_x"/>
-                                          </p:val>
-                                        </p:tav>
-                                      </p:tavLst>
-                                    </p:anim>
-                                    <p:anim calcmode="lin" valueType="num">
-                                      <p:cBhvr>
-                                        <p:cTn id="61" dur="1000" fill="hold"/>
-                                        <p:tgtEl>
-                                          <p:spTgt spid="13"/>
-                                        </p:tgtEl>
-                                        <p:attrNameLst>
-                                          <p:attrName>ppt_y</p:attrName>
-                                        </p:attrNameLst>
-                                      </p:cBhvr>
-                                      <p:tavLst>
-                                        <p:tav tm="0">
-                                          <p:val>
-                                            <p:strVal val="#ppt_y+.1"/>
-                                          </p:val>
-                                        </p:tav>
-                                        <p:tav tm="100000">
-                                          <p:val>
-                                            <p:strVal val="#ppt_y"/>
-                                          </p:val>
-                                        </p:tav>
-                                      </p:tavLst>
-                                    </p:anim>
-                                  </p:childTnLst>
-                                </p:cTn>
-                              </p:par>
-                              <p:par>
-                                <p:cTn id="62" presetID="42" presetClass="entr" presetSubtype="0" fill="hold" grpId="0" nodeType="withEffect">
-                                  <p:stCondLst>
-                                    <p:cond delay="0"/>
-                                  </p:stCondLst>
-                                  <p:childTnLst>
-                                    <p:set>
-                                      <p:cBhvr>
-                                        <p:cTn id="63" dur="1" fill="hold">
-                                          <p:stCondLst>
-                                            <p:cond delay="0"/>
-                                          </p:stCondLst>
-                                        </p:cTn>
-                                        <p:tgtEl>
-                                          <p:spTgt spid="15"/>
-                                        </p:tgtEl>
-                                        <p:attrNameLst>
-                                          <p:attrName>style.visibility</p:attrName>
-                                        </p:attrNameLst>
-                                      </p:cBhvr>
-                                      <p:to>
-                                        <p:strVal val="visible"/>
-                                      </p:to>
-                                    </p:set>
-                                    <p:animEffect transition="in" filter="fade">
-                                      <p:cBhvr>
-                                        <p:cTn id="64" dur="1000"/>
-                                        <p:tgtEl>
-                                          <p:spTgt spid="15"/>
-                                        </p:tgtEl>
-                                      </p:cBhvr>
-                                    </p:animEffect>
-                                    <p:anim calcmode="lin" valueType="num">
-                                      <p:cBhvr>
-                                        <p:cTn id="65" dur="1000" fill="hold"/>
-                                        <p:tgtEl>
-                                          <p:spTgt spid="15"/>
-                                        </p:tgtEl>
-                                        <p:attrNameLst>
-                                          <p:attrName>ppt_x</p:attrName>
-                                        </p:attrNameLst>
-                                      </p:cBhvr>
-                                      <p:tavLst>
-                                        <p:tav tm="0">
-                                          <p:val>
-                                            <p:strVal val="#ppt_x"/>
-                                          </p:val>
-                                        </p:tav>
-                                        <p:tav tm="100000">
-                                          <p:val>
-                                            <p:strVal val="#ppt_x"/>
-                                          </p:val>
-                                        </p:tav>
-                                      </p:tavLst>
-                                    </p:anim>
-                                    <p:anim calcmode="lin" valueType="num">
-                                      <p:cBhvr>
-                                        <p:cTn id="66" dur="1000" fill="hold"/>
-                                        <p:tgtEl>
-                                          <p:spTgt spid="15"/>
-                                        </p:tgtEl>
-                                        <p:attrNameLst>
-                                          <p:attrName>ppt_y</p:attrName>
-                                        </p:attrNameLst>
-                                      </p:cBhvr>
-                                      <p:tavLst>
-                                        <p:tav tm="0">
-                                          <p:val>
-                                            <p:strVal val="#ppt_y+.1"/>
-                                          </p:val>
-                                        </p:tav>
-                                        <p:tav tm="100000">
-                                          <p:val>
-                                            <p:strVal val="#ppt_y"/>
-                                          </p:val>
-                                        </p:tav>
-                                      </p:tavLst>
-                                    </p:anim>
-                                  </p:childTnLst>
-                                </p:cTn>
-                              </p:par>
-                            </p:childTnLst>
-                          </p:cTn>
-                        </p:par>
-                      </p:childTnLst>
-                    </p:cTn>
-                  </p:par>
-                </p:childTnLst>
-              </p:cTn>
-              <p:prevCondLst>
-                <p:cond evt="onPrev" delay="0">
-                  <p:tgtEl>
-                    <p:sldTgt/>
-                  </p:tgtEl>
-                </p:cond>
-              </p:prevCondLst>
-              <p:nextCondLst>
-                <p:cond evt="onNext" delay="0">
-                  <p:tgtEl>
-                    <p:sldTgt/>
-                  </p:tgtEl>
-                </p:cond>
-              </p:nextCondLst>
-            </p:seq>
-          </p:childTnLst>
-        </p:cTn>
-      </p:par>
-    </p:tnLst>
-    <p:bldLst>
-      <p:bldP spid="12" grpId="0" animBg="1"/>
-      <p:bldP spid="13" grpId="0" animBg="1"/>
-      <p:bldP spid="14" grpId="0" animBg="1"/>
-      <p:bldP spid="15" grpId="0" animBg="1"/>
-      <p:bldP spid="16" grpId="0" animBg="1"/>
-      <p:bldP spid="17" grpId="0" animBg="1"/>
-    </p:bldLst>
-  </p:timing>
-</p:sld>
-</file>
-
 <file path=ppt/theme/theme1.xml><?xml version="1.0" encoding="utf-8"?>
 <a:theme xmlns:a="http://schemas.openxmlformats.org/drawingml/2006/main" name="Retrospect">
   <a:themeElements>

</xml_diff>